<commit_message>
Added some model outputs
</commit_message>
<xml_diff>
--- a/analysis/sem_path_diag/sem_paths.pptx
+++ b/analysis/sem_path_diag/sem_paths.pptx
@@ -7,6 +7,7 @@
   <p:sldIdLst>
     <p:sldId id="267" r:id="rId2"/>
     <p:sldId id="268" r:id="rId3"/>
+    <p:sldId id="269" r:id="rId4"/>
   </p:sldIdLst>
   <p:sldSz cx="12192000" cy="6858000"/>
   <p:notesSz cx="6858000" cy="9144000"/>
@@ -262,7 +263,7 @@
           <a:p>
             <a:fld id="{4F3B5105-D1A0-CF43-B5B5-26FA087694BC}" type="datetimeFigureOut">
               <a:rPr lang="en-US" smtClean="0"/>
-              <a:t>10/2/19</a:t>
+              <a:t>10/21/19</a:t>
             </a:fld>
             <a:endParaRPr lang="en-US"/>
           </a:p>
@@ -462,7 +463,7 @@
           <a:p>
             <a:fld id="{4F3B5105-D1A0-CF43-B5B5-26FA087694BC}" type="datetimeFigureOut">
               <a:rPr lang="en-US" smtClean="0"/>
-              <a:t>10/2/19</a:t>
+              <a:t>10/21/19</a:t>
             </a:fld>
             <a:endParaRPr lang="en-US"/>
           </a:p>
@@ -672,7 +673,7 @@
           <a:p>
             <a:fld id="{4F3B5105-D1A0-CF43-B5B5-26FA087694BC}" type="datetimeFigureOut">
               <a:rPr lang="en-US" smtClean="0"/>
-              <a:t>10/2/19</a:t>
+              <a:t>10/21/19</a:t>
             </a:fld>
             <a:endParaRPr lang="en-US"/>
           </a:p>
@@ -872,7 +873,7 @@
           <a:p>
             <a:fld id="{4F3B5105-D1A0-CF43-B5B5-26FA087694BC}" type="datetimeFigureOut">
               <a:rPr lang="en-US" smtClean="0"/>
-              <a:t>10/2/19</a:t>
+              <a:t>10/21/19</a:t>
             </a:fld>
             <a:endParaRPr lang="en-US"/>
           </a:p>
@@ -1148,7 +1149,7 @@
           <a:p>
             <a:fld id="{4F3B5105-D1A0-CF43-B5B5-26FA087694BC}" type="datetimeFigureOut">
               <a:rPr lang="en-US" smtClean="0"/>
-              <a:t>10/2/19</a:t>
+              <a:t>10/21/19</a:t>
             </a:fld>
             <a:endParaRPr lang="en-US"/>
           </a:p>
@@ -1416,7 +1417,7 @@
           <a:p>
             <a:fld id="{4F3B5105-D1A0-CF43-B5B5-26FA087694BC}" type="datetimeFigureOut">
               <a:rPr lang="en-US" smtClean="0"/>
-              <a:t>10/2/19</a:t>
+              <a:t>10/21/19</a:t>
             </a:fld>
             <a:endParaRPr lang="en-US"/>
           </a:p>
@@ -1831,7 +1832,7 @@
           <a:p>
             <a:fld id="{4F3B5105-D1A0-CF43-B5B5-26FA087694BC}" type="datetimeFigureOut">
               <a:rPr lang="en-US" smtClean="0"/>
-              <a:t>10/2/19</a:t>
+              <a:t>10/21/19</a:t>
             </a:fld>
             <a:endParaRPr lang="en-US"/>
           </a:p>
@@ -1973,7 +1974,7 @@
           <a:p>
             <a:fld id="{4F3B5105-D1A0-CF43-B5B5-26FA087694BC}" type="datetimeFigureOut">
               <a:rPr lang="en-US" smtClean="0"/>
-              <a:t>10/2/19</a:t>
+              <a:t>10/21/19</a:t>
             </a:fld>
             <a:endParaRPr lang="en-US"/>
           </a:p>
@@ -2086,7 +2087,7 @@
           <a:p>
             <a:fld id="{4F3B5105-D1A0-CF43-B5B5-26FA087694BC}" type="datetimeFigureOut">
               <a:rPr lang="en-US" smtClean="0"/>
-              <a:t>10/2/19</a:t>
+              <a:t>10/21/19</a:t>
             </a:fld>
             <a:endParaRPr lang="en-US"/>
           </a:p>
@@ -2399,7 +2400,7 @@
           <a:p>
             <a:fld id="{4F3B5105-D1A0-CF43-B5B5-26FA087694BC}" type="datetimeFigureOut">
               <a:rPr lang="en-US" smtClean="0"/>
-              <a:t>10/2/19</a:t>
+              <a:t>10/21/19</a:t>
             </a:fld>
             <a:endParaRPr lang="en-US"/>
           </a:p>
@@ -2688,7 +2689,7 @@
           <a:p>
             <a:fld id="{4F3B5105-D1A0-CF43-B5B5-26FA087694BC}" type="datetimeFigureOut">
               <a:rPr lang="en-US" smtClean="0"/>
-              <a:t>10/2/19</a:t>
+              <a:t>10/21/19</a:t>
             </a:fld>
             <a:endParaRPr lang="en-US"/>
           </a:p>
@@ -2931,7 +2932,7 @@
           <a:p>
             <a:fld id="{4F3B5105-D1A0-CF43-B5B5-26FA087694BC}" type="datetimeFigureOut">
               <a:rPr lang="en-US" smtClean="0"/>
-              <a:t>10/2/19</a:t>
+              <a:t>10/21/19</a:t>
             </a:fld>
             <a:endParaRPr lang="en-US"/>
           </a:p>
@@ -9151,6 +9152,1400 @@
 </p:sld>
 </file>
 
+<file path=ppt/slides/slide3.xml><?xml version="1.0" encoding="utf-8"?>
+<p:sld xmlns:a="http://schemas.openxmlformats.org/drawingml/2006/main" xmlns:r="http://schemas.openxmlformats.org/officeDocument/2006/relationships" xmlns:p="http://schemas.openxmlformats.org/presentationml/2006/main">
+  <p:cSld>
+    <p:spTree>
+      <p:nvGrpSpPr>
+        <p:cNvPr id="1" name=""/>
+        <p:cNvGrpSpPr/>
+        <p:nvPr/>
+      </p:nvGrpSpPr>
+      <p:grpSpPr>
+        <a:xfrm>
+          <a:off x="0" y="0"/>
+          <a:ext cx="0" cy="0"/>
+          <a:chOff x="0" y="0"/>
+          <a:chExt cx="0" cy="0"/>
+        </a:xfrm>
+      </p:grpSpPr>
+      <p:grpSp>
+        <p:nvGrpSpPr>
+          <p:cNvPr id="13" name="Group 12">
+            <a:extLst>
+              <a:ext uri="{FF2B5EF4-FFF2-40B4-BE49-F238E27FC236}">
+                <a16:creationId xmlns:a16="http://schemas.microsoft.com/office/drawing/2014/main" id="{1611E45B-644E-224E-B308-BE2B5046B79F}"/>
+              </a:ext>
+            </a:extLst>
+          </p:cNvPr>
+          <p:cNvGrpSpPr/>
+          <p:nvPr/>
+        </p:nvGrpSpPr>
+        <p:grpSpPr>
+          <a:xfrm>
+            <a:off x="3048424" y="1514175"/>
+            <a:ext cx="6095153" cy="3829650"/>
+            <a:chOff x="3424339" y="1445850"/>
+            <a:chExt cx="6095153" cy="3829650"/>
+          </a:xfrm>
+        </p:grpSpPr>
+        <p:grpSp>
+          <p:nvGrpSpPr>
+            <p:cNvPr id="23" name="Group 22">
+              <a:extLst>
+                <a:ext uri="{FF2B5EF4-FFF2-40B4-BE49-F238E27FC236}">
+                  <a16:creationId xmlns:a16="http://schemas.microsoft.com/office/drawing/2014/main" id="{29374FC0-AC82-984F-8EED-4EA3AEE0ECA0}"/>
+                </a:ext>
+              </a:extLst>
+            </p:cNvPr>
+            <p:cNvGrpSpPr/>
+            <p:nvPr/>
+          </p:nvGrpSpPr>
+          <p:grpSpPr>
+            <a:xfrm>
+              <a:off x="6714639" y="2883742"/>
+              <a:ext cx="2804853" cy="1300723"/>
+              <a:chOff x="4750098" y="3244522"/>
+              <a:chExt cx="2804853" cy="1300723"/>
+            </a:xfrm>
+          </p:grpSpPr>
+          <p:sp>
+            <p:nvSpPr>
+              <p:cNvPr id="47" name="Rounded Rectangle 46">
+                <a:extLst>
+                  <a:ext uri="{FF2B5EF4-FFF2-40B4-BE49-F238E27FC236}">
+                    <a16:creationId xmlns:a16="http://schemas.microsoft.com/office/drawing/2014/main" id="{51C65C30-983D-094E-BF16-32D1CA19F2F6}"/>
+                  </a:ext>
+                </a:extLst>
+              </p:cNvPr>
+              <p:cNvSpPr/>
+              <p:nvPr/>
+            </p:nvSpPr>
+            <p:spPr>
+              <a:xfrm>
+                <a:off x="4750098" y="3244522"/>
+                <a:ext cx="2804853" cy="1300723"/>
+              </a:xfrm>
+              <a:prstGeom prst="roundRect">
+                <a:avLst/>
+              </a:prstGeom>
+              <a:solidFill>
+                <a:schemeClr val="accent4">
+                  <a:lumMod val="60000"/>
+                  <a:lumOff val="40000"/>
+                </a:schemeClr>
+              </a:solidFill>
+              <a:ln w="19050">
+                <a:solidFill>
+                  <a:schemeClr val="tx1"/>
+                </a:solidFill>
+                <a:prstDash val="dash"/>
+              </a:ln>
+            </p:spPr>
+            <p:style>
+              <a:lnRef idx="2">
+                <a:schemeClr val="accent1">
+                  <a:shade val="50000"/>
+                </a:schemeClr>
+              </a:lnRef>
+              <a:fillRef idx="1">
+                <a:schemeClr val="accent1"/>
+              </a:fillRef>
+              <a:effectRef idx="0">
+                <a:schemeClr val="accent1"/>
+              </a:effectRef>
+              <a:fontRef idx="minor">
+                <a:schemeClr val="lt1"/>
+              </a:fontRef>
+            </p:style>
+            <p:txBody>
+              <a:bodyPr rot="0" spcFirstLastPara="0" vertOverflow="overflow" horzOverflow="overflow" vert="horz" wrap="square" lIns="49770" tIns="24885" rIns="49770" bIns="24885" numCol="1" spcCol="0" rtlCol="0" fromWordArt="0" anchor="ctr" anchorCtr="0" forceAA="0" compatLnSpc="1">
+                <a:prstTxWarp prst="textNoShape">
+                  <a:avLst/>
+                </a:prstTxWarp>
+                <a:noAutofit/>
+              </a:bodyPr>
+              <a:lstStyle/>
+              <a:p>
+                <a:pPr algn="ctr"/>
+                <a:endParaRPr lang="en-US" sz="980">
+                  <a:solidFill>
+                    <a:schemeClr val="tx1"/>
+                  </a:solidFill>
+                </a:endParaRPr>
+              </a:p>
+            </p:txBody>
+          </p:sp>
+          <p:grpSp>
+            <p:nvGrpSpPr>
+              <p:cNvPr id="22" name="Group 21">
+                <a:extLst>
+                  <a:ext uri="{FF2B5EF4-FFF2-40B4-BE49-F238E27FC236}">
+                    <a16:creationId xmlns:a16="http://schemas.microsoft.com/office/drawing/2014/main" id="{39F86FBD-31E1-CB4E-91C7-5CDE07D45E91}"/>
+                  </a:ext>
+                </a:extLst>
+              </p:cNvPr>
+              <p:cNvGrpSpPr/>
+              <p:nvPr/>
+            </p:nvGrpSpPr>
+            <p:grpSpPr>
+              <a:xfrm>
+                <a:off x="4911616" y="3369492"/>
+                <a:ext cx="2481817" cy="1050783"/>
+                <a:chOff x="4943943" y="3394085"/>
+                <a:chExt cx="2481817" cy="1050783"/>
+              </a:xfrm>
+            </p:grpSpPr>
+            <p:sp>
+              <p:nvSpPr>
+                <p:cNvPr id="48" name="Oval 47">
+                  <a:extLst>
+                    <a:ext uri="{FF2B5EF4-FFF2-40B4-BE49-F238E27FC236}">
+                      <a16:creationId xmlns:a16="http://schemas.microsoft.com/office/drawing/2014/main" id="{DCE1B472-8A2C-FD43-8285-06A35BA93F2C}"/>
+                    </a:ext>
+                  </a:extLst>
+                </p:cNvPr>
+                <p:cNvSpPr/>
+                <p:nvPr/>
+              </p:nvSpPr>
+              <p:spPr>
+                <a:xfrm>
+                  <a:off x="6310844" y="3647827"/>
+                  <a:ext cx="1114916" cy="558438"/>
+                </a:xfrm>
+                <a:prstGeom prst="ellipse">
+                  <a:avLst/>
+                </a:prstGeom>
+                <a:solidFill>
+                  <a:schemeClr val="bg1"/>
+                </a:solidFill>
+                <a:ln w="19050">
+                  <a:solidFill>
+                    <a:schemeClr val="tx1"/>
+                  </a:solidFill>
+                </a:ln>
+              </p:spPr>
+              <p:style>
+                <a:lnRef idx="2">
+                  <a:schemeClr val="accent1">
+                    <a:shade val="50000"/>
+                  </a:schemeClr>
+                </a:lnRef>
+                <a:fillRef idx="1">
+                  <a:schemeClr val="accent1"/>
+                </a:fillRef>
+                <a:effectRef idx="0">
+                  <a:schemeClr val="accent1"/>
+                </a:effectRef>
+                <a:fontRef idx="minor">
+                  <a:schemeClr val="lt1"/>
+                </a:fontRef>
+              </p:style>
+              <p:txBody>
+                <a:bodyPr rot="0" spcFirstLastPara="0" vertOverflow="overflow" horzOverflow="overflow" vert="horz" wrap="square" lIns="49770" tIns="24885" rIns="49770" bIns="24885" numCol="1" spcCol="0" rtlCol="0" fromWordArt="0" anchor="ctr" anchorCtr="0" forceAA="0" compatLnSpc="1">
+                  <a:prstTxWarp prst="textNoShape">
+                    <a:avLst/>
+                  </a:prstTxWarp>
+                  <a:noAutofit/>
+                </a:bodyPr>
+                <a:lstStyle/>
+                <a:p>
+                  <a:pPr algn="ctr"/>
+                  <a:r>
+                    <a:rPr lang="en-US" sz="980" dirty="0">
+                      <a:solidFill>
+                        <a:schemeClr val="tx1"/>
+                      </a:solidFill>
+                    </a:rPr>
+                    <a:t>Stand structural complexity</a:t>
+                  </a:r>
+                </a:p>
+              </p:txBody>
+            </p:sp>
+            <p:sp>
+              <p:nvSpPr>
+                <p:cNvPr id="49" name="Rounded Rectangle 48">
+                  <a:extLst>
+                    <a:ext uri="{FF2B5EF4-FFF2-40B4-BE49-F238E27FC236}">
+                      <a16:creationId xmlns:a16="http://schemas.microsoft.com/office/drawing/2014/main" id="{5AD1CD9A-1BB9-5046-B276-29B1CB54A5CB}"/>
+                    </a:ext>
+                  </a:extLst>
+                </p:cNvPr>
+                <p:cNvSpPr/>
+                <p:nvPr/>
+              </p:nvSpPr>
+              <p:spPr>
+                <a:xfrm>
+                  <a:off x="4944032" y="3394085"/>
+                  <a:ext cx="1151968" cy="418400"/>
+                </a:xfrm>
+                <a:prstGeom prst="roundRect">
+                  <a:avLst>
+                    <a:gd name="adj" fmla="val 4521"/>
+                  </a:avLst>
+                </a:prstGeom>
+                <a:solidFill>
+                  <a:schemeClr val="bg1"/>
+                </a:solidFill>
+                <a:ln w="19050">
+                  <a:solidFill>
+                    <a:schemeClr val="tx1"/>
+                  </a:solidFill>
+                </a:ln>
+              </p:spPr>
+              <p:style>
+                <a:lnRef idx="2">
+                  <a:schemeClr val="accent1">
+                    <a:shade val="50000"/>
+                  </a:schemeClr>
+                </a:lnRef>
+                <a:fillRef idx="1">
+                  <a:schemeClr val="accent1"/>
+                </a:fillRef>
+                <a:effectRef idx="0">
+                  <a:schemeClr val="accent1"/>
+                </a:effectRef>
+                <a:fontRef idx="minor">
+                  <a:schemeClr val="lt1"/>
+                </a:fontRef>
+              </p:style>
+              <p:txBody>
+                <a:bodyPr rot="0" spcFirstLastPara="0" vertOverflow="overflow" horzOverflow="overflow" vert="horz" wrap="square" lIns="44280" tIns="22140" rIns="44280" bIns="22140" numCol="1" spcCol="0" rtlCol="0" fromWordArt="0" anchor="ctr" anchorCtr="0" forceAA="0" compatLnSpc="1">
+                  <a:prstTxWarp prst="textNoShape">
+                    <a:avLst/>
+                  </a:prstTxWarp>
+                  <a:noAutofit/>
+                </a:bodyPr>
+                <a:lstStyle/>
+                <a:p>
+                  <a:pPr algn="ctr"/>
+                  <a:r>
+                    <a:rPr lang="en-US" sz="871" dirty="0">
+                      <a:solidFill>
+                        <a:schemeClr val="tx1"/>
+                      </a:solidFill>
+                    </a:rPr>
+                    <a:t>Height coef. </a:t>
+                  </a:r>
+                </a:p>
+                <a:p>
+                  <a:pPr algn="ctr"/>
+                  <a:r>
+                    <a:rPr lang="en-US" sz="871" dirty="0">
+                      <a:solidFill>
+                        <a:schemeClr val="tx1"/>
+                      </a:solidFill>
+                    </a:rPr>
+                    <a:t>variation</a:t>
+                  </a:r>
+                </a:p>
+              </p:txBody>
+            </p:sp>
+            <p:cxnSp>
+              <p:nvCxnSpPr>
+                <p:cNvPr id="50" name="Straight Arrow Connector 49">
+                  <a:extLst>
+                    <a:ext uri="{FF2B5EF4-FFF2-40B4-BE49-F238E27FC236}">
+                      <a16:creationId xmlns:a16="http://schemas.microsoft.com/office/drawing/2014/main" id="{06DBD01C-76AE-7B49-8DC1-315E1A05248C}"/>
+                    </a:ext>
+                  </a:extLst>
+                </p:cNvPr>
+                <p:cNvCxnSpPr>
+                  <a:cxnSpLocks/>
+                  <a:stCxn id="48" idx="1"/>
+                  <a:endCxn id="49" idx="3"/>
+                </p:cNvCxnSpPr>
+                <p:nvPr/>
+              </p:nvCxnSpPr>
+              <p:spPr>
+                <a:xfrm flipH="1" flipV="1">
+                  <a:off x="6096000" y="3603285"/>
+                  <a:ext cx="378120" cy="126323"/>
+                </a:xfrm>
+                <a:prstGeom prst="straightConnector1">
+                  <a:avLst/>
+                </a:prstGeom>
+                <a:ln w="28575">
+                  <a:solidFill>
+                    <a:schemeClr val="tx1"/>
+                  </a:solidFill>
+                  <a:headEnd type="arrow" w="med" len="med"/>
+                  <a:tailEnd type="none" w="med" len="med"/>
+                </a:ln>
+              </p:spPr>
+              <p:style>
+                <a:lnRef idx="1">
+                  <a:schemeClr val="accent1"/>
+                </a:lnRef>
+                <a:fillRef idx="0">
+                  <a:schemeClr val="accent1"/>
+                </a:fillRef>
+                <a:effectRef idx="0">
+                  <a:schemeClr val="accent1"/>
+                </a:effectRef>
+                <a:fontRef idx="minor">
+                  <a:schemeClr val="tx1"/>
+                </a:fontRef>
+              </p:style>
+            </p:cxnSp>
+            <p:sp>
+              <p:nvSpPr>
+                <p:cNvPr id="51" name="Rounded Rectangle 50">
+                  <a:extLst>
+                    <a:ext uri="{FF2B5EF4-FFF2-40B4-BE49-F238E27FC236}">
+                      <a16:creationId xmlns:a16="http://schemas.microsoft.com/office/drawing/2014/main" id="{D0ED0761-55A4-104E-B5BF-F26D77CF99C0}"/>
+                    </a:ext>
+                  </a:extLst>
+                </p:cNvPr>
+                <p:cNvSpPr/>
+                <p:nvPr/>
+              </p:nvSpPr>
+              <p:spPr>
+                <a:xfrm>
+                  <a:off x="4943943" y="4026468"/>
+                  <a:ext cx="1151968" cy="418400"/>
+                </a:xfrm>
+                <a:prstGeom prst="roundRect">
+                  <a:avLst>
+                    <a:gd name="adj" fmla="val 4521"/>
+                  </a:avLst>
+                </a:prstGeom>
+                <a:solidFill>
+                  <a:schemeClr val="bg1"/>
+                </a:solidFill>
+                <a:ln w="19050">
+                  <a:solidFill>
+                    <a:schemeClr val="tx1"/>
+                  </a:solidFill>
+                </a:ln>
+              </p:spPr>
+              <p:style>
+                <a:lnRef idx="2">
+                  <a:schemeClr val="accent1">
+                    <a:shade val="50000"/>
+                  </a:schemeClr>
+                </a:lnRef>
+                <a:fillRef idx="1">
+                  <a:schemeClr val="accent1"/>
+                </a:fillRef>
+                <a:effectRef idx="0">
+                  <a:schemeClr val="accent1"/>
+                </a:effectRef>
+                <a:fontRef idx="minor">
+                  <a:schemeClr val="lt1"/>
+                </a:fontRef>
+              </p:style>
+              <p:txBody>
+                <a:bodyPr rot="0" spcFirstLastPara="0" vertOverflow="overflow" horzOverflow="overflow" vert="horz" wrap="square" lIns="44280" tIns="22140" rIns="44280" bIns="22140" numCol="1" spcCol="0" rtlCol="0" fromWordArt="0" anchor="ctr" anchorCtr="0" forceAA="0" compatLnSpc="1">
+                  <a:prstTxWarp prst="textNoShape">
+                    <a:avLst/>
+                  </a:prstTxWarp>
+                  <a:noAutofit/>
+                </a:bodyPr>
+                <a:lstStyle/>
+                <a:p>
+                  <a:pPr algn="ctr"/>
+                  <a:r>
+                    <a:rPr lang="en-US" sz="871" dirty="0">
+                      <a:solidFill>
+                        <a:schemeClr val="tx1"/>
+                      </a:solidFill>
+                    </a:rPr>
+                    <a:t>DBH coef. </a:t>
+                  </a:r>
+                </a:p>
+                <a:p>
+                  <a:pPr algn="ctr"/>
+                  <a:r>
+                    <a:rPr lang="en-US" sz="871" dirty="0">
+                      <a:solidFill>
+                        <a:schemeClr val="tx1"/>
+                      </a:solidFill>
+                    </a:rPr>
+                    <a:t>variation</a:t>
+                  </a:r>
+                </a:p>
+              </p:txBody>
+            </p:sp>
+            <p:cxnSp>
+              <p:nvCxnSpPr>
+                <p:cNvPr id="52" name="Straight Arrow Connector 51">
+                  <a:extLst>
+                    <a:ext uri="{FF2B5EF4-FFF2-40B4-BE49-F238E27FC236}">
+                      <a16:creationId xmlns:a16="http://schemas.microsoft.com/office/drawing/2014/main" id="{0D823D01-B5FF-D140-98F6-DD2D15C2AA21}"/>
+                    </a:ext>
+                  </a:extLst>
+                </p:cNvPr>
+                <p:cNvCxnSpPr>
+                  <a:cxnSpLocks/>
+                  <a:stCxn id="48" idx="3"/>
+                  <a:endCxn id="51" idx="3"/>
+                </p:cNvCxnSpPr>
+                <p:nvPr/>
+              </p:nvCxnSpPr>
+              <p:spPr>
+                <a:xfrm flipH="1">
+                  <a:off x="6095911" y="4124484"/>
+                  <a:ext cx="378209" cy="111184"/>
+                </a:xfrm>
+                <a:prstGeom prst="straightConnector1">
+                  <a:avLst/>
+                </a:prstGeom>
+                <a:ln w="28575">
+                  <a:solidFill>
+                    <a:schemeClr val="tx1"/>
+                  </a:solidFill>
+                  <a:headEnd type="arrow" w="med" len="med"/>
+                  <a:tailEnd type="none" w="med" len="med"/>
+                </a:ln>
+              </p:spPr>
+              <p:style>
+                <a:lnRef idx="1">
+                  <a:schemeClr val="accent1"/>
+                </a:lnRef>
+                <a:fillRef idx="0">
+                  <a:schemeClr val="accent1"/>
+                </a:fillRef>
+                <a:effectRef idx="0">
+                  <a:schemeClr val="accent1"/>
+                </a:effectRef>
+                <a:fontRef idx="minor">
+                  <a:schemeClr val="tx1"/>
+                </a:fontRef>
+              </p:style>
+            </p:cxnSp>
+          </p:grpSp>
+        </p:grpSp>
+        <p:grpSp>
+          <p:nvGrpSpPr>
+            <p:cNvPr id="5" name="Group 4">
+              <a:extLst>
+                <a:ext uri="{FF2B5EF4-FFF2-40B4-BE49-F238E27FC236}">
+                  <a16:creationId xmlns:a16="http://schemas.microsoft.com/office/drawing/2014/main" id="{B2651C1C-D357-C044-BA12-67244E004067}"/>
+                </a:ext>
+              </a:extLst>
+            </p:cNvPr>
+            <p:cNvGrpSpPr/>
+            <p:nvPr/>
+          </p:nvGrpSpPr>
+          <p:grpSpPr>
+            <a:xfrm>
+              <a:off x="3424339" y="1445850"/>
+              <a:ext cx="2804853" cy="1300723"/>
+              <a:chOff x="521610" y="3355308"/>
+              <a:chExt cx="2804853" cy="1300723"/>
+            </a:xfrm>
+          </p:grpSpPr>
+          <p:sp>
+            <p:nvSpPr>
+              <p:cNvPr id="41" name="Rounded Rectangle 40">
+                <a:extLst>
+                  <a:ext uri="{FF2B5EF4-FFF2-40B4-BE49-F238E27FC236}">
+                    <a16:creationId xmlns:a16="http://schemas.microsoft.com/office/drawing/2014/main" id="{73A6CC8D-DF06-214C-8E4F-710E3060290F}"/>
+                  </a:ext>
+                </a:extLst>
+              </p:cNvPr>
+              <p:cNvSpPr/>
+              <p:nvPr/>
+            </p:nvSpPr>
+            <p:spPr>
+              <a:xfrm>
+                <a:off x="521610" y="3355308"/>
+                <a:ext cx="2804853" cy="1300723"/>
+              </a:xfrm>
+              <a:prstGeom prst="roundRect">
+                <a:avLst/>
+              </a:prstGeom>
+              <a:solidFill>
+                <a:srgbClr val="E5CFF8"/>
+              </a:solidFill>
+              <a:ln w="19050">
+                <a:solidFill>
+                  <a:schemeClr val="tx1"/>
+                </a:solidFill>
+                <a:prstDash val="dash"/>
+              </a:ln>
+            </p:spPr>
+            <p:style>
+              <a:lnRef idx="2">
+                <a:schemeClr val="accent1">
+                  <a:shade val="50000"/>
+                </a:schemeClr>
+              </a:lnRef>
+              <a:fillRef idx="1">
+                <a:schemeClr val="accent1"/>
+              </a:fillRef>
+              <a:effectRef idx="0">
+                <a:schemeClr val="accent1"/>
+              </a:effectRef>
+              <a:fontRef idx="minor">
+                <a:schemeClr val="lt1"/>
+              </a:fontRef>
+            </p:style>
+            <p:txBody>
+              <a:bodyPr rot="0" spcFirstLastPara="0" vertOverflow="overflow" horzOverflow="overflow" vert="horz" wrap="square" lIns="49770" tIns="24885" rIns="49770" bIns="24885" numCol="1" spcCol="0" rtlCol="0" fromWordArt="0" anchor="ctr" anchorCtr="0" forceAA="0" compatLnSpc="1">
+                <a:prstTxWarp prst="textNoShape">
+                  <a:avLst/>
+                </a:prstTxWarp>
+                <a:noAutofit/>
+              </a:bodyPr>
+              <a:lstStyle/>
+              <a:p>
+                <a:pPr algn="ctr"/>
+                <a:endParaRPr lang="en-US" sz="980" dirty="0">
+                  <a:solidFill>
+                    <a:schemeClr val="tx1"/>
+                  </a:solidFill>
+                </a:endParaRPr>
+              </a:p>
+            </p:txBody>
+          </p:sp>
+          <p:sp>
+            <p:nvSpPr>
+              <p:cNvPr id="42" name="Oval 41">
+                <a:extLst>
+                  <a:ext uri="{FF2B5EF4-FFF2-40B4-BE49-F238E27FC236}">
+                    <a16:creationId xmlns:a16="http://schemas.microsoft.com/office/drawing/2014/main" id="{29AA08E9-92BF-B841-BDFD-A0465CEB9D1C}"/>
+                  </a:ext>
+                </a:extLst>
+              </p:cNvPr>
+              <p:cNvSpPr/>
+              <p:nvPr/>
+            </p:nvSpPr>
+            <p:spPr>
+              <a:xfrm>
+                <a:off x="2023722" y="3726450"/>
+                <a:ext cx="1114916" cy="558438"/>
+              </a:xfrm>
+              <a:prstGeom prst="ellipse">
+                <a:avLst/>
+              </a:prstGeom>
+              <a:solidFill>
+                <a:schemeClr val="bg1"/>
+              </a:solidFill>
+              <a:ln w="19050">
+                <a:solidFill>
+                  <a:schemeClr val="tx1"/>
+                </a:solidFill>
+              </a:ln>
+            </p:spPr>
+            <p:style>
+              <a:lnRef idx="2">
+                <a:schemeClr val="accent1">
+                  <a:shade val="50000"/>
+                </a:schemeClr>
+              </a:lnRef>
+              <a:fillRef idx="1">
+                <a:schemeClr val="accent1"/>
+              </a:fillRef>
+              <a:effectRef idx="0">
+                <a:schemeClr val="accent1"/>
+              </a:effectRef>
+              <a:fontRef idx="minor">
+                <a:schemeClr val="lt1"/>
+              </a:fontRef>
+            </p:style>
+            <p:txBody>
+              <a:bodyPr rot="0" spcFirstLastPara="0" vertOverflow="overflow" horzOverflow="overflow" vert="horz" wrap="square" lIns="49770" tIns="24885" rIns="49770" bIns="24885" numCol="1" spcCol="0" rtlCol="0" fromWordArt="0" anchor="ctr" anchorCtr="0" forceAA="0" compatLnSpc="1">
+                <a:prstTxWarp prst="textNoShape">
+                  <a:avLst/>
+                </a:prstTxWarp>
+                <a:noAutofit/>
+              </a:bodyPr>
+              <a:lstStyle/>
+              <a:p>
+                <a:pPr algn="ctr"/>
+                <a:r>
+                  <a:rPr lang="en-US" sz="980" dirty="0">
+                    <a:solidFill>
+                      <a:schemeClr val="tx1"/>
+                    </a:solidFill>
+                  </a:rPr>
+                  <a:t>Tree species diversity</a:t>
+                </a:r>
+              </a:p>
+            </p:txBody>
+          </p:sp>
+          <p:sp>
+            <p:nvSpPr>
+              <p:cNvPr id="43" name="Rounded Rectangle 42">
+                <a:extLst>
+                  <a:ext uri="{FF2B5EF4-FFF2-40B4-BE49-F238E27FC236}">
+                    <a16:creationId xmlns:a16="http://schemas.microsoft.com/office/drawing/2014/main" id="{194ECC55-A171-D240-88B5-0C6F3A4B98AD}"/>
+                  </a:ext>
+                </a:extLst>
+              </p:cNvPr>
+              <p:cNvSpPr/>
+              <p:nvPr/>
+            </p:nvSpPr>
+            <p:spPr>
+              <a:xfrm>
+                <a:off x="688816" y="3480763"/>
+                <a:ext cx="1151968" cy="418400"/>
+              </a:xfrm>
+              <a:prstGeom prst="roundRect">
+                <a:avLst>
+                  <a:gd name="adj" fmla="val 4521"/>
+                </a:avLst>
+              </a:prstGeom>
+              <a:solidFill>
+                <a:schemeClr val="bg1"/>
+              </a:solidFill>
+              <a:ln w="19050">
+                <a:solidFill>
+                  <a:schemeClr val="tx1"/>
+                </a:solidFill>
+              </a:ln>
+            </p:spPr>
+            <p:style>
+              <a:lnRef idx="2">
+                <a:schemeClr val="accent1">
+                  <a:shade val="50000"/>
+                </a:schemeClr>
+              </a:lnRef>
+              <a:fillRef idx="1">
+                <a:schemeClr val="accent1"/>
+              </a:fillRef>
+              <a:effectRef idx="0">
+                <a:schemeClr val="accent1"/>
+              </a:effectRef>
+              <a:fontRef idx="minor">
+                <a:schemeClr val="lt1"/>
+              </a:fontRef>
+            </p:style>
+            <p:txBody>
+              <a:bodyPr rot="0" spcFirstLastPara="0" vertOverflow="overflow" horzOverflow="overflow" vert="horz" wrap="square" lIns="44280" tIns="22140" rIns="44280" bIns="22140" numCol="1" spcCol="0" rtlCol="0" fromWordArt="0" anchor="ctr" anchorCtr="0" forceAA="0" compatLnSpc="1">
+                <a:prstTxWarp prst="textNoShape">
+                  <a:avLst/>
+                </a:prstTxWarp>
+                <a:noAutofit/>
+              </a:bodyPr>
+              <a:lstStyle/>
+              <a:p>
+                <a:pPr algn="ctr"/>
+                <a:r>
+                  <a:rPr lang="en-US" sz="871" dirty="0">
+                    <a:solidFill>
+                      <a:schemeClr val="tx1"/>
+                    </a:solidFill>
+                  </a:rPr>
+                  <a:t>Tree species richness</a:t>
+                </a:r>
+              </a:p>
+            </p:txBody>
+          </p:sp>
+          <p:cxnSp>
+            <p:nvCxnSpPr>
+              <p:cNvPr id="44" name="Straight Arrow Connector 43">
+                <a:extLst>
+                  <a:ext uri="{FF2B5EF4-FFF2-40B4-BE49-F238E27FC236}">
+                    <a16:creationId xmlns:a16="http://schemas.microsoft.com/office/drawing/2014/main" id="{281014D9-3C55-9D4D-9DB8-A6EF8B005F20}"/>
+                  </a:ext>
+                </a:extLst>
+              </p:cNvPr>
+              <p:cNvCxnSpPr>
+                <a:cxnSpLocks/>
+                <a:stCxn id="42" idx="1"/>
+                <a:endCxn id="43" idx="3"/>
+              </p:cNvCxnSpPr>
+              <p:nvPr/>
+            </p:nvCxnSpPr>
+            <p:spPr>
+              <a:xfrm flipH="1" flipV="1">
+                <a:off x="1840784" y="3689963"/>
+                <a:ext cx="346214" cy="118268"/>
+              </a:xfrm>
+              <a:prstGeom prst="straightConnector1">
+                <a:avLst/>
+              </a:prstGeom>
+              <a:ln w="28575">
+                <a:solidFill>
+                  <a:schemeClr val="tx1"/>
+                </a:solidFill>
+                <a:headEnd type="arrow" w="med" len="med"/>
+                <a:tailEnd type="none" w="med" len="med"/>
+              </a:ln>
+            </p:spPr>
+            <p:style>
+              <a:lnRef idx="1">
+                <a:schemeClr val="accent1"/>
+              </a:lnRef>
+              <a:fillRef idx="0">
+                <a:schemeClr val="accent1"/>
+              </a:fillRef>
+              <a:effectRef idx="0">
+                <a:schemeClr val="accent1"/>
+              </a:effectRef>
+              <a:fontRef idx="minor">
+                <a:schemeClr val="tx1"/>
+              </a:fontRef>
+            </p:style>
+          </p:cxnSp>
+          <p:sp>
+            <p:nvSpPr>
+              <p:cNvPr id="45" name="Rounded Rectangle 44">
+                <a:extLst>
+                  <a:ext uri="{FF2B5EF4-FFF2-40B4-BE49-F238E27FC236}">
+                    <a16:creationId xmlns:a16="http://schemas.microsoft.com/office/drawing/2014/main" id="{38391F49-BD3F-B142-A7F6-21BA1002FE4F}"/>
+                  </a:ext>
+                </a:extLst>
+              </p:cNvPr>
+              <p:cNvSpPr/>
+              <p:nvPr/>
+            </p:nvSpPr>
+            <p:spPr>
+              <a:xfrm>
+                <a:off x="695594" y="4113863"/>
+                <a:ext cx="1151968" cy="418400"/>
+              </a:xfrm>
+              <a:prstGeom prst="roundRect">
+                <a:avLst>
+                  <a:gd name="adj" fmla="val 4521"/>
+                </a:avLst>
+              </a:prstGeom>
+              <a:solidFill>
+                <a:schemeClr val="bg1"/>
+              </a:solidFill>
+              <a:ln w="19050">
+                <a:solidFill>
+                  <a:schemeClr val="tx1"/>
+                </a:solidFill>
+              </a:ln>
+            </p:spPr>
+            <p:style>
+              <a:lnRef idx="2">
+                <a:schemeClr val="accent1">
+                  <a:shade val="50000"/>
+                </a:schemeClr>
+              </a:lnRef>
+              <a:fillRef idx="1">
+                <a:schemeClr val="accent1"/>
+              </a:fillRef>
+              <a:effectRef idx="0">
+                <a:schemeClr val="accent1"/>
+              </a:effectRef>
+              <a:fontRef idx="minor">
+                <a:schemeClr val="lt1"/>
+              </a:fontRef>
+            </p:style>
+            <p:txBody>
+              <a:bodyPr rot="0" spcFirstLastPara="0" vertOverflow="overflow" horzOverflow="overflow" vert="horz" wrap="square" lIns="44280" tIns="22140" rIns="44280" bIns="22140" numCol="1" spcCol="0" rtlCol="0" fromWordArt="0" anchor="ctr" anchorCtr="0" forceAA="0" compatLnSpc="1">
+                <a:prstTxWarp prst="textNoShape">
+                  <a:avLst/>
+                </a:prstTxWarp>
+                <a:noAutofit/>
+              </a:bodyPr>
+              <a:lstStyle/>
+              <a:p>
+                <a:pPr algn="ctr"/>
+                <a:r>
+                  <a:rPr lang="en-US" sz="871" dirty="0">
+                    <a:solidFill>
+                      <a:schemeClr val="tx1"/>
+                    </a:solidFill>
+                  </a:rPr>
+                  <a:t>Shannon equitability index</a:t>
+                </a:r>
+              </a:p>
+            </p:txBody>
+          </p:sp>
+          <p:cxnSp>
+            <p:nvCxnSpPr>
+              <p:cNvPr id="46" name="Straight Arrow Connector 45">
+                <a:extLst>
+                  <a:ext uri="{FF2B5EF4-FFF2-40B4-BE49-F238E27FC236}">
+                    <a16:creationId xmlns:a16="http://schemas.microsoft.com/office/drawing/2014/main" id="{26C20477-F121-FC41-AF02-85A98A895A31}"/>
+                  </a:ext>
+                </a:extLst>
+              </p:cNvPr>
+              <p:cNvCxnSpPr>
+                <a:cxnSpLocks/>
+                <a:stCxn id="42" idx="3"/>
+                <a:endCxn id="45" idx="3"/>
+              </p:cNvCxnSpPr>
+              <p:nvPr/>
+            </p:nvCxnSpPr>
+            <p:spPr>
+              <a:xfrm flipH="1">
+                <a:off x="1847562" y="4203107"/>
+                <a:ext cx="339436" cy="119956"/>
+              </a:xfrm>
+              <a:prstGeom prst="straightConnector1">
+                <a:avLst/>
+              </a:prstGeom>
+              <a:ln w="28575">
+                <a:solidFill>
+                  <a:schemeClr val="tx1"/>
+                </a:solidFill>
+                <a:headEnd type="arrow" w="med" len="med"/>
+                <a:tailEnd type="none" w="med" len="med"/>
+              </a:ln>
+            </p:spPr>
+            <p:style>
+              <a:lnRef idx="1">
+                <a:schemeClr val="accent1"/>
+              </a:lnRef>
+              <a:fillRef idx="0">
+                <a:schemeClr val="accent1"/>
+              </a:fillRef>
+              <a:effectRef idx="0">
+                <a:schemeClr val="accent1"/>
+              </a:effectRef>
+              <a:fontRef idx="minor">
+                <a:schemeClr val="tx1"/>
+              </a:fontRef>
+            </p:style>
+          </p:cxnSp>
+        </p:grpSp>
+        <p:grpSp>
+          <p:nvGrpSpPr>
+            <p:cNvPr id="4" name="Group 3">
+              <a:extLst>
+                <a:ext uri="{FF2B5EF4-FFF2-40B4-BE49-F238E27FC236}">
+                  <a16:creationId xmlns:a16="http://schemas.microsoft.com/office/drawing/2014/main" id="{C6660AFD-D5C2-9047-A09B-F63BBE531214}"/>
+                </a:ext>
+              </a:extLst>
+            </p:cNvPr>
+            <p:cNvGrpSpPr/>
+            <p:nvPr/>
+          </p:nvGrpSpPr>
+          <p:grpSpPr>
+            <a:xfrm>
+              <a:off x="3424340" y="4302497"/>
+              <a:ext cx="2804853" cy="973003"/>
+              <a:chOff x="265234" y="5357615"/>
+              <a:chExt cx="2804853" cy="973003"/>
+            </a:xfrm>
+          </p:grpSpPr>
+          <p:sp>
+            <p:nvSpPr>
+              <p:cNvPr id="30" name="Rounded Rectangle 29">
+                <a:extLst>
+                  <a:ext uri="{FF2B5EF4-FFF2-40B4-BE49-F238E27FC236}">
+                    <a16:creationId xmlns:a16="http://schemas.microsoft.com/office/drawing/2014/main" id="{FA47F0C8-62B0-574B-89D9-72F70C038A43}"/>
+                  </a:ext>
+                </a:extLst>
+              </p:cNvPr>
+              <p:cNvSpPr/>
+              <p:nvPr/>
+            </p:nvSpPr>
+            <p:spPr>
+              <a:xfrm>
+                <a:off x="265234" y="5357615"/>
+                <a:ext cx="2804853" cy="973003"/>
+              </a:xfrm>
+              <a:prstGeom prst="roundRect">
+                <a:avLst/>
+              </a:prstGeom>
+              <a:solidFill>
+                <a:srgbClr val="7FC973"/>
+              </a:solidFill>
+              <a:ln w="19050">
+                <a:solidFill>
+                  <a:schemeClr val="tx1"/>
+                </a:solidFill>
+                <a:prstDash val="dash"/>
+              </a:ln>
+            </p:spPr>
+            <p:style>
+              <a:lnRef idx="2">
+                <a:schemeClr val="accent1">
+                  <a:shade val="50000"/>
+                </a:schemeClr>
+              </a:lnRef>
+              <a:fillRef idx="1">
+                <a:schemeClr val="accent1"/>
+              </a:fillRef>
+              <a:effectRef idx="0">
+                <a:schemeClr val="accent1"/>
+              </a:effectRef>
+              <a:fontRef idx="minor">
+                <a:schemeClr val="lt1"/>
+              </a:fontRef>
+            </p:style>
+            <p:txBody>
+              <a:bodyPr rot="0" spcFirstLastPara="0" vertOverflow="overflow" horzOverflow="overflow" vert="horz" wrap="square" lIns="49770" tIns="24885" rIns="49770" bIns="24885" numCol="1" spcCol="0" rtlCol="0" fromWordArt="0" anchor="ctr" anchorCtr="0" forceAA="0" compatLnSpc="1">
+                <a:prstTxWarp prst="textNoShape">
+                  <a:avLst/>
+                </a:prstTxWarp>
+                <a:noAutofit/>
+              </a:bodyPr>
+              <a:lstStyle/>
+              <a:p>
+                <a:pPr algn="ctr"/>
+                <a:endParaRPr lang="en-US" sz="980">
+                  <a:solidFill>
+                    <a:schemeClr val="tx1"/>
+                  </a:solidFill>
+                </a:endParaRPr>
+              </a:p>
+            </p:txBody>
+          </p:sp>
+          <p:sp>
+            <p:nvSpPr>
+              <p:cNvPr id="32" name="Oval 31">
+                <a:extLst>
+                  <a:ext uri="{FF2B5EF4-FFF2-40B4-BE49-F238E27FC236}">
+                    <a16:creationId xmlns:a16="http://schemas.microsoft.com/office/drawing/2014/main" id="{053E714A-668F-5147-9AED-1D9E30A5B356}"/>
+                  </a:ext>
+                </a:extLst>
+              </p:cNvPr>
+              <p:cNvSpPr/>
+              <p:nvPr/>
+            </p:nvSpPr>
+            <p:spPr>
+              <a:xfrm>
+                <a:off x="1811853" y="5565060"/>
+                <a:ext cx="1116753" cy="558114"/>
+              </a:xfrm>
+              <a:prstGeom prst="ellipse">
+                <a:avLst/>
+              </a:prstGeom>
+              <a:solidFill>
+                <a:schemeClr val="bg1"/>
+              </a:solidFill>
+              <a:ln w="19050">
+                <a:solidFill>
+                  <a:schemeClr val="tx1"/>
+                </a:solidFill>
+              </a:ln>
+            </p:spPr>
+            <p:style>
+              <a:lnRef idx="2">
+                <a:schemeClr val="accent1">
+                  <a:shade val="50000"/>
+                </a:schemeClr>
+              </a:lnRef>
+              <a:fillRef idx="1">
+                <a:schemeClr val="accent1"/>
+              </a:fillRef>
+              <a:effectRef idx="0">
+                <a:schemeClr val="accent1"/>
+              </a:effectRef>
+              <a:fontRef idx="minor">
+                <a:schemeClr val="lt1"/>
+              </a:fontRef>
+            </p:style>
+            <p:txBody>
+              <a:bodyPr rot="0" spcFirstLastPara="0" vertOverflow="overflow" horzOverflow="overflow" vert="horz" wrap="square" lIns="49770" tIns="24885" rIns="49770" bIns="24885" numCol="1" spcCol="0" rtlCol="0" fromWordArt="0" anchor="ctr" anchorCtr="0" forceAA="0" compatLnSpc="1">
+                <a:prstTxWarp prst="textNoShape">
+                  <a:avLst/>
+                </a:prstTxWarp>
+                <a:noAutofit/>
+              </a:bodyPr>
+              <a:lstStyle/>
+              <a:p>
+                <a:pPr algn="ctr"/>
+                <a:r>
+                  <a:rPr lang="en-US" sz="980" dirty="0">
+                    <a:solidFill>
+                      <a:schemeClr val="tx1"/>
+                    </a:solidFill>
+                  </a:rPr>
+                  <a:t>Above ground biomass</a:t>
+                </a:r>
+              </a:p>
+            </p:txBody>
+          </p:sp>
+          <p:sp>
+            <p:nvSpPr>
+              <p:cNvPr id="33" name="Rounded Rectangle 32">
+                <a:extLst>
+                  <a:ext uri="{FF2B5EF4-FFF2-40B4-BE49-F238E27FC236}">
+                    <a16:creationId xmlns:a16="http://schemas.microsoft.com/office/drawing/2014/main" id="{C260F173-887B-F743-9143-56C047EC9512}"/>
+                  </a:ext>
+                </a:extLst>
+              </p:cNvPr>
+              <p:cNvSpPr/>
+              <p:nvPr/>
+            </p:nvSpPr>
+            <p:spPr>
+              <a:xfrm>
+                <a:off x="446878" y="5634918"/>
+                <a:ext cx="1151968" cy="418400"/>
+              </a:xfrm>
+              <a:prstGeom prst="roundRect">
+                <a:avLst>
+                  <a:gd name="adj" fmla="val 4521"/>
+                </a:avLst>
+              </a:prstGeom>
+              <a:solidFill>
+                <a:schemeClr val="bg1"/>
+              </a:solidFill>
+              <a:ln w="19050">
+                <a:solidFill>
+                  <a:schemeClr val="tx1"/>
+                </a:solidFill>
+              </a:ln>
+            </p:spPr>
+            <p:style>
+              <a:lnRef idx="2">
+                <a:schemeClr val="accent1">
+                  <a:shade val="50000"/>
+                </a:schemeClr>
+              </a:lnRef>
+              <a:fillRef idx="1">
+                <a:schemeClr val="accent1"/>
+              </a:fillRef>
+              <a:effectRef idx="0">
+                <a:schemeClr val="accent1"/>
+              </a:effectRef>
+              <a:fontRef idx="minor">
+                <a:schemeClr val="lt1"/>
+              </a:fontRef>
+            </p:style>
+            <p:txBody>
+              <a:bodyPr rot="0" spcFirstLastPara="0" vertOverflow="overflow" horzOverflow="overflow" vert="horz" wrap="square" lIns="44280" tIns="22140" rIns="44280" bIns="22140" numCol="1" spcCol="0" rtlCol="0" fromWordArt="0" anchor="ctr" anchorCtr="0" forceAA="0" compatLnSpc="1">
+                <a:prstTxWarp prst="textNoShape">
+                  <a:avLst/>
+                </a:prstTxWarp>
+                <a:noAutofit/>
+              </a:bodyPr>
+              <a:lstStyle/>
+              <a:p>
+                <a:pPr algn="ctr"/>
+                <a:r>
+                  <a:rPr lang="en-US" sz="871" dirty="0">
+                    <a:solidFill>
+                      <a:schemeClr val="tx1"/>
+                    </a:solidFill>
+                  </a:rPr>
+                  <a:t>Above ground </a:t>
+                </a:r>
+              </a:p>
+              <a:p>
+                <a:pPr algn="ctr"/>
+                <a:r>
+                  <a:rPr lang="en-US" sz="871" dirty="0">
+                    <a:solidFill>
+                      <a:schemeClr val="tx1"/>
+                    </a:solidFill>
+                  </a:rPr>
+                  <a:t>biomass</a:t>
+                </a:r>
+              </a:p>
+            </p:txBody>
+          </p:sp>
+          <p:cxnSp>
+            <p:nvCxnSpPr>
+              <p:cNvPr id="34" name="Straight Arrow Connector 33">
+                <a:extLst>
+                  <a:ext uri="{FF2B5EF4-FFF2-40B4-BE49-F238E27FC236}">
+                    <a16:creationId xmlns:a16="http://schemas.microsoft.com/office/drawing/2014/main" id="{854D99A4-001D-C64A-AD39-8295F4B0DEA9}"/>
+                  </a:ext>
+                </a:extLst>
+              </p:cNvPr>
+              <p:cNvCxnSpPr>
+                <a:cxnSpLocks/>
+                <a:stCxn id="32" idx="2"/>
+                <a:endCxn id="33" idx="3"/>
+              </p:cNvCxnSpPr>
+              <p:nvPr/>
+            </p:nvCxnSpPr>
+            <p:spPr>
+              <a:xfrm flipH="1">
+                <a:off x="1598846" y="5844117"/>
+                <a:ext cx="213007" cy="1"/>
+              </a:xfrm>
+              <a:prstGeom prst="straightConnector1">
+                <a:avLst/>
+              </a:prstGeom>
+              <a:ln w="28575">
+                <a:solidFill>
+                  <a:schemeClr val="tx1"/>
+                </a:solidFill>
+                <a:headEnd type="arrow" w="med" len="med"/>
+                <a:tailEnd type="none" w="med" len="med"/>
+              </a:ln>
+            </p:spPr>
+            <p:style>
+              <a:lnRef idx="1">
+                <a:schemeClr val="accent1"/>
+              </a:lnRef>
+              <a:fillRef idx="0">
+                <a:schemeClr val="accent1"/>
+              </a:fillRef>
+              <a:effectRef idx="0">
+                <a:schemeClr val="accent1"/>
+              </a:effectRef>
+              <a:fontRef idx="minor">
+                <a:schemeClr val="tx1"/>
+              </a:fontRef>
+            </p:style>
+          </p:cxnSp>
+        </p:grpSp>
+        <p:cxnSp>
+          <p:nvCxnSpPr>
+            <p:cNvPr id="18" name="Straight Arrow Connector 17">
+              <a:extLst>
+                <a:ext uri="{FF2B5EF4-FFF2-40B4-BE49-F238E27FC236}">
+                  <a16:creationId xmlns:a16="http://schemas.microsoft.com/office/drawing/2014/main" id="{7F82D15A-E79D-4E4E-BB32-494DA8BDFC71}"/>
+                </a:ext>
+              </a:extLst>
+            </p:cNvPr>
+            <p:cNvCxnSpPr>
+              <a:cxnSpLocks/>
+              <a:stCxn id="41" idx="3"/>
+              <a:endCxn id="47" idx="0"/>
+            </p:cNvCxnSpPr>
+            <p:nvPr/>
+          </p:nvCxnSpPr>
+          <p:spPr>
+            <a:xfrm>
+              <a:off x="6229192" y="2096212"/>
+              <a:ext cx="1887874" cy="787530"/>
+            </a:xfrm>
+            <a:prstGeom prst="straightConnector1">
+              <a:avLst/>
+            </a:prstGeom>
+            <a:ln w="28575">
+              <a:solidFill>
+                <a:schemeClr val="tx1"/>
+              </a:solidFill>
+              <a:headEnd type="none" w="med" len="med"/>
+              <a:tailEnd type="arrow" w="lg" len="med"/>
+            </a:ln>
+          </p:spPr>
+          <p:style>
+            <a:lnRef idx="1">
+              <a:schemeClr val="accent1"/>
+            </a:lnRef>
+            <a:fillRef idx="0">
+              <a:schemeClr val="accent1"/>
+            </a:fillRef>
+            <a:effectRef idx="0">
+              <a:schemeClr val="accent1"/>
+            </a:effectRef>
+            <a:fontRef idx="minor">
+              <a:schemeClr val="tx1"/>
+            </a:fontRef>
+          </p:style>
+        </p:cxnSp>
+        <p:cxnSp>
+          <p:nvCxnSpPr>
+            <p:cNvPr id="69" name="Straight Arrow Connector 68">
+              <a:extLst>
+                <a:ext uri="{FF2B5EF4-FFF2-40B4-BE49-F238E27FC236}">
+                  <a16:creationId xmlns:a16="http://schemas.microsoft.com/office/drawing/2014/main" id="{4E98CE7B-3471-D846-887C-7814048E6FE7}"/>
+                </a:ext>
+              </a:extLst>
+            </p:cNvPr>
+            <p:cNvCxnSpPr>
+              <a:cxnSpLocks/>
+              <a:stCxn id="41" idx="2"/>
+              <a:endCxn id="30" idx="0"/>
+            </p:cNvCxnSpPr>
+            <p:nvPr/>
+          </p:nvCxnSpPr>
+          <p:spPr>
+            <a:xfrm>
+              <a:off x="4826766" y="2746573"/>
+              <a:ext cx="1" cy="1555924"/>
+            </a:xfrm>
+            <a:prstGeom prst="straightConnector1">
+              <a:avLst/>
+            </a:prstGeom>
+            <a:ln w="28575">
+              <a:solidFill>
+                <a:schemeClr val="tx1"/>
+              </a:solidFill>
+              <a:headEnd type="none" w="med" len="med"/>
+              <a:tailEnd type="arrow" w="lg" len="med"/>
+            </a:ln>
+          </p:spPr>
+          <p:style>
+            <a:lnRef idx="1">
+              <a:schemeClr val="accent1"/>
+            </a:lnRef>
+            <a:fillRef idx="0">
+              <a:schemeClr val="accent1"/>
+            </a:fillRef>
+            <a:effectRef idx="0">
+              <a:schemeClr val="accent1"/>
+            </a:effectRef>
+            <a:fontRef idx="minor">
+              <a:schemeClr val="tx1"/>
+            </a:fontRef>
+          </p:style>
+        </p:cxnSp>
+        <p:cxnSp>
+          <p:nvCxnSpPr>
+            <p:cNvPr id="114" name="Straight Arrow Connector 113">
+              <a:extLst>
+                <a:ext uri="{FF2B5EF4-FFF2-40B4-BE49-F238E27FC236}">
+                  <a16:creationId xmlns:a16="http://schemas.microsoft.com/office/drawing/2014/main" id="{C054957D-7261-A240-8612-78AE11DCF5F3}"/>
+                </a:ext>
+              </a:extLst>
+            </p:cNvPr>
+            <p:cNvCxnSpPr>
+              <a:cxnSpLocks/>
+              <a:stCxn id="47" idx="2"/>
+              <a:endCxn id="30" idx="3"/>
+            </p:cNvCxnSpPr>
+            <p:nvPr/>
+          </p:nvCxnSpPr>
+          <p:spPr>
+            <a:xfrm flipH="1">
+              <a:off x="6229193" y="4184465"/>
+              <a:ext cx="1887873" cy="604534"/>
+            </a:xfrm>
+            <a:prstGeom prst="straightConnector1">
+              <a:avLst/>
+            </a:prstGeom>
+            <a:ln w="28575">
+              <a:solidFill>
+                <a:schemeClr val="tx1"/>
+              </a:solidFill>
+              <a:headEnd type="none" w="med" len="med"/>
+              <a:tailEnd type="arrow" w="lg" len="med"/>
+            </a:ln>
+          </p:spPr>
+          <p:style>
+            <a:lnRef idx="1">
+              <a:schemeClr val="accent1"/>
+            </a:lnRef>
+            <a:fillRef idx="0">
+              <a:schemeClr val="accent1"/>
+            </a:fillRef>
+            <a:effectRef idx="0">
+              <a:schemeClr val="accent1"/>
+            </a:effectRef>
+            <a:fontRef idx="minor">
+              <a:schemeClr val="tx1"/>
+            </a:fontRef>
+          </p:style>
+        </p:cxnSp>
+      </p:grpSp>
+      <p:sp>
+        <p:nvSpPr>
+          <p:cNvPr id="73" name="TextBox 72">
+            <a:extLst>
+              <a:ext uri="{FF2B5EF4-FFF2-40B4-BE49-F238E27FC236}">
+                <a16:creationId xmlns:a16="http://schemas.microsoft.com/office/drawing/2014/main" id="{C847FC8B-EED6-B244-A39B-E53A58FFE3D0}"/>
+              </a:ext>
+            </a:extLst>
+          </p:cNvPr>
+          <p:cNvSpPr txBox="1"/>
+          <p:nvPr/>
+        </p:nvSpPr>
+        <p:spPr>
+          <a:xfrm>
+            <a:off x="6657700" y="4549742"/>
+            <a:ext cx="837051" cy="430887"/>
+          </a:xfrm>
+          <a:prstGeom prst="rect">
+            <a:avLst/>
+          </a:prstGeom>
+          <a:noFill/>
+        </p:spPr>
+        <p:txBody>
+          <a:bodyPr wrap="square" rtlCol="0">
+            <a:spAutoFit/>
+          </a:bodyPr>
+          <a:lstStyle/>
+          <a:p>
+            <a:r>
+              <a:rPr lang="en-US" sz="2200" b="1" dirty="0">
+                <a:solidFill>
+                  <a:srgbClr val="00A310"/>
+                </a:solidFill>
+              </a:rPr>
+              <a:t>0.38</a:t>
+            </a:r>
+          </a:p>
+        </p:txBody>
+      </p:sp>
+      <p:sp>
+        <p:nvSpPr>
+          <p:cNvPr id="78" name="TextBox 77">
+            <a:extLst>
+              <a:ext uri="{FF2B5EF4-FFF2-40B4-BE49-F238E27FC236}">
+                <a16:creationId xmlns:a16="http://schemas.microsoft.com/office/drawing/2014/main" id="{B6F8AD41-5720-634D-AD9C-756CF8F947FE}"/>
+              </a:ext>
+            </a:extLst>
+          </p:cNvPr>
+          <p:cNvSpPr txBox="1"/>
+          <p:nvPr/>
+        </p:nvSpPr>
+        <p:spPr>
+          <a:xfrm>
+            <a:off x="3791614" y="3394554"/>
+            <a:ext cx="837051" cy="430887"/>
+          </a:xfrm>
+          <a:prstGeom prst="rect">
+            <a:avLst/>
+          </a:prstGeom>
+          <a:noFill/>
+        </p:spPr>
+        <p:txBody>
+          <a:bodyPr wrap="square" rtlCol="0">
+            <a:spAutoFit/>
+          </a:bodyPr>
+          <a:lstStyle/>
+          <a:p>
+            <a:r>
+              <a:rPr lang="en-US" sz="2200" b="1" dirty="0">
+                <a:solidFill>
+                  <a:srgbClr val="00A310"/>
+                </a:solidFill>
+              </a:rPr>
+              <a:t>0.06</a:t>
+            </a:r>
+          </a:p>
+        </p:txBody>
+      </p:sp>
+      <p:sp>
+        <p:nvSpPr>
+          <p:cNvPr id="79" name="TextBox 78">
+            <a:extLst>
+              <a:ext uri="{FF2B5EF4-FFF2-40B4-BE49-F238E27FC236}">
+                <a16:creationId xmlns:a16="http://schemas.microsoft.com/office/drawing/2014/main" id="{F9967E42-56D6-8743-BA38-14E6CB5A270A}"/>
+              </a:ext>
+            </a:extLst>
+          </p:cNvPr>
+          <p:cNvSpPr txBox="1"/>
+          <p:nvPr/>
+        </p:nvSpPr>
+        <p:spPr>
+          <a:xfrm>
+            <a:off x="6574216" y="2156123"/>
+            <a:ext cx="837051" cy="430887"/>
+          </a:xfrm>
+          <a:prstGeom prst="rect">
+            <a:avLst/>
+          </a:prstGeom>
+          <a:noFill/>
+        </p:spPr>
+        <p:txBody>
+          <a:bodyPr wrap="square" rtlCol="0">
+            <a:spAutoFit/>
+          </a:bodyPr>
+          <a:lstStyle/>
+          <a:p>
+            <a:r>
+              <a:rPr lang="en-US" sz="2200" b="1" dirty="0">
+                <a:solidFill>
+                  <a:srgbClr val="00A310"/>
+                </a:solidFill>
+              </a:rPr>
+              <a:t>0.20</a:t>
+            </a:r>
+          </a:p>
+        </p:txBody>
+      </p:sp>
+    </p:spTree>
+    <p:extLst>
+      <p:ext uri="{BB962C8B-B14F-4D97-AF65-F5344CB8AC3E}">
+        <p14:creationId xmlns:p14="http://schemas.microsoft.com/office/powerpoint/2010/main" val="2838465421"/>
+      </p:ext>
+    </p:extLst>
+  </p:cSld>
+  <p:clrMapOvr>
+    <a:masterClrMapping/>
+  </p:clrMapOvr>
+</p:sld>
+</file>
+
 <file path=ppt/theme/theme1.xml><?xml version="1.0" encoding="utf-8"?>
 <a:theme xmlns:a="http://schemas.openxmlformats.org/drawingml/2006/main" name="Office Theme">
   <a:themeElements>

</xml_diff>

<commit_message>
Updated figures and text, pre-comments from Kyle
</commit_message>
<xml_diff>
--- a/analysis/sem_path_diag/sem_paths.pptx
+++ b/analysis/sem_path_diag/sem_paths.pptx
@@ -8,8 +8,9 @@
     <p:sldId id="267" r:id="rId2"/>
     <p:sldId id="268" r:id="rId3"/>
     <p:sldId id="271" r:id="rId4"/>
-    <p:sldId id="272" r:id="rId5"/>
-    <p:sldId id="270" r:id="rId6"/>
+    <p:sldId id="273" r:id="rId5"/>
+    <p:sldId id="272" r:id="rId6"/>
+    <p:sldId id="270" r:id="rId7"/>
   </p:sldIdLst>
   <p:sldSz cx="12192000" cy="6858000"/>
   <p:notesSz cx="6858000" cy="9144000"/>
@@ -265,7 +266,7 @@
           <a:p>
             <a:fld id="{4F3B5105-D1A0-CF43-B5B5-26FA087694BC}" type="datetimeFigureOut">
               <a:rPr lang="en-US" smtClean="0"/>
-              <a:t>10/25/19</a:t>
+              <a:t>11/4/19</a:t>
             </a:fld>
             <a:endParaRPr lang="en-US"/>
           </a:p>
@@ -465,7 +466,7 @@
           <a:p>
             <a:fld id="{4F3B5105-D1A0-CF43-B5B5-26FA087694BC}" type="datetimeFigureOut">
               <a:rPr lang="en-US" smtClean="0"/>
-              <a:t>10/25/19</a:t>
+              <a:t>11/4/19</a:t>
             </a:fld>
             <a:endParaRPr lang="en-US"/>
           </a:p>
@@ -675,7 +676,7 @@
           <a:p>
             <a:fld id="{4F3B5105-D1A0-CF43-B5B5-26FA087694BC}" type="datetimeFigureOut">
               <a:rPr lang="en-US" smtClean="0"/>
-              <a:t>10/25/19</a:t>
+              <a:t>11/4/19</a:t>
             </a:fld>
             <a:endParaRPr lang="en-US"/>
           </a:p>
@@ -875,7 +876,7 @@
           <a:p>
             <a:fld id="{4F3B5105-D1A0-CF43-B5B5-26FA087694BC}" type="datetimeFigureOut">
               <a:rPr lang="en-US" smtClean="0"/>
-              <a:t>10/25/19</a:t>
+              <a:t>11/4/19</a:t>
             </a:fld>
             <a:endParaRPr lang="en-US"/>
           </a:p>
@@ -1151,7 +1152,7 @@
           <a:p>
             <a:fld id="{4F3B5105-D1A0-CF43-B5B5-26FA087694BC}" type="datetimeFigureOut">
               <a:rPr lang="en-US" smtClean="0"/>
-              <a:t>10/25/19</a:t>
+              <a:t>11/4/19</a:t>
             </a:fld>
             <a:endParaRPr lang="en-US"/>
           </a:p>
@@ -1419,7 +1420,7 @@
           <a:p>
             <a:fld id="{4F3B5105-D1A0-CF43-B5B5-26FA087694BC}" type="datetimeFigureOut">
               <a:rPr lang="en-US" smtClean="0"/>
-              <a:t>10/25/19</a:t>
+              <a:t>11/4/19</a:t>
             </a:fld>
             <a:endParaRPr lang="en-US"/>
           </a:p>
@@ -1834,7 +1835,7 @@
           <a:p>
             <a:fld id="{4F3B5105-D1A0-CF43-B5B5-26FA087694BC}" type="datetimeFigureOut">
               <a:rPr lang="en-US" smtClean="0"/>
-              <a:t>10/25/19</a:t>
+              <a:t>11/4/19</a:t>
             </a:fld>
             <a:endParaRPr lang="en-US"/>
           </a:p>
@@ -1976,7 +1977,7 @@
           <a:p>
             <a:fld id="{4F3B5105-D1A0-CF43-B5B5-26FA087694BC}" type="datetimeFigureOut">
               <a:rPr lang="en-US" smtClean="0"/>
-              <a:t>10/25/19</a:t>
+              <a:t>11/4/19</a:t>
             </a:fld>
             <a:endParaRPr lang="en-US"/>
           </a:p>
@@ -2089,7 +2090,7 @@
           <a:p>
             <a:fld id="{4F3B5105-D1A0-CF43-B5B5-26FA087694BC}" type="datetimeFigureOut">
               <a:rPr lang="en-US" smtClean="0"/>
-              <a:t>10/25/19</a:t>
+              <a:t>11/4/19</a:t>
             </a:fld>
             <a:endParaRPr lang="en-US"/>
           </a:p>
@@ -2402,7 +2403,7 @@
           <a:p>
             <a:fld id="{4F3B5105-D1A0-CF43-B5B5-26FA087694BC}" type="datetimeFigureOut">
               <a:rPr lang="en-US" smtClean="0"/>
-              <a:t>10/25/19</a:t>
+              <a:t>11/4/19</a:t>
             </a:fld>
             <a:endParaRPr lang="en-US"/>
           </a:p>
@@ -2691,7 +2692,7 @@
           <a:p>
             <a:fld id="{4F3B5105-D1A0-CF43-B5B5-26FA087694BC}" type="datetimeFigureOut">
               <a:rPr lang="en-US" smtClean="0"/>
-              <a:t>10/25/19</a:t>
+              <a:t>11/4/19</a:t>
             </a:fld>
             <a:endParaRPr lang="en-US"/>
           </a:p>
@@ -2934,7 +2935,7 @@
           <a:p>
             <a:fld id="{4F3B5105-D1A0-CF43-B5B5-26FA087694BC}" type="datetimeFigureOut">
               <a:rPr lang="en-US" smtClean="0"/>
-              <a:t>10/25/19</a:t>
+              <a:t>11/4/19</a:t>
             </a:fld>
             <a:endParaRPr lang="en-US"/>
           </a:p>
@@ -12810,6 +12811,3149 @@
       </p:grpSpPr>
       <p:sp>
         <p:nvSpPr>
+          <p:cNvPr id="54" name="Rounded Rectangle 53">
+            <a:extLst>
+              <a:ext uri="{FF2B5EF4-FFF2-40B4-BE49-F238E27FC236}">
+                <a16:creationId xmlns:a16="http://schemas.microsoft.com/office/drawing/2014/main" id="{8B3AC3D6-1630-8542-8A0F-4D325622F275}"/>
+              </a:ext>
+            </a:extLst>
+          </p:cNvPr>
+          <p:cNvSpPr/>
+          <p:nvPr/>
+        </p:nvSpPr>
+        <p:spPr>
+          <a:xfrm>
+            <a:off x="1029904" y="856359"/>
+            <a:ext cx="2804853" cy="2866419"/>
+          </a:xfrm>
+          <a:prstGeom prst="roundRect">
+            <a:avLst/>
+          </a:prstGeom>
+          <a:solidFill>
+            <a:srgbClr val="E7786B"/>
+          </a:solidFill>
+          <a:ln w="19050">
+            <a:solidFill>
+              <a:schemeClr val="tx1"/>
+            </a:solidFill>
+            <a:prstDash val="solid"/>
+          </a:ln>
+        </p:spPr>
+        <p:style>
+          <a:lnRef idx="2">
+            <a:schemeClr val="accent1">
+              <a:shade val="50000"/>
+            </a:schemeClr>
+          </a:lnRef>
+          <a:fillRef idx="1">
+            <a:schemeClr val="accent1"/>
+          </a:fillRef>
+          <a:effectRef idx="0">
+            <a:schemeClr val="accent1"/>
+          </a:effectRef>
+          <a:fontRef idx="minor">
+            <a:schemeClr val="lt1"/>
+          </a:fontRef>
+        </p:style>
+        <p:txBody>
+          <a:bodyPr rot="0" spcFirstLastPara="0" vertOverflow="overflow" horzOverflow="overflow" vert="horz" wrap="square" lIns="49770" tIns="24885" rIns="49770" bIns="24885" numCol="1" spcCol="0" rtlCol="0" fromWordArt="0" anchor="ctr" anchorCtr="0" forceAA="0" compatLnSpc="1">
+            <a:prstTxWarp prst="textNoShape">
+              <a:avLst/>
+            </a:prstTxWarp>
+            <a:noAutofit/>
+          </a:bodyPr>
+          <a:lstStyle/>
+          <a:p>
+            <a:pPr algn="ctr"/>
+            <a:endParaRPr lang="en-US" sz="980">
+              <a:solidFill>
+                <a:schemeClr val="tx1"/>
+              </a:solidFill>
+            </a:endParaRPr>
+          </a:p>
+        </p:txBody>
+      </p:sp>
+      <p:sp>
+        <p:nvSpPr>
+          <p:cNvPr id="2" name="Snip Same-side Corner of Rectangle 1">
+            <a:extLst>
+              <a:ext uri="{FF2B5EF4-FFF2-40B4-BE49-F238E27FC236}">
+                <a16:creationId xmlns:a16="http://schemas.microsoft.com/office/drawing/2014/main" id="{AC4F4451-B7C6-0C41-9806-BE968F68D102}"/>
+              </a:ext>
+            </a:extLst>
+          </p:cNvPr>
+          <p:cNvSpPr/>
+          <p:nvPr/>
+        </p:nvSpPr>
+        <p:spPr>
+          <a:xfrm rot="16200000">
+            <a:off x="5982893" y="291391"/>
+            <a:ext cx="3563720" cy="6794688"/>
+          </a:xfrm>
+          <a:prstGeom prst="snip2SameRect">
+            <a:avLst>
+              <a:gd name="adj1" fmla="val 33965"/>
+              <a:gd name="adj2" fmla="val 0"/>
+            </a:avLst>
+          </a:prstGeom>
+          <a:solidFill>
+            <a:schemeClr val="accent2">
+              <a:lumMod val="75000"/>
+              <a:alpha val="9804"/>
+            </a:schemeClr>
+          </a:solidFill>
+          <a:ln>
+            <a:solidFill>
+              <a:schemeClr val="tx1"/>
+            </a:solidFill>
+            <a:prstDash val="lgDash"/>
+            <a:extLst>
+              <a:ext uri="{C807C97D-BFC1-408E-A445-0C87EB9F89A2}">
+                <ask:lineSketchStyleProps xmlns:ask="http://schemas.microsoft.com/office/drawing/2018/sketchyshapes" sd="1752145456">
+                  <a:custGeom>
+                    <a:avLst/>
+                    <a:gdLst>
+                      <a:gd name="connsiteX0" fmla="*/ 1210417 w 3563720"/>
+                      <a:gd name="connsiteY0" fmla="*/ 0 h 6794688"/>
+                      <a:gd name="connsiteX1" fmla="*/ 1804718 w 3563720"/>
+                      <a:gd name="connsiteY1" fmla="*/ 0 h 6794688"/>
+                      <a:gd name="connsiteX2" fmla="*/ 2353303 w 3563720"/>
+                      <a:gd name="connsiteY2" fmla="*/ 0 h 6794688"/>
+                      <a:gd name="connsiteX3" fmla="*/ 2744671 w 3563720"/>
+                      <a:gd name="connsiteY3" fmla="*/ 391368 h 6794688"/>
+                      <a:gd name="connsiteX4" fmla="*/ 3136039 w 3563720"/>
+                      <a:gd name="connsiteY4" fmla="*/ 782736 h 6794688"/>
+                      <a:gd name="connsiteX5" fmla="*/ 3563720 w 3563720"/>
+                      <a:gd name="connsiteY5" fmla="*/ 1210417 h 6794688"/>
+                      <a:gd name="connsiteX6" fmla="*/ 3563720 w 3563720"/>
+                      <a:gd name="connsiteY6" fmla="*/ 1601316 h 6794688"/>
+                      <a:gd name="connsiteX7" fmla="*/ 3563720 w 3563720"/>
+                      <a:gd name="connsiteY7" fmla="*/ 2215586 h 6794688"/>
+                      <a:gd name="connsiteX8" fmla="*/ 3563720 w 3563720"/>
+                      <a:gd name="connsiteY8" fmla="*/ 2662327 h 6794688"/>
+                      <a:gd name="connsiteX9" fmla="*/ 3563720 w 3563720"/>
+                      <a:gd name="connsiteY9" fmla="*/ 3109069 h 6794688"/>
+                      <a:gd name="connsiteX10" fmla="*/ 3563720 w 3563720"/>
+                      <a:gd name="connsiteY10" fmla="*/ 3611654 h 6794688"/>
+                      <a:gd name="connsiteX11" fmla="*/ 3563720 w 3563720"/>
+                      <a:gd name="connsiteY11" fmla="*/ 4058395 h 6794688"/>
+                      <a:gd name="connsiteX12" fmla="*/ 3563720 w 3563720"/>
+                      <a:gd name="connsiteY12" fmla="*/ 4505137 h 6794688"/>
+                      <a:gd name="connsiteX13" fmla="*/ 3563720 w 3563720"/>
+                      <a:gd name="connsiteY13" fmla="*/ 5119407 h 6794688"/>
+                      <a:gd name="connsiteX14" fmla="*/ 3563720 w 3563720"/>
+                      <a:gd name="connsiteY14" fmla="*/ 5733677 h 6794688"/>
+                      <a:gd name="connsiteX15" fmla="*/ 3563720 w 3563720"/>
+                      <a:gd name="connsiteY15" fmla="*/ 6794688 h 6794688"/>
+                      <a:gd name="connsiteX16" fmla="*/ 3563720 w 3563720"/>
+                      <a:gd name="connsiteY16" fmla="*/ 6794688 h 6794688"/>
+                      <a:gd name="connsiteX17" fmla="*/ 2934129 w 3563720"/>
+                      <a:gd name="connsiteY17" fmla="*/ 6794688 h 6794688"/>
+                      <a:gd name="connsiteX18" fmla="*/ 2340176 w 3563720"/>
+                      <a:gd name="connsiteY18" fmla="*/ 6794688 h 6794688"/>
+                      <a:gd name="connsiteX19" fmla="*/ 1781860 w 3563720"/>
+                      <a:gd name="connsiteY19" fmla="*/ 6794688 h 6794688"/>
+                      <a:gd name="connsiteX20" fmla="*/ 1294818 w 3563720"/>
+                      <a:gd name="connsiteY20" fmla="*/ 6794688 h 6794688"/>
+                      <a:gd name="connsiteX21" fmla="*/ 772139 w 3563720"/>
+                      <a:gd name="connsiteY21" fmla="*/ 6794688 h 6794688"/>
+                      <a:gd name="connsiteX22" fmla="*/ 0 w 3563720"/>
+                      <a:gd name="connsiteY22" fmla="*/ 6794688 h 6794688"/>
+                      <a:gd name="connsiteX23" fmla="*/ 0 w 3563720"/>
+                      <a:gd name="connsiteY23" fmla="*/ 6794688 h 6794688"/>
+                      <a:gd name="connsiteX24" fmla="*/ 0 w 3563720"/>
+                      <a:gd name="connsiteY24" fmla="*/ 6292104 h 6794688"/>
+                      <a:gd name="connsiteX25" fmla="*/ 0 w 3563720"/>
+                      <a:gd name="connsiteY25" fmla="*/ 5901205 h 6794688"/>
+                      <a:gd name="connsiteX26" fmla="*/ 0 w 3563720"/>
+                      <a:gd name="connsiteY26" fmla="*/ 5342778 h 6794688"/>
+                      <a:gd name="connsiteX27" fmla="*/ 0 w 3563720"/>
+                      <a:gd name="connsiteY27" fmla="*/ 4840193 h 6794688"/>
+                      <a:gd name="connsiteX28" fmla="*/ 0 w 3563720"/>
+                      <a:gd name="connsiteY28" fmla="*/ 4449294 h 6794688"/>
+                      <a:gd name="connsiteX29" fmla="*/ 0 w 3563720"/>
+                      <a:gd name="connsiteY29" fmla="*/ 3946710 h 6794688"/>
+                      <a:gd name="connsiteX30" fmla="*/ 0 w 3563720"/>
+                      <a:gd name="connsiteY30" fmla="*/ 3332440 h 6794688"/>
+                      <a:gd name="connsiteX31" fmla="*/ 0 w 3563720"/>
+                      <a:gd name="connsiteY31" fmla="*/ 2718170 h 6794688"/>
+                      <a:gd name="connsiteX32" fmla="*/ 0 w 3563720"/>
+                      <a:gd name="connsiteY32" fmla="*/ 2215586 h 6794688"/>
+                      <a:gd name="connsiteX33" fmla="*/ 0 w 3563720"/>
+                      <a:gd name="connsiteY33" fmla="*/ 1824687 h 6794688"/>
+                      <a:gd name="connsiteX34" fmla="*/ 0 w 3563720"/>
+                      <a:gd name="connsiteY34" fmla="*/ 1210417 h 6794688"/>
+                      <a:gd name="connsiteX35" fmla="*/ 379264 w 3563720"/>
+                      <a:gd name="connsiteY35" fmla="*/ 831153 h 6794688"/>
+                      <a:gd name="connsiteX36" fmla="*/ 782736 w 3563720"/>
+                      <a:gd name="connsiteY36" fmla="*/ 427681 h 6794688"/>
+                      <a:gd name="connsiteX37" fmla="*/ 1210417 w 3563720"/>
+                      <a:gd name="connsiteY37" fmla="*/ 0 h 6794688"/>
+                    </a:gdLst>
+                    <a:ahLst/>
+                    <a:cxnLst>
+                      <a:cxn ang="0">
+                        <a:pos x="connsiteX0" y="connsiteY0"/>
+                      </a:cxn>
+                      <a:cxn ang="0">
+                        <a:pos x="connsiteX1" y="connsiteY1"/>
+                      </a:cxn>
+                      <a:cxn ang="0">
+                        <a:pos x="connsiteX2" y="connsiteY2"/>
+                      </a:cxn>
+                      <a:cxn ang="0">
+                        <a:pos x="connsiteX3" y="connsiteY3"/>
+                      </a:cxn>
+                      <a:cxn ang="0">
+                        <a:pos x="connsiteX4" y="connsiteY4"/>
+                      </a:cxn>
+                      <a:cxn ang="0">
+                        <a:pos x="connsiteX5" y="connsiteY5"/>
+                      </a:cxn>
+                      <a:cxn ang="0">
+                        <a:pos x="connsiteX6" y="connsiteY6"/>
+                      </a:cxn>
+                      <a:cxn ang="0">
+                        <a:pos x="connsiteX7" y="connsiteY7"/>
+                      </a:cxn>
+                      <a:cxn ang="0">
+                        <a:pos x="connsiteX8" y="connsiteY8"/>
+                      </a:cxn>
+                      <a:cxn ang="0">
+                        <a:pos x="connsiteX9" y="connsiteY9"/>
+                      </a:cxn>
+                      <a:cxn ang="0">
+                        <a:pos x="connsiteX10" y="connsiteY10"/>
+                      </a:cxn>
+                      <a:cxn ang="0">
+                        <a:pos x="connsiteX11" y="connsiteY11"/>
+                      </a:cxn>
+                      <a:cxn ang="0">
+                        <a:pos x="connsiteX12" y="connsiteY12"/>
+                      </a:cxn>
+                      <a:cxn ang="0">
+                        <a:pos x="connsiteX13" y="connsiteY13"/>
+                      </a:cxn>
+                      <a:cxn ang="0">
+                        <a:pos x="connsiteX14" y="connsiteY14"/>
+                      </a:cxn>
+                      <a:cxn ang="0">
+                        <a:pos x="connsiteX15" y="connsiteY15"/>
+                      </a:cxn>
+                      <a:cxn ang="0">
+                        <a:pos x="connsiteX16" y="connsiteY16"/>
+                      </a:cxn>
+                      <a:cxn ang="0">
+                        <a:pos x="connsiteX17" y="connsiteY17"/>
+                      </a:cxn>
+                      <a:cxn ang="0">
+                        <a:pos x="connsiteX18" y="connsiteY18"/>
+                      </a:cxn>
+                      <a:cxn ang="0">
+                        <a:pos x="connsiteX19" y="connsiteY19"/>
+                      </a:cxn>
+                      <a:cxn ang="0">
+                        <a:pos x="connsiteX20" y="connsiteY20"/>
+                      </a:cxn>
+                      <a:cxn ang="0">
+                        <a:pos x="connsiteX21" y="connsiteY21"/>
+                      </a:cxn>
+                      <a:cxn ang="0">
+                        <a:pos x="connsiteX22" y="connsiteY22"/>
+                      </a:cxn>
+                      <a:cxn ang="0">
+                        <a:pos x="connsiteX23" y="connsiteY23"/>
+                      </a:cxn>
+                      <a:cxn ang="0">
+                        <a:pos x="connsiteX24" y="connsiteY24"/>
+                      </a:cxn>
+                      <a:cxn ang="0">
+                        <a:pos x="connsiteX25" y="connsiteY25"/>
+                      </a:cxn>
+                      <a:cxn ang="0">
+                        <a:pos x="connsiteX26" y="connsiteY26"/>
+                      </a:cxn>
+                      <a:cxn ang="0">
+                        <a:pos x="connsiteX27" y="connsiteY27"/>
+                      </a:cxn>
+                      <a:cxn ang="0">
+                        <a:pos x="connsiteX28" y="connsiteY28"/>
+                      </a:cxn>
+                      <a:cxn ang="0">
+                        <a:pos x="connsiteX29" y="connsiteY29"/>
+                      </a:cxn>
+                      <a:cxn ang="0">
+                        <a:pos x="connsiteX30" y="connsiteY30"/>
+                      </a:cxn>
+                      <a:cxn ang="0">
+                        <a:pos x="connsiteX31" y="connsiteY31"/>
+                      </a:cxn>
+                      <a:cxn ang="0">
+                        <a:pos x="connsiteX32" y="connsiteY32"/>
+                      </a:cxn>
+                      <a:cxn ang="0">
+                        <a:pos x="connsiteX33" y="connsiteY33"/>
+                      </a:cxn>
+                      <a:cxn ang="0">
+                        <a:pos x="connsiteX34" y="connsiteY34"/>
+                      </a:cxn>
+                      <a:cxn ang="0">
+                        <a:pos x="connsiteX35" y="connsiteY35"/>
+                      </a:cxn>
+                      <a:cxn ang="0">
+                        <a:pos x="connsiteX36" y="connsiteY36"/>
+                      </a:cxn>
+                      <a:cxn ang="0">
+                        <a:pos x="connsiteX37" y="connsiteY37"/>
+                      </a:cxn>
+                    </a:cxnLst>
+                    <a:rect l="l" t="t" r="r" b="b"/>
+                    <a:pathLst>
+                      <a:path w="3563720" h="6794688" fill="none" extrusionOk="0">
+                        <a:moveTo>
+                          <a:pt x="1210417" y="0"/>
+                        </a:moveTo>
+                        <a:cubicBezTo>
+                          <a:pt x="1462822" y="-64159"/>
+                          <a:pt x="1600090" y="66766"/>
+                          <a:pt x="1804718" y="0"/>
+                        </a:cubicBezTo>
+                        <a:cubicBezTo>
+                          <a:pt x="2009346" y="-66766"/>
+                          <a:pt x="2241556" y="1182"/>
+                          <a:pt x="2353303" y="0"/>
+                        </a:cubicBezTo>
+                        <a:cubicBezTo>
+                          <a:pt x="2498370" y="56521"/>
+                          <a:pt x="2630850" y="318756"/>
+                          <a:pt x="2744671" y="391368"/>
+                        </a:cubicBezTo>
+                        <a:cubicBezTo>
+                          <a:pt x="2858492" y="463980"/>
+                          <a:pt x="2985357" y="650646"/>
+                          <a:pt x="3136039" y="782736"/>
+                        </a:cubicBezTo>
+                        <a:cubicBezTo>
+                          <a:pt x="3286721" y="914826"/>
+                          <a:pt x="3451443" y="1113807"/>
+                          <a:pt x="3563720" y="1210417"/>
+                        </a:cubicBezTo>
+                        <a:cubicBezTo>
+                          <a:pt x="3567845" y="1383996"/>
+                          <a:pt x="3548912" y="1462997"/>
+                          <a:pt x="3563720" y="1601316"/>
+                        </a:cubicBezTo>
+                        <a:cubicBezTo>
+                          <a:pt x="3578528" y="1739635"/>
+                          <a:pt x="3547981" y="1953368"/>
+                          <a:pt x="3563720" y="2215586"/>
+                        </a:cubicBezTo>
+                        <a:cubicBezTo>
+                          <a:pt x="3579459" y="2477804"/>
+                          <a:pt x="3562564" y="2447935"/>
+                          <a:pt x="3563720" y="2662327"/>
+                        </a:cubicBezTo>
+                        <a:cubicBezTo>
+                          <a:pt x="3564876" y="2876719"/>
+                          <a:pt x="3534970" y="3014303"/>
+                          <a:pt x="3563720" y="3109069"/>
+                        </a:cubicBezTo>
+                        <a:cubicBezTo>
+                          <a:pt x="3592470" y="3203835"/>
+                          <a:pt x="3542248" y="3507534"/>
+                          <a:pt x="3563720" y="3611654"/>
+                        </a:cubicBezTo>
+                        <a:cubicBezTo>
+                          <a:pt x="3585192" y="3715775"/>
+                          <a:pt x="3551167" y="3911638"/>
+                          <a:pt x="3563720" y="4058395"/>
+                        </a:cubicBezTo>
+                        <a:cubicBezTo>
+                          <a:pt x="3576273" y="4205152"/>
+                          <a:pt x="3548093" y="4341377"/>
+                          <a:pt x="3563720" y="4505137"/>
+                        </a:cubicBezTo>
+                        <a:cubicBezTo>
+                          <a:pt x="3579347" y="4668897"/>
+                          <a:pt x="3531533" y="4984832"/>
+                          <a:pt x="3563720" y="5119407"/>
+                        </a:cubicBezTo>
+                        <a:cubicBezTo>
+                          <a:pt x="3595907" y="5253982"/>
+                          <a:pt x="3521110" y="5461469"/>
+                          <a:pt x="3563720" y="5733677"/>
+                        </a:cubicBezTo>
+                        <a:cubicBezTo>
+                          <a:pt x="3606330" y="6005885"/>
+                          <a:pt x="3507999" y="6496016"/>
+                          <a:pt x="3563720" y="6794688"/>
+                        </a:cubicBezTo>
+                        <a:lnTo>
+                          <a:pt x="3563720" y="6794688"/>
+                        </a:lnTo>
+                        <a:cubicBezTo>
+                          <a:pt x="3357651" y="6837771"/>
+                          <a:pt x="3116218" y="6737669"/>
+                          <a:pt x="2934129" y="6794688"/>
+                        </a:cubicBezTo>
+                        <a:cubicBezTo>
+                          <a:pt x="2752040" y="6851707"/>
+                          <a:pt x="2506260" y="6728115"/>
+                          <a:pt x="2340176" y="6794688"/>
+                        </a:cubicBezTo>
+                        <a:cubicBezTo>
+                          <a:pt x="2174092" y="6861261"/>
+                          <a:pt x="1903944" y="6731148"/>
+                          <a:pt x="1781860" y="6794688"/>
+                        </a:cubicBezTo>
+                        <a:cubicBezTo>
+                          <a:pt x="1659776" y="6858228"/>
+                          <a:pt x="1519315" y="6753015"/>
+                          <a:pt x="1294818" y="6794688"/>
+                        </a:cubicBezTo>
+                        <a:cubicBezTo>
+                          <a:pt x="1070321" y="6836361"/>
+                          <a:pt x="1025120" y="6777130"/>
+                          <a:pt x="772139" y="6794688"/>
+                        </a:cubicBezTo>
+                        <a:cubicBezTo>
+                          <a:pt x="519158" y="6812246"/>
+                          <a:pt x="217465" y="6790440"/>
+                          <a:pt x="0" y="6794688"/>
+                        </a:cubicBezTo>
+                        <a:lnTo>
+                          <a:pt x="0" y="6794688"/>
+                        </a:lnTo>
+                        <a:cubicBezTo>
+                          <a:pt x="-29293" y="6573535"/>
+                          <a:pt x="47677" y="6414631"/>
+                          <a:pt x="0" y="6292104"/>
+                        </a:cubicBezTo>
+                        <a:cubicBezTo>
+                          <a:pt x="-47677" y="6169577"/>
+                          <a:pt x="14071" y="6042565"/>
+                          <a:pt x="0" y="5901205"/>
+                        </a:cubicBezTo>
+                        <a:cubicBezTo>
+                          <a:pt x="-14071" y="5759845"/>
+                          <a:pt x="54366" y="5505516"/>
+                          <a:pt x="0" y="5342778"/>
+                        </a:cubicBezTo>
+                        <a:cubicBezTo>
+                          <a:pt x="-54366" y="5180040"/>
+                          <a:pt x="20451" y="5022613"/>
+                          <a:pt x="0" y="4840193"/>
+                        </a:cubicBezTo>
+                        <a:cubicBezTo>
+                          <a:pt x="-20451" y="4657774"/>
+                          <a:pt x="37331" y="4615737"/>
+                          <a:pt x="0" y="4449294"/>
+                        </a:cubicBezTo>
+                        <a:cubicBezTo>
+                          <a:pt x="-37331" y="4282851"/>
+                          <a:pt x="46197" y="4151512"/>
+                          <a:pt x="0" y="3946710"/>
+                        </a:cubicBezTo>
+                        <a:cubicBezTo>
+                          <a:pt x="-46197" y="3741908"/>
+                          <a:pt x="10984" y="3566378"/>
+                          <a:pt x="0" y="3332440"/>
+                        </a:cubicBezTo>
+                        <a:cubicBezTo>
+                          <a:pt x="-10984" y="3098502"/>
+                          <a:pt x="17294" y="2857343"/>
+                          <a:pt x="0" y="2718170"/>
+                        </a:cubicBezTo>
+                        <a:cubicBezTo>
+                          <a:pt x="-17294" y="2578997"/>
+                          <a:pt x="52680" y="2358386"/>
+                          <a:pt x="0" y="2215586"/>
+                        </a:cubicBezTo>
+                        <a:cubicBezTo>
+                          <a:pt x="-52680" y="2072786"/>
+                          <a:pt x="9217" y="1940411"/>
+                          <a:pt x="0" y="1824687"/>
+                        </a:cubicBezTo>
+                        <a:cubicBezTo>
+                          <a:pt x="-9217" y="1708963"/>
+                          <a:pt x="29434" y="1493194"/>
+                          <a:pt x="0" y="1210417"/>
+                        </a:cubicBezTo>
+                        <a:cubicBezTo>
+                          <a:pt x="151722" y="988449"/>
+                          <a:pt x="242131" y="1040516"/>
+                          <a:pt x="379264" y="831153"/>
+                        </a:cubicBezTo>
+                        <a:cubicBezTo>
+                          <a:pt x="516397" y="621790"/>
+                          <a:pt x="691355" y="586670"/>
+                          <a:pt x="782736" y="427681"/>
+                        </a:cubicBezTo>
+                        <a:cubicBezTo>
+                          <a:pt x="874117" y="268692"/>
+                          <a:pt x="1089951" y="173023"/>
+                          <a:pt x="1210417" y="0"/>
+                        </a:cubicBezTo>
+                        <a:close/>
+                      </a:path>
+                      <a:path w="3563720" h="6794688" stroke="0" extrusionOk="0">
+                        <a:moveTo>
+                          <a:pt x="1210417" y="0"/>
+                        </a:moveTo>
+                        <a:cubicBezTo>
+                          <a:pt x="1327705" y="-64062"/>
+                          <a:pt x="1632843" y="14452"/>
+                          <a:pt x="1781860" y="0"/>
+                        </a:cubicBezTo>
+                        <a:cubicBezTo>
+                          <a:pt x="1930877" y="-14452"/>
+                          <a:pt x="2163296" y="7912"/>
+                          <a:pt x="2353303" y="0"/>
+                        </a:cubicBezTo>
+                        <a:cubicBezTo>
+                          <a:pt x="2553253" y="155502"/>
+                          <a:pt x="2563695" y="245639"/>
+                          <a:pt x="2720463" y="367160"/>
+                        </a:cubicBezTo>
+                        <a:cubicBezTo>
+                          <a:pt x="2877231" y="488681"/>
+                          <a:pt x="2986957" y="666291"/>
+                          <a:pt x="3099727" y="746424"/>
+                        </a:cubicBezTo>
+                        <a:cubicBezTo>
+                          <a:pt x="3212497" y="826557"/>
+                          <a:pt x="3374750" y="1048478"/>
+                          <a:pt x="3563720" y="1210417"/>
+                        </a:cubicBezTo>
+                        <a:cubicBezTo>
+                          <a:pt x="3615972" y="1397076"/>
+                          <a:pt x="3546383" y="1744397"/>
+                          <a:pt x="3563720" y="1880530"/>
+                        </a:cubicBezTo>
+                        <a:cubicBezTo>
+                          <a:pt x="3581057" y="2016663"/>
+                          <a:pt x="3543583" y="2144197"/>
+                          <a:pt x="3563720" y="2327271"/>
+                        </a:cubicBezTo>
+                        <a:cubicBezTo>
+                          <a:pt x="3583857" y="2510345"/>
+                          <a:pt x="3505586" y="2792746"/>
+                          <a:pt x="3563720" y="2941541"/>
+                        </a:cubicBezTo>
+                        <a:cubicBezTo>
+                          <a:pt x="3621854" y="3090336"/>
+                          <a:pt x="3501283" y="3326684"/>
+                          <a:pt x="3563720" y="3555811"/>
+                        </a:cubicBezTo>
+                        <a:cubicBezTo>
+                          <a:pt x="3626157" y="3784938"/>
+                          <a:pt x="3532190" y="3940780"/>
+                          <a:pt x="3563720" y="4114238"/>
+                        </a:cubicBezTo>
+                        <a:cubicBezTo>
+                          <a:pt x="3595250" y="4287696"/>
+                          <a:pt x="3517460" y="4482808"/>
+                          <a:pt x="3563720" y="4728508"/>
+                        </a:cubicBezTo>
+                        <a:cubicBezTo>
+                          <a:pt x="3609980" y="4974208"/>
+                          <a:pt x="3534288" y="4999032"/>
+                          <a:pt x="3563720" y="5175249"/>
+                        </a:cubicBezTo>
+                        <a:cubicBezTo>
+                          <a:pt x="3593152" y="5351466"/>
+                          <a:pt x="3536250" y="5518150"/>
+                          <a:pt x="3563720" y="5789519"/>
+                        </a:cubicBezTo>
+                        <a:cubicBezTo>
+                          <a:pt x="3591190" y="6060888"/>
+                          <a:pt x="3502178" y="6551237"/>
+                          <a:pt x="3563720" y="6794688"/>
+                        </a:cubicBezTo>
+                        <a:lnTo>
+                          <a:pt x="3563720" y="6794688"/>
+                        </a:lnTo>
+                        <a:cubicBezTo>
+                          <a:pt x="3385429" y="6809644"/>
+                          <a:pt x="3159305" y="6746216"/>
+                          <a:pt x="3041041" y="6794688"/>
+                        </a:cubicBezTo>
+                        <a:cubicBezTo>
+                          <a:pt x="2922777" y="6843160"/>
+                          <a:pt x="2663743" y="6739709"/>
+                          <a:pt x="2375813" y="6794688"/>
+                        </a:cubicBezTo>
+                        <a:cubicBezTo>
+                          <a:pt x="2087883" y="6849667"/>
+                          <a:pt x="2060134" y="6783236"/>
+                          <a:pt x="1888772" y="6794688"/>
+                        </a:cubicBezTo>
+                        <a:cubicBezTo>
+                          <a:pt x="1717410" y="6806140"/>
+                          <a:pt x="1445127" y="6769514"/>
+                          <a:pt x="1223544" y="6794688"/>
+                        </a:cubicBezTo>
+                        <a:cubicBezTo>
+                          <a:pt x="1001961" y="6819862"/>
+                          <a:pt x="927023" y="6773109"/>
+                          <a:pt x="665228" y="6794688"/>
+                        </a:cubicBezTo>
+                        <a:cubicBezTo>
+                          <a:pt x="403433" y="6816267"/>
+                          <a:pt x="296126" y="6790228"/>
+                          <a:pt x="0" y="6794688"/>
+                        </a:cubicBezTo>
+                        <a:lnTo>
+                          <a:pt x="0" y="6794688"/>
+                        </a:lnTo>
+                        <a:cubicBezTo>
+                          <a:pt x="-26025" y="6583358"/>
+                          <a:pt x="63272" y="6340207"/>
+                          <a:pt x="0" y="6180418"/>
+                        </a:cubicBezTo>
+                        <a:cubicBezTo>
+                          <a:pt x="-63272" y="6020629"/>
+                          <a:pt x="40937" y="5918875"/>
+                          <a:pt x="0" y="5789519"/>
+                        </a:cubicBezTo>
+                        <a:cubicBezTo>
+                          <a:pt x="-40937" y="5660163"/>
+                          <a:pt x="62982" y="5256199"/>
+                          <a:pt x="0" y="5119407"/>
+                        </a:cubicBezTo>
+                        <a:cubicBezTo>
+                          <a:pt x="-62982" y="4982615"/>
+                          <a:pt x="30464" y="4830986"/>
+                          <a:pt x="0" y="4672665"/>
+                        </a:cubicBezTo>
+                        <a:cubicBezTo>
+                          <a:pt x="-30464" y="4514344"/>
+                          <a:pt x="25752" y="4356168"/>
+                          <a:pt x="0" y="4058395"/>
+                        </a:cubicBezTo>
+                        <a:cubicBezTo>
+                          <a:pt x="-25752" y="3760622"/>
+                          <a:pt x="43722" y="3673362"/>
+                          <a:pt x="0" y="3555811"/>
+                        </a:cubicBezTo>
+                        <a:cubicBezTo>
+                          <a:pt x="-43722" y="3438260"/>
+                          <a:pt x="63141" y="3198265"/>
+                          <a:pt x="0" y="2997384"/>
+                        </a:cubicBezTo>
+                        <a:cubicBezTo>
+                          <a:pt x="-63141" y="2796503"/>
+                          <a:pt x="41760" y="2760338"/>
+                          <a:pt x="0" y="2606485"/>
+                        </a:cubicBezTo>
+                        <a:cubicBezTo>
+                          <a:pt x="-41760" y="2452632"/>
+                          <a:pt x="7953" y="2316316"/>
+                          <a:pt x="0" y="2159743"/>
+                        </a:cubicBezTo>
+                        <a:cubicBezTo>
+                          <a:pt x="-7953" y="2003170"/>
+                          <a:pt x="45757" y="1913750"/>
+                          <a:pt x="0" y="1768844"/>
+                        </a:cubicBezTo>
+                        <a:cubicBezTo>
+                          <a:pt x="-45757" y="1623938"/>
+                          <a:pt x="40617" y="1346889"/>
+                          <a:pt x="0" y="1210417"/>
+                        </a:cubicBezTo>
+                        <a:cubicBezTo>
+                          <a:pt x="136336" y="1015915"/>
+                          <a:pt x="276028" y="934769"/>
+                          <a:pt x="367160" y="843257"/>
+                        </a:cubicBezTo>
+                        <a:cubicBezTo>
+                          <a:pt x="458292" y="751745"/>
+                          <a:pt x="719569" y="530587"/>
+                          <a:pt x="794840" y="415577"/>
+                        </a:cubicBezTo>
+                        <a:cubicBezTo>
+                          <a:pt x="870111" y="300567"/>
+                          <a:pt x="1075887" y="198797"/>
+                          <a:pt x="1210417" y="0"/>
+                        </a:cubicBezTo>
+                        <a:close/>
+                      </a:path>
+                    </a:pathLst>
+                  </a:custGeom>
+                  <ask:type>
+                    <ask:lineSketchNone/>
+                  </ask:type>
+                </ask:lineSketchStyleProps>
+              </a:ext>
+            </a:extLst>
+          </a:ln>
+        </p:spPr>
+        <p:style>
+          <a:lnRef idx="2">
+            <a:schemeClr val="accent1">
+              <a:shade val="50000"/>
+            </a:schemeClr>
+          </a:lnRef>
+          <a:fillRef idx="1">
+            <a:schemeClr val="accent1"/>
+          </a:fillRef>
+          <a:effectRef idx="0">
+            <a:schemeClr val="accent1"/>
+          </a:effectRef>
+          <a:fontRef idx="minor">
+            <a:schemeClr val="lt1"/>
+          </a:fontRef>
+        </p:style>
+        <p:txBody>
+          <a:bodyPr rtlCol="0" anchor="ctr"/>
+          <a:lstStyle/>
+          <a:p>
+            <a:pPr algn="ctr"/>
+            <a:endParaRPr lang="en-US"/>
+          </a:p>
+        </p:txBody>
+      </p:sp>
+      <p:sp>
+        <p:nvSpPr>
+          <p:cNvPr id="47" name="Rounded Rectangle 46">
+            <a:extLst>
+              <a:ext uri="{FF2B5EF4-FFF2-40B4-BE49-F238E27FC236}">
+                <a16:creationId xmlns:a16="http://schemas.microsoft.com/office/drawing/2014/main" id="{51C65C30-983D-094E-BF16-32D1CA19F2F6}"/>
+              </a:ext>
+            </a:extLst>
+          </p:cNvPr>
+          <p:cNvSpPr/>
+          <p:nvPr/>
+        </p:nvSpPr>
+        <p:spPr>
+          <a:xfrm>
+            <a:off x="8171119" y="3925536"/>
+            <a:ext cx="2804853" cy="1300723"/>
+          </a:xfrm>
+          <a:prstGeom prst="roundRect">
+            <a:avLst/>
+          </a:prstGeom>
+          <a:solidFill>
+            <a:schemeClr val="accent4">
+              <a:lumMod val="60000"/>
+              <a:lumOff val="40000"/>
+            </a:schemeClr>
+          </a:solidFill>
+          <a:ln w="19050">
+            <a:solidFill>
+              <a:schemeClr val="tx1"/>
+            </a:solidFill>
+            <a:prstDash val="solid"/>
+          </a:ln>
+        </p:spPr>
+        <p:style>
+          <a:lnRef idx="2">
+            <a:schemeClr val="accent1">
+              <a:shade val="50000"/>
+            </a:schemeClr>
+          </a:lnRef>
+          <a:fillRef idx="1">
+            <a:schemeClr val="accent1"/>
+          </a:fillRef>
+          <a:effectRef idx="0">
+            <a:schemeClr val="accent1"/>
+          </a:effectRef>
+          <a:fontRef idx="minor">
+            <a:schemeClr val="lt1"/>
+          </a:fontRef>
+        </p:style>
+        <p:txBody>
+          <a:bodyPr rot="0" spcFirstLastPara="0" vertOverflow="overflow" horzOverflow="overflow" vert="horz" wrap="square" lIns="49770" tIns="24885" rIns="49770" bIns="24885" numCol="1" spcCol="0" rtlCol="0" fromWordArt="0" anchor="ctr" anchorCtr="0" forceAA="0" compatLnSpc="1">
+            <a:prstTxWarp prst="textNoShape">
+              <a:avLst/>
+            </a:prstTxWarp>
+            <a:noAutofit/>
+          </a:bodyPr>
+          <a:lstStyle/>
+          <a:p>
+            <a:pPr algn="ctr"/>
+            <a:endParaRPr lang="en-US" sz="980">
+              <a:solidFill>
+                <a:schemeClr val="tx1"/>
+              </a:solidFill>
+            </a:endParaRPr>
+          </a:p>
+        </p:txBody>
+      </p:sp>
+      <p:sp>
+        <p:nvSpPr>
+          <p:cNvPr id="48" name="Oval 47">
+            <a:extLst>
+              <a:ext uri="{FF2B5EF4-FFF2-40B4-BE49-F238E27FC236}">
+                <a16:creationId xmlns:a16="http://schemas.microsoft.com/office/drawing/2014/main" id="{DCE1B472-8A2C-FD43-8285-06A35BA93F2C}"/>
+              </a:ext>
+            </a:extLst>
+          </p:cNvPr>
+          <p:cNvSpPr/>
+          <p:nvPr/>
+        </p:nvSpPr>
+        <p:spPr>
+          <a:xfrm>
+            <a:off x="9699538" y="4304248"/>
+            <a:ext cx="1114916" cy="558438"/>
+          </a:xfrm>
+          <a:prstGeom prst="ellipse">
+            <a:avLst/>
+          </a:prstGeom>
+          <a:solidFill>
+            <a:schemeClr val="bg1"/>
+          </a:solidFill>
+          <a:ln w="19050">
+            <a:solidFill>
+              <a:schemeClr val="tx1"/>
+            </a:solidFill>
+          </a:ln>
+        </p:spPr>
+        <p:style>
+          <a:lnRef idx="2">
+            <a:schemeClr val="accent1">
+              <a:shade val="50000"/>
+            </a:schemeClr>
+          </a:lnRef>
+          <a:fillRef idx="1">
+            <a:schemeClr val="accent1"/>
+          </a:fillRef>
+          <a:effectRef idx="0">
+            <a:schemeClr val="accent1"/>
+          </a:effectRef>
+          <a:fontRef idx="minor">
+            <a:schemeClr val="lt1"/>
+          </a:fontRef>
+        </p:style>
+        <p:txBody>
+          <a:bodyPr rot="0" spcFirstLastPara="0" vertOverflow="overflow" horzOverflow="overflow" vert="horz" wrap="square" lIns="49770" tIns="24885" rIns="49770" bIns="24885" numCol="1" spcCol="0" rtlCol="0" fromWordArt="0" anchor="ctr" anchorCtr="0" forceAA="0" compatLnSpc="1">
+            <a:prstTxWarp prst="textNoShape">
+              <a:avLst/>
+            </a:prstTxWarp>
+            <a:noAutofit/>
+          </a:bodyPr>
+          <a:lstStyle/>
+          <a:p>
+            <a:pPr algn="ctr"/>
+            <a:r>
+              <a:rPr lang="en-US" sz="980" dirty="0">
+                <a:solidFill>
+                  <a:schemeClr val="tx1"/>
+                </a:solidFill>
+              </a:rPr>
+              <a:t>Stand structural complexity</a:t>
+            </a:r>
+          </a:p>
+        </p:txBody>
+      </p:sp>
+      <p:sp>
+        <p:nvSpPr>
+          <p:cNvPr id="49" name="Rounded Rectangle 48">
+            <a:extLst>
+              <a:ext uri="{FF2B5EF4-FFF2-40B4-BE49-F238E27FC236}">
+                <a16:creationId xmlns:a16="http://schemas.microsoft.com/office/drawing/2014/main" id="{5AD1CD9A-1BB9-5046-B276-29B1CB54A5CB}"/>
+              </a:ext>
+            </a:extLst>
+          </p:cNvPr>
+          <p:cNvSpPr/>
+          <p:nvPr/>
+        </p:nvSpPr>
+        <p:spPr>
+          <a:xfrm>
+            <a:off x="8332726" y="4050506"/>
+            <a:ext cx="1151968" cy="418400"/>
+          </a:xfrm>
+          <a:prstGeom prst="roundRect">
+            <a:avLst>
+              <a:gd name="adj" fmla="val 4521"/>
+            </a:avLst>
+          </a:prstGeom>
+          <a:solidFill>
+            <a:schemeClr val="bg1"/>
+          </a:solidFill>
+          <a:ln w="19050">
+            <a:solidFill>
+              <a:schemeClr val="tx1"/>
+            </a:solidFill>
+          </a:ln>
+        </p:spPr>
+        <p:style>
+          <a:lnRef idx="2">
+            <a:schemeClr val="accent1">
+              <a:shade val="50000"/>
+            </a:schemeClr>
+          </a:lnRef>
+          <a:fillRef idx="1">
+            <a:schemeClr val="accent1"/>
+          </a:fillRef>
+          <a:effectRef idx="0">
+            <a:schemeClr val="accent1"/>
+          </a:effectRef>
+          <a:fontRef idx="minor">
+            <a:schemeClr val="lt1"/>
+          </a:fontRef>
+        </p:style>
+        <p:txBody>
+          <a:bodyPr rot="0" spcFirstLastPara="0" vertOverflow="overflow" horzOverflow="overflow" vert="horz" wrap="square" lIns="44280" tIns="22140" rIns="44280" bIns="22140" numCol="1" spcCol="0" rtlCol="0" fromWordArt="0" anchor="ctr" anchorCtr="0" forceAA="0" compatLnSpc="1">
+            <a:prstTxWarp prst="textNoShape">
+              <a:avLst/>
+            </a:prstTxWarp>
+            <a:noAutofit/>
+          </a:bodyPr>
+          <a:lstStyle/>
+          <a:p>
+            <a:pPr algn="ctr"/>
+            <a:r>
+              <a:rPr lang="en-US" sz="871" dirty="0">
+                <a:solidFill>
+                  <a:schemeClr val="tx1"/>
+                </a:solidFill>
+              </a:rPr>
+              <a:t>Height coef. </a:t>
+            </a:r>
+          </a:p>
+          <a:p>
+            <a:pPr algn="ctr"/>
+            <a:r>
+              <a:rPr lang="en-US" sz="871" dirty="0">
+                <a:solidFill>
+                  <a:schemeClr val="tx1"/>
+                </a:solidFill>
+              </a:rPr>
+              <a:t>Variation</a:t>
+            </a:r>
+          </a:p>
+        </p:txBody>
+      </p:sp>
+      <p:cxnSp>
+        <p:nvCxnSpPr>
+          <p:cNvPr id="50" name="Straight Arrow Connector 49">
+            <a:extLst>
+              <a:ext uri="{FF2B5EF4-FFF2-40B4-BE49-F238E27FC236}">
+                <a16:creationId xmlns:a16="http://schemas.microsoft.com/office/drawing/2014/main" id="{06DBD01C-76AE-7B49-8DC1-315E1A05248C}"/>
+              </a:ext>
+            </a:extLst>
+          </p:cNvPr>
+          <p:cNvCxnSpPr>
+            <a:cxnSpLocks/>
+            <a:stCxn id="48" idx="1"/>
+            <a:endCxn id="49" idx="3"/>
+          </p:cNvCxnSpPr>
+          <p:nvPr/>
+        </p:nvCxnSpPr>
+        <p:spPr>
+          <a:xfrm flipH="1" flipV="1">
+            <a:off x="9484694" y="4259706"/>
+            <a:ext cx="378120" cy="126323"/>
+          </a:xfrm>
+          <a:prstGeom prst="straightConnector1">
+            <a:avLst/>
+          </a:prstGeom>
+          <a:ln w="19050">
+            <a:solidFill>
+              <a:schemeClr val="tx1"/>
+            </a:solidFill>
+            <a:headEnd type="arrow" w="med" len="med"/>
+            <a:tailEnd type="none" w="med" len="med"/>
+          </a:ln>
+        </p:spPr>
+        <p:style>
+          <a:lnRef idx="1">
+            <a:schemeClr val="accent1"/>
+          </a:lnRef>
+          <a:fillRef idx="0">
+            <a:schemeClr val="accent1"/>
+          </a:fillRef>
+          <a:effectRef idx="0">
+            <a:schemeClr val="accent1"/>
+          </a:effectRef>
+          <a:fontRef idx="minor">
+            <a:schemeClr val="tx1"/>
+          </a:fontRef>
+        </p:style>
+      </p:cxnSp>
+      <p:sp>
+        <p:nvSpPr>
+          <p:cNvPr id="51" name="Rounded Rectangle 50">
+            <a:extLst>
+              <a:ext uri="{FF2B5EF4-FFF2-40B4-BE49-F238E27FC236}">
+                <a16:creationId xmlns:a16="http://schemas.microsoft.com/office/drawing/2014/main" id="{D0ED0761-55A4-104E-B5BF-F26D77CF99C0}"/>
+              </a:ext>
+            </a:extLst>
+          </p:cNvPr>
+          <p:cNvSpPr/>
+          <p:nvPr/>
+        </p:nvSpPr>
+        <p:spPr>
+          <a:xfrm>
+            <a:off x="8332637" y="4682889"/>
+            <a:ext cx="1151968" cy="418400"/>
+          </a:xfrm>
+          <a:prstGeom prst="roundRect">
+            <a:avLst>
+              <a:gd name="adj" fmla="val 4521"/>
+            </a:avLst>
+          </a:prstGeom>
+          <a:solidFill>
+            <a:schemeClr val="bg1"/>
+          </a:solidFill>
+          <a:ln w="19050">
+            <a:solidFill>
+              <a:schemeClr val="tx1"/>
+            </a:solidFill>
+          </a:ln>
+        </p:spPr>
+        <p:style>
+          <a:lnRef idx="2">
+            <a:schemeClr val="accent1">
+              <a:shade val="50000"/>
+            </a:schemeClr>
+          </a:lnRef>
+          <a:fillRef idx="1">
+            <a:schemeClr val="accent1"/>
+          </a:fillRef>
+          <a:effectRef idx="0">
+            <a:schemeClr val="accent1"/>
+          </a:effectRef>
+          <a:fontRef idx="minor">
+            <a:schemeClr val="lt1"/>
+          </a:fontRef>
+        </p:style>
+        <p:txBody>
+          <a:bodyPr rot="0" spcFirstLastPara="0" vertOverflow="overflow" horzOverflow="overflow" vert="horz" wrap="square" lIns="44280" tIns="22140" rIns="44280" bIns="22140" numCol="1" spcCol="0" rtlCol="0" fromWordArt="0" anchor="ctr" anchorCtr="0" forceAA="0" compatLnSpc="1">
+            <a:prstTxWarp prst="textNoShape">
+              <a:avLst/>
+            </a:prstTxWarp>
+            <a:noAutofit/>
+          </a:bodyPr>
+          <a:lstStyle/>
+          <a:p>
+            <a:pPr algn="ctr"/>
+            <a:r>
+              <a:rPr lang="en-US" sz="871" dirty="0">
+                <a:solidFill>
+                  <a:schemeClr val="tx1"/>
+                </a:solidFill>
+              </a:rPr>
+              <a:t>DBH coef. </a:t>
+            </a:r>
+          </a:p>
+          <a:p>
+            <a:pPr algn="ctr"/>
+            <a:r>
+              <a:rPr lang="en-US" sz="871" dirty="0">
+                <a:solidFill>
+                  <a:schemeClr val="tx1"/>
+                </a:solidFill>
+              </a:rPr>
+              <a:t>Variation</a:t>
+            </a:r>
+          </a:p>
+        </p:txBody>
+      </p:sp>
+      <p:cxnSp>
+        <p:nvCxnSpPr>
+          <p:cNvPr id="52" name="Straight Arrow Connector 51">
+            <a:extLst>
+              <a:ext uri="{FF2B5EF4-FFF2-40B4-BE49-F238E27FC236}">
+                <a16:creationId xmlns:a16="http://schemas.microsoft.com/office/drawing/2014/main" id="{0D823D01-B5FF-D140-98F6-DD2D15C2AA21}"/>
+              </a:ext>
+            </a:extLst>
+          </p:cNvPr>
+          <p:cNvCxnSpPr>
+            <a:cxnSpLocks/>
+            <a:stCxn id="48" idx="3"/>
+            <a:endCxn id="51" idx="3"/>
+          </p:cNvCxnSpPr>
+          <p:nvPr/>
+        </p:nvCxnSpPr>
+        <p:spPr>
+          <a:xfrm flipH="1">
+            <a:off x="9484605" y="4780905"/>
+            <a:ext cx="378209" cy="111184"/>
+          </a:xfrm>
+          <a:prstGeom prst="straightConnector1">
+            <a:avLst/>
+          </a:prstGeom>
+          <a:ln w="19050">
+            <a:solidFill>
+              <a:schemeClr val="tx1"/>
+            </a:solidFill>
+            <a:headEnd type="arrow" w="med" len="med"/>
+            <a:tailEnd type="none" w="med" len="med"/>
+          </a:ln>
+        </p:spPr>
+        <p:style>
+          <a:lnRef idx="1">
+            <a:schemeClr val="accent1"/>
+          </a:lnRef>
+          <a:fillRef idx="0">
+            <a:schemeClr val="accent1"/>
+          </a:fillRef>
+          <a:effectRef idx="0">
+            <a:schemeClr val="accent1"/>
+          </a:effectRef>
+          <a:fontRef idx="minor">
+            <a:schemeClr val="tx1"/>
+          </a:fontRef>
+        </p:style>
+      </p:cxnSp>
+      <p:sp>
+        <p:nvSpPr>
+          <p:cNvPr id="41" name="Rounded Rectangle 40">
+            <a:extLst>
+              <a:ext uri="{FF2B5EF4-FFF2-40B4-BE49-F238E27FC236}">
+                <a16:creationId xmlns:a16="http://schemas.microsoft.com/office/drawing/2014/main" id="{73A6CC8D-DF06-214C-8E4F-710E3060290F}"/>
+              </a:ext>
+            </a:extLst>
+          </p:cNvPr>
+          <p:cNvSpPr/>
+          <p:nvPr/>
+        </p:nvSpPr>
+        <p:spPr>
+          <a:xfrm>
+            <a:off x="8171119" y="2116077"/>
+            <a:ext cx="2804853" cy="1300723"/>
+          </a:xfrm>
+          <a:prstGeom prst="roundRect">
+            <a:avLst/>
+          </a:prstGeom>
+          <a:solidFill>
+            <a:srgbClr val="E5CFF8"/>
+          </a:solidFill>
+          <a:ln w="19050">
+            <a:solidFill>
+              <a:schemeClr val="tx1"/>
+            </a:solidFill>
+            <a:prstDash val="solid"/>
+          </a:ln>
+        </p:spPr>
+        <p:style>
+          <a:lnRef idx="2">
+            <a:schemeClr val="accent1">
+              <a:shade val="50000"/>
+            </a:schemeClr>
+          </a:lnRef>
+          <a:fillRef idx="1">
+            <a:schemeClr val="accent1"/>
+          </a:fillRef>
+          <a:effectRef idx="0">
+            <a:schemeClr val="accent1"/>
+          </a:effectRef>
+          <a:fontRef idx="minor">
+            <a:schemeClr val="lt1"/>
+          </a:fontRef>
+        </p:style>
+        <p:txBody>
+          <a:bodyPr rot="0" spcFirstLastPara="0" vertOverflow="overflow" horzOverflow="overflow" vert="horz" wrap="square" lIns="49770" tIns="24885" rIns="49770" bIns="24885" numCol="1" spcCol="0" rtlCol="0" fromWordArt="0" anchor="ctr" anchorCtr="0" forceAA="0" compatLnSpc="1">
+            <a:prstTxWarp prst="textNoShape">
+              <a:avLst/>
+            </a:prstTxWarp>
+            <a:noAutofit/>
+          </a:bodyPr>
+          <a:lstStyle/>
+          <a:p>
+            <a:pPr algn="ctr"/>
+            <a:endParaRPr lang="en-US" sz="980" dirty="0">
+              <a:solidFill>
+                <a:schemeClr val="tx1"/>
+              </a:solidFill>
+            </a:endParaRPr>
+          </a:p>
+        </p:txBody>
+      </p:sp>
+      <p:sp>
+        <p:nvSpPr>
+          <p:cNvPr id="42" name="Oval 41">
+            <a:extLst>
+              <a:ext uri="{FF2B5EF4-FFF2-40B4-BE49-F238E27FC236}">
+                <a16:creationId xmlns:a16="http://schemas.microsoft.com/office/drawing/2014/main" id="{29AA08E9-92BF-B841-BDFD-A0465CEB9D1C}"/>
+              </a:ext>
+            </a:extLst>
+          </p:cNvPr>
+          <p:cNvSpPr/>
+          <p:nvPr/>
+        </p:nvSpPr>
+        <p:spPr>
+          <a:xfrm>
+            <a:off x="9673231" y="2487219"/>
+            <a:ext cx="1114916" cy="558438"/>
+          </a:xfrm>
+          <a:prstGeom prst="ellipse">
+            <a:avLst/>
+          </a:prstGeom>
+          <a:solidFill>
+            <a:schemeClr val="bg1"/>
+          </a:solidFill>
+          <a:ln w="19050">
+            <a:solidFill>
+              <a:schemeClr val="tx1"/>
+            </a:solidFill>
+          </a:ln>
+        </p:spPr>
+        <p:style>
+          <a:lnRef idx="2">
+            <a:schemeClr val="accent1">
+              <a:shade val="50000"/>
+            </a:schemeClr>
+          </a:lnRef>
+          <a:fillRef idx="1">
+            <a:schemeClr val="accent1"/>
+          </a:fillRef>
+          <a:effectRef idx="0">
+            <a:schemeClr val="accent1"/>
+          </a:effectRef>
+          <a:fontRef idx="minor">
+            <a:schemeClr val="lt1"/>
+          </a:fontRef>
+        </p:style>
+        <p:txBody>
+          <a:bodyPr rot="0" spcFirstLastPara="0" vertOverflow="overflow" horzOverflow="overflow" vert="horz" wrap="square" lIns="49770" tIns="24885" rIns="49770" bIns="24885" numCol="1" spcCol="0" rtlCol="0" fromWordArt="0" anchor="ctr" anchorCtr="0" forceAA="0" compatLnSpc="1">
+            <a:prstTxWarp prst="textNoShape">
+              <a:avLst/>
+            </a:prstTxWarp>
+            <a:noAutofit/>
+          </a:bodyPr>
+          <a:lstStyle/>
+          <a:p>
+            <a:pPr algn="ctr"/>
+            <a:r>
+              <a:rPr lang="en-US" sz="980" dirty="0">
+                <a:solidFill>
+                  <a:schemeClr val="tx1"/>
+                </a:solidFill>
+              </a:rPr>
+              <a:t>Tree species diversity</a:t>
+            </a:r>
+          </a:p>
+        </p:txBody>
+      </p:sp>
+      <p:sp>
+        <p:nvSpPr>
+          <p:cNvPr id="43" name="Rounded Rectangle 42">
+            <a:extLst>
+              <a:ext uri="{FF2B5EF4-FFF2-40B4-BE49-F238E27FC236}">
+                <a16:creationId xmlns:a16="http://schemas.microsoft.com/office/drawing/2014/main" id="{194ECC55-A171-D240-88B5-0C6F3A4B98AD}"/>
+              </a:ext>
+            </a:extLst>
+          </p:cNvPr>
+          <p:cNvSpPr/>
+          <p:nvPr/>
+        </p:nvSpPr>
+        <p:spPr>
+          <a:xfrm>
+            <a:off x="8338325" y="2241532"/>
+            <a:ext cx="1151968" cy="418400"/>
+          </a:xfrm>
+          <a:prstGeom prst="roundRect">
+            <a:avLst>
+              <a:gd name="adj" fmla="val 4521"/>
+            </a:avLst>
+          </a:prstGeom>
+          <a:solidFill>
+            <a:schemeClr val="bg1"/>
+          </a:solidFill>
+          <a:ln w="19050">
+            <a:solidFill>
+              <a:schemeClr val="tx1"/>
+            </a:solidFill>
+          </a:ln>
+        </p:spPr>
+        <p:style>
+          <a:lnRef idx="2">
+            <a:schemeClr val="accent1">
+              <a:shade val="50000"/>
+            </a:schemeClr>
+          </a:lnRef>
+          <a:fillRef idx="1">
+            <a:schemeClr val="accent1"/>
+          </a:fillRef>
+          <a:effectRef idx="0">
+            <a:schemeClr val="accent1"/>
+          </a:effectRef>
+          <a:fontRef idx="minor">
+            <a:schemeClr val="lt1"/>
+          </a:fontRef>
+        </p:style>
+        <p:txBody>
+          <a:bodyPr rot="0" spcFirstLastPara="0" vertOverflow="overflow" horzOverflow="overflow" vert="horz" wrap="square" lIns="44280" tIns="22140" rIns="44280" bIns="22140" numCol="1" spcCol="0" rtlCol="0" fromWordArt="0" anchor="ctr" anchorCtr="0" forceAA="0" compatLnSpc="1">
+            <a:prstTxWarp prst="textNoShape">
+              <a:avLst/>
+            </a:prstTxWarp>
+            <a:noAutofit/>
+          </a:bodyPr>
+          <a:lstStyle/>
+          <a:p>
+            <a:pPr algn="ctr"/>
+            <a:r>
+              <a:rPr lang="en-US" sz="871" dirty="0">
+                <a:solidFill>
+                  <a:schemeClr val="tx1"/>
+                </a:solidFill>
+              </a:rPr>
+              <a:t>Rarefied tree species richness</a:t>
+            </a:r>
+          </a:p>
+        </p:txBody>
+      </p:sp>
+      <p:cxnSp>
+        <p:nvCxnSpPr>
+          <p:cNvPr id="44" name="Straight Arrow Connector 43">
+            <a:extLst>
+              <a:ext uri="{FF2B5EF4-FFF2-40B4-BE49-F238E27FC236}">
+                <a16:creationId xmlns:a16="http://schemas.microsoft.com/office/drawing/2014/main" id="{281014D9-3C55-9D4D-9DB8-A6EF8B005F20}"/>
+              </a:ext>
+            </a:extLst>
+          </p:cNvPr>
+          <p:cNvCxnSpPr>
+            <a:cxnSpLocks/>
+            <a:stCxn id="42" idx="1"/>
+            <a:endCxn id="43" idx="3"/>
+          </p:cNvCxnSpPr>
+          <p:nvPr/>
+        </p:nvCxnSpPr>
+        <p:spPr>
+          <a:xfrm flipH="1" flipV="1">
+            <a:off x="9490293" y="2450732"/>
+            <a:ext cx="346214" cy="118268"/>
+          </a:xfrm>
+          <a:prstGeom prst="straightConnector1">
+            <a:avLst/>
+          </a:prstGeom>
+          <a:ln w="19050">
+            <a:solidFill>
+              <a:schemeClr val="tx1"/>
+            </a:solidFill>
+            <a:headEnd type="arrow" w="med" len="med"/>
+            <a:tailEnd type="none" w="med" len="med"/>
+          </a:ln>
+        </p:spPr>
+        <p:style>
+          <a:lnRef idx="1">
+            <a:schemeClr val="accent1"/>
+          </a:lnRef>
+          <a:fillRef idx="0">
+            <a:schemeClr val="accent1"/>
+          </a:fillRef>
+          <a:effectRef idx="0">
+            <a:schemeClr val="accent1"/>
+          </a:effectRef>
+          <a:fontRef idx="minor">
+            <a:schemeClr val="tx1"/>
+          </a:fontRef>
+        </p:style>
+      </p:cxnSp>
+      <p:sp>
+        <p:nvSpPr>
+          <p:cNvPr id="45" name="Rounded Rectangle 44">
+            <a:extLst>
+              <a:ext uri="{FF2B5EF4-FFF2-40B4-BE49-F238E27FC236}">
+                <a16:creationId xmlns:a16="http://schemas.microsoft.com/office/drawing/2014/main" id="{38391F49-BD3F-B142-A7F6-21BA1002FE4F}"/>
+              </a:ext>
+            </a:extLst>
+          </p:cNvPr>
+          <p:cNvSpPr/>
+          <p:nvPr/>
+        </p:nvSpPr>
+        <p:spPr>
+          <a:xfrm>
+            <a:off x="8345103" y="2874632"/>
+            <a:ext cx="1151968" cy="418400"/>
+          </a:xfrm>
+          <a:prstGeom prst="roundRect">
+            <a:avLst>
+              <a:gd name="adj" fmla="val 4521"/>
+            </a:avLst>
+          </a:prstGeom>
+          <a:solidFill>
+            <a:schemeClr val="bg1"/>
+          </a:solidFill>
+          <a:ln w="19050">
+            <a:solidFill>
+              <a:schemeClr val="tx1"/>
+            </a:solidFill>
+          </a:ln>
+        </p:spPr>
+        <p:style>
+          <a:lnRef idx="2">
+            <a:schemeClr val="accent1">
+              <a:shade val="50000"/>
+            </a:schemeClr>
+          </a:lnRef>
+          <a:fillRef idx="1">
+            <a:schemeClr val="accent1"/>
+          </a:fillRef>
+          <a:effectRef idx="0">
+            <a:schemeClr val="accent1"/>
+          </a:effectRef>
+          <a:fontRef idx="minor">
+            <a:schemeClr val="lt1"/>
+          </a:fontRef>
+        </p:style>
+        <p:txBody>
+          <a:bodyPr rot="0" spcFirstLastPara="0" vertOverflow="overflow" horzOverflow="overflow" vert="horz" wrap="square" lIns="44280" tIns="22140" rIns="44280" bIns="22140" numCol="1" spcCol="0" rtlCol="0" fromWordArt="0" anchor="ctr" anchorCtr="0" forceAA="0" compatLnSpc="1">
+            <a:prstTxWarp prst="textNoShape">
+              <a:avLst/>
+            </a:prstTxWarp>
+            <a:noAutofit/>
+          </a:bodyPr>
+          <a:lstStyle/>
+          <a:p>
+            <a:pPr algn="ctr"/>
+            <a:r>
+              <a:rPr lang="en-US" sz="871" dirty="0">
+                <a:solidFill>
+                  <a:schemeClr val="tx1"/>
+                </a:solidFill>
+              </a:rPr>
+              <a:t>Shannon equitability index</a:t>
+            </a:r>
+          </a:p>
+        </p:txBody>
+      </p:sp>
+      <p:cxnSp>
+        <p:nvCxnSpPr>
+          <p:cNvPr id="46" name="Straight Arrow Connector 45">
+            <a:extLst>
+              <a:ext uri="{FF2B5EF4-FFF2-40B4-BE49-F238E27FC236}">
+                <a16:creationId xmlns:a16="http://schemas.microsoft.com/office/drawing/2014/main" id="{26C20477-F121-FC41-AF02-85A98A895A31}"/>
+              </a:ext>
+            </a:extLst>
+          </p:cNvPr>
+          <p:cNvCxnSpPr>
+            <a:cxnSpLocks/>
+            <a:stCxn id="42" idx="3"/>
+            <a:endCxn id="45" idx="3"/>
+          </p:cNvCxnSpPr>
+          <p:nvPr/>
+        </p:nvCxnSpPr>
+        <p:spPr>
+          <a:xfrm flipH="1">
+            <a:off x="9497071" y="2963876"/>
+            <a:ext cx="339436" cy="119956"/>
+          </a:xfrm>
+          <a:prstGeom prst="straightConnector1">
+            <a:avLst/>
+          </a:prstGeom>
+          <a:ln w="19050">
+            <a:solidFill>
+              <a:schemeClr val="tx1"/>
+            </a:solidFill>
+            <a:headEnd type="arrow" w="med" len="med"/>
+            <a:tailEnd type="none" w="med" len="med"/>
+          </a:ln>
+        </p:spPr>
+        <p:style>
+          <a:lnRef idx="1">
+            <a:schemeClr val="accent1"/>
+          </a:lnRef>
+          <a:fillRef idx="0">
+            <a:schemeClr val="accent1"/>
+          </a:fillRef>
+          <a:effectRef idx="0">
+            <a:schemeClr val="accent1"/>
+          </a:effectRef>
+          <a:fontRef idx="minor">
+            <a:schemeClr val="tx1"/>
+          </a:fontRef>
+        </p:style>
+      </p:cxnSp>
+      <p:sp>
+        <p:nvSpPr>
+          <p:cNvPr id="38" name="Rounded Rectangle 37">
+            <a:extLst>
+              <a:ext uri="{FF2B5EF4-FFF2-40B4-BE49-F238E27FC236}">
+                <a16:creationId xmlns:a16="http://schemas.microsoft.com/office/drawing/2014/main" id="{317714D6-27FA-4249-B3F3-B6EC38B8A9A0}"/>
+              </a:ext>
+            </a:extLst>
+          </p:cNvPr>
+          <p:cNvSpPr/>
+          <p:nvPr/>
+        </p:nvSpPr>
+        <p:spPr>
+          <a:xfrm>
+            <a:off x="5616726" y="3406313"/>
+            <a:ext cx="1151968" cy="418400"/>
+          </a:xfrm>
+          <a:prstGeom prst="roundRect">
+            <a:avLst>
+              <a:gd name="adj" fmla="val 4521"/>
+            </a:avLst>
+          </a:prstGeom>
+          <a:solidFill>
+            <a:schemeClr val="bg1"/>
+          </a:solidFill>
+          <a:ln w="19050">
+            <a:solidFill>
+              <a:schemeClr val="tx1"/>
+            </a:solidFill>
+          </a:ln>
+        </p:spPr>
+        <p:style>
+          <a:lnRef idx="2">
+            <a:schemeClr val="accent1">
+              <a:shade val="50000"/>
+            </a:schemeClr>
+          </a:lnRef>
+          <a:fillRef idx="1">
+            <a:schemeClr val="accent1"/>
+          </a:fillRef>
+          <a:effectRef idx="0">
+            <a:schemeClr val="accent1"/>
+          </a:effectRef>
+          <a:fontRef idx="minor">
+            <a:schemeClr val="lt1"/>
+          </a:fontRef>
+        </p:style>
+        <p:txBody>
+          <a:bodyPr rot="0" spcFirstLastPara="0" vertOverflow="overflow" horzOverflow="overflow" vert="horz" wrap="square" lIns="44280" tIns="22140" rIns="44280" bIns="22140" numCol="1" spcCol="0" rtlCol="0" fromWordArt="0" anchor="ctr" anchorCtr="0" forceAA="0" compatLnSpc="1">
+            <a:prstTxWarp prst="textNoShape">
+              <a:avLst/>
+            </a:prstTxWarp>
+            <a:noAutofit/>
+          </a:bodyPr>
+          <a:lstStyle/>
+          <a:p>
+            <a:pPr algn="ctr"/>
+            <a:r>
+              <a:rPr lang="en-US" sz="871" dirty="0">
+                <a:solidFill>
+                  <a:schemeClr val="tx1"/>
+                </a:solidFill>
+              </a:rPr>
+              <a:t>Tree stem biomass</a:t>
+            </a:r>
+          </a:p>
+          <a:p>
+            <a:pPr algn="ctr"/>
+            <a:r>
+              <a:rPr lang="en-US" sz="871" dirty="0">
+                <a:solidFill>
+                  <a:schemeClr val="tx1"/>
+                </a:solidFill>
+              </a:rPr>
+              <a:t>(SEOSAW)</a:t>
+            </a:r>
+          </a:p>
+        </p:txBody>
+      </p:sp>
+      <p:cxnSp>
+        <p:nvCxnSpPr>
+          <p:cNvPr id="18" name="Straight Arrow Connector 17">
+            <a:extLst>
+              <a:ext uri="{FF2B5EF4-FFF2-40B4-BE49-F238E27FC236}">
+                <a16:creationId xmlns:a16="http://schemas.microsoft.com/office/drawing/2014/main" id="{7F82D15A-E79D-4E4E-BB32-494DA8BDFC71}"/>
+              </a:ext>
+            </a:extLst>
+          </p:cNvPr>
+          <p:cNvCxnSpPr>
+            <a:cxnSpLocks/>
+            <a:stCxn id="41" idx="2"/>
+            <a:endCxn id="47" idx="0"/>
+          </p:cNvCxnSpPr>
+          <p:nvPr/>
+        </p:nvCxnSpPr>
+        <p:spPr>
+          <a:xfrm>
+            <a:off x="9573546" y="3416800"/>
+            <a:ext cx="0" cy="508736"/>
+          </a:xfrm>
+          <a:prstGeom prst="straightConnector1">
+            <a:avLst/>
+          </a:prstGeom>
+          <a:ln w="28575">
+            <a:solidFill>
+              <a:schemeClr val="tx1"/>
+            </a:solidFill>
+            <a:headEnd type="none" w="med" len="med"/>
+            <a:tailEnd type="arrow" w="lg" len="med"/>
+          </a:ln>
+        </p:spPr>
+        <p:style>
+          <a:lnRef idx="1">
+            <a:schemeClr val="accent1"/>
+          </a:lnRef>
+          <a:fillRef idx="0">
+            <a:schemeClr val="accent1"/>
+          </a:fillRef>
+          <a:effectRef idx="0">
+            <a:schemeClr val="accent1"/>
+          </a:effectRef>
+          <a:fontRef idx="minor">
+            <a:schemeClr val="tx1"/>
+          </a:fontRef>
+        </p:style>
+      </p:cxnSp>
+      <p:cxnSp>
+        <p:nvCxnSpPr>
+          <p:cNvPr id="26" name="Straight Arrow Connector 25">
+            <a:extLst>
+              <a:ext uri="{FF2B5EF4-FFF2-40B4-BE49-F238E27FC236}">
+                <a16:creationId xmlns:a16="http://schemas.microsoft.com/office/drawing/2014/main" id="{B2189B7E-617F-884F-8A37-FBC96DD595CC}"/>
+              </a:ext>
+            </a:extLst>
+          </p:cNvPr>
+          <p:cNvCxnSpPr>
+            <a:cxnSpLocks/>
+            <a:stCxn id="55" idx="0"/>
+            <a:endCxn id="28" idx="3"/>
+          </p:cNvCxnSpPr>
+          <p:nvPr/>
+        </p:nvCxnSpPr>
+        <p:spPr>
+          <a:xfrm flipH="1" flipV="1">
+            <a:off x="2346258" y="1244961"/>
+            <a:ext cx="805143" cy="756588"/>
+          </a:xfrm>
+          <a:prstGeom prst="straightConnector1">
+            <a:avLst/>
+          </a:prstGeom>
+          <a:ln w="19050">
+            <a:solidFill>
+              <a:schemeClr val="tx1"/>
+            </a:solidFill>
+            <a:headEnd type="arrow" w="med" len="med"/>
+            <a:tailEnd type="none" w="med" len="med"/>
+          </a:ln>
+        </p:spPr>
+        <p:style>
+          <a:lnRef idx="1">
+            <a:schemeClr val="accent1"/>
+          </a:lnRef>
+          <a:fillRef idx="0">
+            <a:schemeClr val="accent1"/>
+          </a:fillRef>
+          <a:effectRef idx="0">
+            <a:schemeClr val="accent1"/>
+          </a:effectRef>
+          <a:fontRef idx="minor">
+            <a:schemeClr val="tx1"/>
+          </a:fontRef>
+        </p:style>
+      </p:cxnSp>
+      <p:cxnSp>
+        <p:nvCxnSpPr>
+          <p:cNvPr id="27" name="Straight Arrow Connector 26">
+            <a:extLst>
+              <a:ext uri="{FF2B5EF4-FFF2-40B4-BE49-F238E27FC236}">
+                <a16:creationId xmlns:a16="http://schemas.microsoft.com/office/drawing/2014/main" id="{3DBE944C-6CE3-264D-AA12-2A4E4BE63FF5}"/>
+              </a:ext>
+            </a:extLst>
+          </p:cNvPr>
+          <p:cNvCxnSpPr>
+            <a:cxnSpLocks/>
+            <a:stCxn id="55" idx="1"/>
+            <a:endCxn id="29" idx="3"/>
+          </p:cNvCxnSpPr>
+          <p:nvPr/>
+        </p:nvCxnSpPr>
+        <p:spPr>
+          <a:xfrm flipH="1" flipV="1">
+            <a:off x="2353036" y="1878061"/>
+            <a:ext cx="404183" cy="205269"/>
+          </a:xfrm>
+          <a:prstGeom prst="straightConnector1">
+            <a:avLst/>
+          </a:prstGeom>
+          <a:ln w="19050">
+            <a:solidFill>
+              <a:schemeClr val="tx1"/>
+            </a:solidFill>
+            <a:headEnd type="arrow" w="med" len="med"/>
+            <a:tailEnd type="none" w="med" len="med"/>
+          </a:ln>
+        </p:spPr>
+        <p:style>
+          <a:lnRef idx="1">
+            <a:schemeClr val="accent1"/>
+          </a:lnRef>
+          <a:fillRef idx="0">
+            <a:schemeClr val="accent1"/>
+          </a:fillRef>
+          <a:effectRef idx="0">
+            <a:schemeClr val="accent1"/>
+          </a:effectRef>
+          <a:fontRef idx="minor">
+            <a:schemeClr val="tx1"/>
+          </a:fontRef>
+        </p:style>
+      </p:cxnSp>
+      <p:sp>
+        <p:nvSpPr>
+          <p:cNvPr id="62" name="Rounded Rectangle 61">
+            <a:extLst>
+              <a:ext uri="{FF2B5EF4-FFF2-40B4-BE49-F238E27FC236}">
+                <a16:creationId xmlns:a16="http://schemas.microsoft.com/office/drawing/2014/main" id="{F0CFEDAE-0FAF-894D-B9DB-E26DFA65287C}"/>
+              </a:ext>
+            </a:extLst>
+          </p:cNvPr>
+          <p:cNvSpPr/>
+          <p:nvPr/>
+        </p:nvSpPr>
+        <p:spPr>
+          <a:xfrm>
+            <a:off x="1038542" y="4111295"/>
+            <a:ext cx="2804853" cy="1890346"/>
+          </a:xfrm>
+          <a:prstGeom prst="roundRect">
+            <a:avLst/>
+          </a:prstGeom>
+          <a:solidFill>
+            <a:srgbClr val="A47326">
+              <a:alpha val="69020"/>
+            </a:srgbClr>
+          </a:solidFill>
+          <a:ln w="19050">
+            <a:solidFill>
+              <a:schemeClr val="tx1"/>
+            </a:solidFill>
+            <a:prstDash val="solid"/>
+          </a:ln>
+        </p:spPr>
+        <p:style>
+          <a:lnRef idx="2">
+            <a:schemeClr val="accent1">
+              <a:shade val="50000"/>
+            </a:schemeClr>
+          </a:lnRef>
+          <a:fillRef idx="1">
+            <a:schemeClr val="accent1"/>
+          </a:fillRef>
+          <a:effectRef idx="0">
+            <a:schemeClr val="accent1"/>
+          </a:effectRef>
+          <a:fontRef idx="minor">
+            <a:schemeClr val="lt1"/>
+          </a:fontRef>
+        </p:style>
+        <p:txBody>
+          <a:bodyPr rot="0" spcFirstLastPara="0" vertOverflow="overflow" horzOverflow="overflow" vert="horz" wrap="square" lIns="49770" tIns="24885" rIns="49770" bIns="24885" numCol="1" spcCol="0" rtlCol="0" fromWordArt="0" anchor="ctr" anchorCtr="0" forceAA="0" compatLnSpc="1">
+            <a:prstTxWarp prst="textNoShape">
+              <a:avLst/>
+            </a:prstTxWarp>
+            <a:noAutofit/>
+          </a:bodyPr>
+          <a:lstStyle/>
+          <a:p>
+            <a:pPr algn="ctr"/>
+            <a:endParaRPr lang="en-US" sz="980">
+              <a:solidFill>
+                <a:schemeClr val="tx1"/>
+              </a:solidFill>
+            </a:endParaRPr>
+          </a:p>
+        </p:txBody>
+      </p:sp>
+      <p:sp>
+        <p:nvSpPr>
+          <p:cNvPr id="63" name="Oval 62">
+            <a:extLst>
+              <a:ext uri="{FF2B5EF4-FFF2-40B4-BE49-F238E27FC236}">
+                <a16:creationId xmlns:a16="http://schemas.microsoft.com/office/drawing/2014/main" id="{33333A17-332A-8044-AB28-E5DD32B9F8AE}"/>
+              </a:ext>
+            </a:extLst>
+          </p:cNvPr>
+          <p:cNvSpPr/>
+          <p:nvPr/>
+        </p:nvSpPr>
+        <p:spPr>
+          <a:xfrm>
+            <a:off x="2594474" y="4795370"/>
+            <a:ext cx="1114916" cy="558438"/>
+          </a:xfrm>
+          <a:prstGeom prst="ellipse">
+            <a:avLst/>
+          </a:prstGeom>
+          <a:solidFill>
+            <a:schemeClr val="bg1"/>
+          </a:solidFill>
+          <a:ln w="19050">
+            <a:solidFill>
+              <a:schemeClr val="tx1"/>
+            </a:solidFill>
+          </a:ln>
+        </p:spPr>
+        <p:style>
+          <a:lnRef idx="2">
+            <a:schemeClr val="accent1">
+              <a:shade val="50000"/>
+            </a:schemeClr>
+          </a:lnRef>
+          <a:fillRef idx="1">
+            <a:schemeClr val="accent1"/>
+          </a:fillRef>
+          <a:effectRef idx="0">
+            <a:schemeClr val="accent1"/>
+          </a:effectRef>
+          <a:fontRef idx="minor">
+            <a:schemeClr val="lt1"/>
+          </a:fontRef>
+        </p:style>
+        <p:txBody>
+          <a:bodyPr rot="0" spcFirstLastPara="0" vertOverflow="overflow" horzOverflow="overflow" vert="horz" wrap="square" lIns="49770" tIns="24885" rIns="49770" bIns="24885" numCol="1" spcCol="0" rtlCol="0" fromWordArt="0" anchor="ctr" anchorCtr="0" forceAA="0" compatLnSpc="1">
+            <a:prstTxWarp prst="textNoShape">
+              <a:avLst/>
+            </a:prstTxWarp>
+            <a:noAutofit/>
+          </a:bodyPr>
+          <a:lstStyle/>
+          <a:p>
+            <a:pPr algn="ctr"/>
+            <a:r>
+              <a:rPr lang="en-US" sz="980" dirty="0">
+                <a:solidFill>
+                  <a:schemeClr val="tx1"/>
+                </a:solidFill>
+              </a:rPr>
+              <a:t>Soil fertility</a:t>
+            </a:r>
+          </a:p>
+        </p:txBody>
+      </p:sp>
+      <p:cxnSp>
+        <p:nvCxnSpPr>
+          <p:cNvPr id="64" name="Straight Arrow Connector 63">
+            <a:extLst>
+              <a:ext uri="{FF2B5EF4-FFF2-40B4-BE49-F238E27FC236}">
+                <a16:creationId xmlns:a16="http://schemas.microsoft.com/office/drawing/2014/main" id="{8F2DABAE-E3EA-5647-BF52-39B72D193B74}"/>
+              </a:ext>
+            </a:extLst>
+          </p:cNvPr>
+          <p:cNvCxnSpPr>
+            <a:cxnSpLocks/>
+            <a:stCxn id="63" idx="1"/>
+            <a:endCxn id="66" idx="3"/>
+          </p:cNvCxnSpPr>
+          <p:nvPr/>
+        </p:nvCxnSpPr>
+        <p:spPr>
+          <a:xfrm flipH="1" flipV="1">
+            <a:off x="2346256" y="4433140"/>
+            <a:ext cx="411494" cy="444011"/>
+          </a:xfrm>
+          <a:prstGeom prst="straightConnector1">
+            <a:avLst/>
+          </a:prstGeom>
+          <a:ln w="19050">
+            <a:solidFill>
+              <a:schemeClr val="tx1"/>
+            </a:solidFill>
+            <a:headEnd type="arrow" w="med" len="med"/>
+            <a:tailEnd type="none" w="med" len="med"/>
+          </a:ln>
+        </p:spPr>
+        <p:style>
+          <a:lnRef idx="1">
+            <a:schemeClr val="accent1"/>
+          </a:lnRef>
+          <a:fillRef idx="0">
+            <a:schemeClr val="accent1"/>
+          </a:fillRef>
+          <a:effectRef idx="0">
+            <a:schemeClr val="accent1"/>
+          </a:effectRef>
+          <a:fontRef idx="minor">
+            <a:schemeClr val="tx1"/>
+          </a:fontRef>
+        </p:style>
+      </p:cxnSp>
+      <p:cxnSp>
+        <p:nvCxnSpPr>
+          <p:cNvPr id="65" name="Straight Arrow Connector 64">
+            <a:extLst>
+              <a:ext uri="{FF2B5EF4-FFF2-40B4-BE49-F238E27FC236}">
+                <a16:creationId xmlns:a16="http://schemas.microsoft.com/office/drawing/2014/main" id="{688D3C14-DFEE-E341-A9A4-DB9061AE5477}"/>
+              </a:ext>
+            </a:extLst>
+          </p:cNvPr>
+          <p:cNvCxnSpPr>
+            <a:cxnSpLocks/>
+            <a:stCxn id="63" idx="3"/>
+            <a:endCxn id="68" idx="3"/>
+          </p:cNvCxnSpPr>
+          <p:nvPr/>
+        </p:nvCxnSpPr>
+        <p:spPr>
+          <a:xfrm flipH="1">
+            <a:off x="2346256" y="5272027"/>
+            <a:ext cx="411494" cy="407770"/>
+          </a:xfrm>
+          <a:prstGeom prst="straightConnector1">
+            <a:avLst/>
+          </a:prstGeom>
+          <a:ln w="19050">
+            <a:solidFill>
+              <a:schemeClr val="tx1"/>
+            </a:solidFill>
+            <a:headEnd type="arrow" w="med" len="med"/>
+            <a:tailEnd type="none" w="med" len="med"/>
+          </a:ln>
+        </p:spPr>
+        <p:style>
+          <a:lnRef idx="1">
+            <a:schemeClr val="accent1"/>
+          </a:lnRef>
+          <a:fillRef idx="0">
+            <a:schemeClr val="accent1"/>
+          </a:fillRef>
+          <a:effectRef idx="0">
+            <a:schemeClr val="accent1"/>
+          </a:effectRef>
+          <a:fontRef idx="minor">
+            <a:schemeClr val="tx1"/>
+          </a:fontRef>
+        </p:style>
+      </p:cxnSp>
+      <p:sp>
+        <p:nvSpPr>
+          <p:cNvPr id="66" name="Rounded Rectangle 65">
+            <a:extLst>
+              <a:ext uri="{FF2B5EF4-FFF2-40B4-BE49-F238E27FC236}">
+                <a16:creationId xmlns:a16="http://schemas.microsoft.com/office/drawing/2014/main" id="{4AD2BFE9-753E-2546-BAFD-CEAC19E05575}"/>
+              </a:ext>
+            </a:extLst>
+          </p:cNvPr>
+          <p:cNvSpPr/>
+          <p:nvPr/>
+        </p:nvSpPr>
+        <p:spPr>
+          <a:xfrm>
+            <a:off x="1194288" y="4223940"/>
+            <a:ext cx="1151968" cy="418400"/>
+          </a:xfrm>
+          <a:prstGeom prst="roundRect">
+            <a:avLst>
+              <a:gd name="adj" fmla="val 4521"/>
+            </a:avLst>
+          </a:prstGeom>
+          <a:solidFill>
+            <a:schemeClr val="bg1"/>
+          </a:solidFill>
+          <a:ln w="19050">
+            <a:solidFill>
+              <a:schemeClr val="tx1"/>
+            </a:solidFill>
+          </a:ln>
+        </p:spPr>
+        <p:style>
+          <a:lnRef idx="2">
+            <a:schemeClr val="accent1">
+              <a:shade val="50000"/>
+            </a:schemeClr>
+          </a:lnRef>
+          <a:fillRef idx="1">
+            <a:schemeClr val="accent1"/>
+          </a:fillRef>
+          <a:effectRef idx="0">
+            <a:schemeClr val="accent1"/>
+          </a:effectRef>
+          <a:fontRef idx="minor">
+            <a:schemeClr val="lt1"/>
+          </a:fontRef>
+        </p:style>
+        <p:txBody>
+          <a:bodyPr rot="0" spcFirstLastPara="0" vertOverflow="overflow" horzOverflow="overflow" vert="horz" wrap="square" lIns="44280" tIns="22140" rIns="44280" bIns="22140" numCol="1" spcCol="0" rtlCol="0" fromWordArt="0" anchor="ctr" anchorCtr="0" forceAA="0" compatLnSpc="1">
+            <a:prstTxWarp prst="textNoShape">
+              <a:avLst/>
+            </a:prstTxWarp>
+            <a:noAutofit/>
+          </a:bodyPr>
+          <a:lstStyle/>
+          <a:p>
+            <a:pPr algn="ctr"/>
+            <a:r>
+              <a:rPr lang="en-US" sz="871" dirty="0">
+                <a:solidFill>
+                  <a:schemeClr val="tx1"/>
+                </a:solidFill>
+              </a:rPr>
+              <a:t>Organic C %</a:t>
+            </a:r>
+          </a:p>
+        </p:txBody>
+      </p:sp>
+      <p:sp>
+        <p:nvSpPr>
+          <p:cNvPr id="67" name="Rounded Rectangle 66">
+            <a:extLst>
+              <a:ext uri="{FF2B5EF4-FFF2-40B4-BE49-F238E27FC236}">
+                <a16:creationId xmlns:a16="http://schemas.microsoft.com/office/drawing/2014/main" id="{B28CD467-C563-6842-B5B2-3E63C954A8AB}"/>
+              </a:ext>
+            </a:extLst>
+          </p:cNvPr>
+          <p:cNvSpPr/>
+          <p:nvPr/>
+        </p:nvSpPr>
+        <p:spPr>
+          <a:xfrm>
+            <a:off x="1201066" y="4847268"/>
+            <a:ext cx="1151968" cy="418400"/>
+          </a:xfrm>
+          <a:prstGeom prst="roundRect">
+            <a:avLst>
+              <a:gd name="adj" fmla="val 4521"/>
+            </a:avLst>
+          </a:prstGeom>
+          <a:solidFill>
+            <a:schemeClr val="bg1"/>
+          </a:solidFill>
+          <a:ln w="19050">
+            <a:solidFill>
+              <a:schemeClr val="tx1"/>
+            </a:solidFill>
+          </a:ln>
+        </p:spPr>
+        <p:style>
+          <a:lnRef idx="2">
+            <a:schemeClr val="accent1">
+              <a:shade val="50000"/>
+            </a:schemeClr>
+          </a:lnRef>
+          <a:fillRef idx="1">
+            <a:schemeClr val="accent1"/>
+          </a:fillRef>
+          <a:effectRef idx="0">
+            <a:schemeClr val="accent1"/>
+          </a:effectRef>
+          <a:fontRef idx="minor">
+            <a:schemeClr val="lt1"/>
+          </a:fontRef>
+        </p:style>
+        <p:txBody>
+          <a:bodyPr rot="0" spcFirstLastPara="0" vertOverflow="overflow" horzOverflow="overflow" vert="horz" wrap="square" lIns="44280" tIns="22140" rIns="44280" bIns="22140" numCol="1" spcCol="0" rtlCol="0" fromWordArt="0" anchor="ctr" anchorCtr="0" forceAA="0" compatLnSpc="1">
+            <a:prstTxWarp prst="textNoShape">
+              <a:avLst/>
+            </a:prstTxWarp>
+            <a:noAutofit/>
+          </a:bodyPr>
+          <a:lstStyle/>
+          <a:p>
+            <a:pPr algn="ctr"/>
+            <a:r>
+              <a:rPr lang="en-US" sz="871" dirty="0">
+                <a:solidFill>
+                  <a:schemeClr val="tx1"/>
+                </a:solidFill>
+              </a:rPr>
+              <a:t>Sand %</a:t>
+            </a:r>
+          </a:p>
+        </p:txBody>
+      </p:sp>
+      <p:sp>
+        <p:nvSpPr>
+          <p:cNvPr id="68" name="Rounded Rectangle 67">
+            <a:extLst>
+              <a:ext uri="{FF2B5EF4-FFF2-40B4-BE49-F238E27FC236}">
+                <a16:creationId xmlns:a16="http://schemas.microsoft.com/office/drawing/2014/main" id="{816BDBF0-6B74-2542-B99D-4E0E3CF92420}"/>
+              </a:ext>
+            </a:extLst>
+          </p:cNvPr>
+          <p:cNvSpPr/>
+          <p:nvPr/>
+        </p:nvSpPr>
+        <p:spPr>
+          <a:xfrm>
+            <a:off x="1194288" y="5470597"/>
+            <a:ext cx="1151968" cy="418400"/>
+          </a:xfrm>
+          <a:prstGeom prst="roundRect">
+            <a:avLst>
+              <a:gd name="adj" fmla="val 4521"/>
+            </a:avLst>
+          </a:prstGeom>
+          <a:solidFill>
+            <a:schemeClr val="bg1"/>
+          </a:solidFill>
+          <a:ln w="19050">
+            <a:solidFill>
+              <a:schemeClr val="tx1"/>
+            </a:solidFill>
+          </a:ln>
+        </p:spPr>
+        <p:style>
+          <a:lnRef idx="2">
+            <a:schemeClr val="accent1">
+              <a:shade val="50000"/>
+            </a:schemeClr>
+          </a:lnRef>
+          <a:fillRef idx="1">
+            <a:schemeClr val="accent1"/>
+          </a:fillRef>
+          <a:effectRef idx="0">
+            <a:schemeClr val="accent1"/>
+          </a:effectRef>
+          <a:fontRef idx="minor">
+            <a:schemeClr val="lt1"/>
+          </a:fontRef>
+        </p:style>
+        <p:txBody>
+          <a:bodyPr rot="0" spcFirstLastPara="0" vertOverflow="overflow" horzOverflow="overflow" vert="horz" wrap="square" lIns="44280" tIns="22140" rIns="44280" bIns="22140" numCol="1" spcCol="0" rtlCol="0" fromWordArt="0" anchor="ctr" anchorCtr="0" forceAA="0" compatLnSpc="1">
+            <a:prstTxWarp prst="textNoShape">
+              <a:avLst/>
+            </a:prstTxWarp>
+            <a:noAutofit/>
+          </a:bodyPr>
+          <a:lstStyle/>
+          <a:p>
+            <a:pPr algn="ctr"/>
+            <a:r>
+              <a:rPr lang="en-US" sz="871" dirty="0">
+                <a:solidFill>
+                  <a:schemeClr val="tx1"/>
+                </a:solidFill>
+              </a:rPr>
+              <a:t>Cation exchange capacity</a:t>
+            </a:r>
+          </a:p>
+        </p:txBody>
+      </p:sp>
+      <p:cxnSp>
+        <p:nvCxnSpPr>
+          <p:cNvPr id="72" name="Straight Arrow Connector 71">
+            <a:extLst>
+              <a:ext uri="{FF2B5EF4-FFF2-40B4-BE49-F238E27FC236}">
+                <a16:creationId xmlns:a16="http://schemas.microsoft.com/office/drawing/2014/main" id="{6B5F59C7-928D-7242-B10F-92D0E6E8C707}"/>
+              </a:ext>
+            </a:extLst>
+          </p:cNvPr>
+          <p:cNvCxnSpPr>
+            <a:cxnSpLocks/>
+            <a:stCxn id="63" idx="2"/>
+            <a:endCxn id="67" idx="3"/>
+          </p:cNvCxnSpPr>
+          <p:nvPr/>
+        </p:nvCxnSpPr>
+        <p:spPr>
+          <a:xfrm flipH="1" flipV="1">
+            <a:off x="2353034" y="5056468"/>
+            <a:ext cx="241440" cy="18121"/>
+          </a:xfrm>
+          <a:prstGeom prst="straightConnector1">
+            <a:avLst/>
+          </a:prstGeom>
+          <a:ln w="19050">
+            <a:solidFill>
+              <a:schemeClr val="tx1"/>
+            </a:solidFill>
+            <a:headEnd type="arrow" w="med" len="med"/>
+            <a:tailEnd type="none" w="med" len="med"/>
+          </a:ln>
+        </p:spPr>
+        <p:style>
+          <a:lnRef idx="1">
+            <a:schemeClr val="accent1"/>
+          </a:lnRef>
+          <a:fillRef idx="0">
+            <a:schemeClr val="accent1"/>
+          </a:fillRef>
+          <a:effectRef idx="0">
+            <a:schemeClr val="accent1"/>
+          </a:effectRef>
+          <a:fontRef idx="minor">
+            <a:schemeClr val="tx1"/>
+          </a:fontRef>
+        </p:style>
+      </p:cxnSp>
+      <p:cxnSp>
+        <p:nvCxnSpPr>
+          <p:cNvPr id="69" name="Straight Arrow Connector 68">
+            <a:extLst>
+              <a:ext uri="{FF2B5EF4-FFF2-40B4-BE49-F238E27FC236}">
+                <a16:creationId xmlns:a16="http://schemas.microsoft.com/office/drawing/2014/main" id="{4E98CE7B-3471-D846-887C-7814048E6FE7}"/>
+              </a:ext>
+            </a:extLst>
+          </p:cNvPr>
+          <p:cNvCxnSpPr>
+            <a:cxnSpLocks/>
+            <a:stCxn id="41" idx="1"/>
+          </p:cNvCxnSpPr>
+          <p:nvPr/>
+        </p:nvCxnSpPr>
+        <p:spPr>
+          <a:xfrm flipH="1">
+            <a:off x="7466539" y="2766439"/>
+            <a:ext cx="704580" cy="434194"/>
+          </a:xfrm>
+          <a:prstGeom prst="straightConnector1">
+            <a:avLst/>
+          </a:prstGeom>
+          <a:ln w="28575">
+            <a:solidFill>
+              <a:schemeClr val="tx1"/>
+            </a:solidFill>
+            <a:headEnd type="none" w="med" len="med"/>
+            <a:tailEnd type="arrow" w="lg" len="med"/>
+          </a:ln>
+        </p:spPr>
+        <p:style>
+          <a:lnRef idx="1">
+            <a:schemeClr val="accent1"/>
+          </a:lnRef>
+          <a:fillRef idx="0">
+            <a:schemeClr val="accent1"/>
+          </a:fillRef>
+          <a:effectRef idx="0">
+            <a:schemeClr val="accent1"/>
+          </a:effectRef>
+          <a:fontRef idx="minor">
+            <a:schemeClr val="tx1"/>
+          </a:fontRef>
+        </p:style>
+      </p:cxnSp>
+      <p:cxnSp>
+        <p:nvCxnSpPr>
+          <p:cNvPr id="70" name="Straight Arrow Connector 69">
+            <a:extLst>
+              <a:ext uri="{FF2B5EF4-FFF2-40B4-BE49-F238E27FC236}">
+                <a16:creationId xmlns:a16="http://schemas.microsoft.com/office/drawing/2014/main" id="{CBEE19CB-F6B1-784A-982B-0177AD3CB406}"/>
+              </a:ext>
+            </a:extLst>
+          </p:cNvPr>
+          <p:cNvCxnSpPr>
+            <a:cxnSpLocks/>
+            <a:stCxn id="47" idx="1"/>
+          </p:cNvCxnSpPr>
+          <p:nvPr/>
+        </p:nvCxnSpPr>
+        <p:spPr>
+          <a:xfrm flipH="1" flipV="1">
+            <a:off x="7466539" y="4155054"/>
+            <a:ext cx="704580" cy="420844"/>
+          </a:xfrm>
+          <a:prstGeom prst="straightConnector1">
+            <a:avLst/>
+          </a:prstGeom>
+          <a:ln w="28575">
+            <a:solidFill>
+              <a:schemeClr val="tx1"/>
+            </a:solidFill>
+            <a:headEnd type="none" w="med" len="med"/>
+            <a:tailEnd type="arrow" w="lg" len="med"/>
+          </a:ln>
+        </p:spPr>
+        <p:style>
+          <a:lnRef idx="1">
+            <a:schemeClr val="accent1"/>
+          </a:lnRef>
+          <a:fillRef idx="0">
+            <a:schemeClr val="accent1"/>
+          </a:fillRef>
+          <a:effectRef idx="0">
+            <a:schemeClr val="accent1"/>
+          </a:effectRef>
+          <a:fontRef idx="minor">
+            <a:schemeClr val="tx1"/>
+          </a:fontRef>
+        </p:style>
+      </p:cxnSp>
+      <p:cxnSp>
+        <p:nvCxnSpPr>
+          <p:cNvPr id="93" name="Straight Arrow Connector 92">
+            <a:extLst>
+              <a:ext uri="{FF2B5EF4-FFF2-40B4-BE49-F238E27FC236}">
+                <a16:creationId xmlns:a16="http://schemas.microsoft.com/office/drawing/2014/main" id="{8565D249-7D5E-D54B-89A0-B9D8480B65EC}"/>
+              </a:ext>
+            </a:extLst>
+          </p:cNvPr>
+          <p:cNvCxnSpPr>
+            <a:cxnSpLocks/>
+          </p:cNvCxnSpPr>
+          <p:nvPr/>
+        </p:nvCxnSpPr>
+        <p:spPr>
+          <a:xfrm>
+            <a:off x="3843395" y="2765877"/>
+            <a:ext cx="825951" cy="488346"/>
+          </a:xfrm>
+          <a:prstGeom prst="straightConnector1">
+            <a:avLst/>
+          </a:prstGeom>
+          <a:ln w="28575">
+            <a:solidFill>
+              <a:schemeClr val="tx1"/>
+            </a:solidFill>
+            <a:headEnd type="none" w="med" len="med"/>
+            <a:tailEnd type="arrow" w="lg" len="med"/>
+          </a:ln>
+        </p:spPr>
+        <p:style>
+          <a:lnRef idx="1">
+            <a:schemeClr val="accent1"/>
+          </a:lnRef>
+          <a:fillRef idx="0">
+            <a:schemeClr val="accent1"/>
+          </a:fillRef>
+          <a:effectRef idx="0">
+            <a:schemeClr val="accent1"/>
+          </a:effectRef>
+          <a:fontRef idx="minor">
+            <a:schemeClr val="tx1"/>
+          </a:fontRef>
+        </p:style>
+      </p:cxnSp>
+      <p:cxnSp>
+        <p:nvCxnSpPr>
+          <p:cNvPr id="96" name="Straight Arrow Connector 95">
+            <a:extLst>
+              <a:ext uri="{FF2B5EF4-FFF2-40B4-BE49-F238E27FC236}">
+                <a16:creationId xmlns:a16="http://schemas.microsoft.com/office/drawing/2014/main" id="{CC1AE407-01A7-1549-82E6-0846D5A02355}"/>
+              </a:ext>
+            </a:extLst>
+          </p:cNvPr>
+          <p:cNvCxnSpPr>
+            <a:cxnSpLocks/>
+            <a:stCxn id="62" idx="3"/>
+          </p:cNvCxnSpPr>
+          <p:nvPr/>
+        </p:nvCxnSpPr>
+        <p:spPr>
+          <a:xfrm flipV="1">
+            <a:off x="3843395" y="4170305"/>
+            <a:ext cx="873543" cy="886163"/>
+          </a:xfrm>
+          <a:prstGeom prst="straightConnector1">
+            <a:avLst/>
+          </a:prstGeom>
+          <a:ln w="28575">
+            <a:solidFill>
+              <a:schemeClr val="tx1"/>
+            </a:solidFill>
+            <a:headEnd type="none" w="med" len="med"/>
+            <a:tailEnd type="arrow" w="lg" len="med"/>
+          </a:ln>
+        </p:spPr>
+        <p:style>
+          <a:lnRef idx="1">
+            <a:schemeClr val="accent1"/>
+          </a:lnRef>
+          <a:fillRef idx="0">
+            <a:schemeClr val="accent1"/>
+          </a:fillRef>
+          <a:effectRef idx="0">
+            <a:schemeClr val="accent1"/>
+          </a:effectRef>
+          <a:fontRef idx="minor">
+            <a:schemeClr val="tx1"/>
+          </a:fontRef>
+        </p:style>
+      </p:cxnSp>
+      <p:cxnSp>
+        <p:nvCxnSpPr>
+          <p:cNvPr id="109" name="Straight Arrow Connector 108">
+            <a:extLst>
+              <a:ext uri="{FF2B5EF4-FFF2-40B4-BE49-F238E27FC236}">
+                <a16:creationId xmlns:a16="http://schemas.microsoft.com/office/drawing/2014/main" id="{291D9E44-F7D5-9B41-BD0A-62BEC037210E}"/>
+              </a:ext>
+            </a:extLst>
+          </p:cNvPr>
+          <p:cNvCxnSpPr>
+            <a:cxnSpLocks/>
+          </p:cNvCxnSpPr>
+          <p:nvPr/>
+        </p:nvCxnSpPr>
+        <p:spPr>
+          <a:xfrm>
+            <a:off x="3852033" y="1849795"/>
+            <a:ext cx="4263267" cy="538331"/>
+          </a:xfrm>
+          <a:prstGeom prst="straightConnector1">
+            <a:avLst/>
+          </a:prstGeom>
+          <a:ln w="28575">
+            <a:solidFill>
+              <a:schemeClr val="tx1"/>
+            </a:solidFill>
+            <a:headEnd type="none" w="med" len="med"/>
+            <a:tailEnd type="arrow" w="lg" len="med"/>
+          </a:ln>
+        </p:spPr>
+        <p:style>
+          <a:lnRef idx="1">
+            <a:schemeClr val="accent1"/>
+          </a:lnRef>
+          <a:fillRef idx="0">
+            <a:schemeClr val="accent1"/>
+          </a:fillRef>
+          <a:effectRef idx="0">
+            <a:schemeClr val="accent1"/>
+          </a:effectRef>
+          <a:fontRef idx="minor">
+            <a:schemeClr val="tx1"/>
+          </a:fontRef>
+        </p:style>
+      </p:cxnSp>
+      <p:cxnSp>
+        <p:nvCxnSpPr>
+          <p:cNvPr id="114" name="Straight Arrow Connector 113">
+            <a:extLst>
+              <a:ext uri="{FF2B5EF4-FFF2-40B4-BE49-F238E27FC236}">
+                <a16:creationId xmlns:a16="http://schemas.microsoft.com/office/drawing/2014/main" id="{C054957D-7261-A240-8612-78AE11DCF5F3}"/>
+              </a:ext>
+            </a:extLst>
+          </p:cNvPr>
+          <p:cNvCxnSpPr>
+            <a:cxnSpLocks/>
+          </p:cNvCxnSpPr>
+          <p:nvPr/>
+        </p:nvCxnSpPr>
+        <p:spPr>
+          <a:xfrm flipV="1">
+            <a:off x="3852033" y="4948979"/>
+            <a:ext cx="4263267" cy="637524"/>
+          </a:xfrm>
+          <a:prstGeom prst="straightConnector1">
+            <a:avLst/>
+          </a:prstGeom>
+          <a:ln w="28575">
+            <a:solidFill>
+              <a:schemeClr val="tx1"/>
+            </a:solidFill>
+            <a:headEnd type="none" w="med" len="med"/>
+            <a:tailEnd type="arrow" w="lg" len="med"/>
+          </a:ln>
+        </p:spPr>
+        <p:style>
+          <a:lnRef idx="1">
+            <a:schemeClr val="accent1"/>
+          </a:lnRef>
+          <a:fillRef idx="0">
+            <a:schemeClr val="accent1"/>
+          </a:fillRef>
+          <a:effectRef idx="0">
+            <a:schemeClr val="accent1"/>
+          </a:effectRef>
+          <a:fontRef idx="minor">
+            <a:schemeClr val="tx1"/>
+          </a:fontRef>
+        </p:style>
+      </p:cxnSp>
+      <p:sp>
+        <p:nvSpPr>
+          <p:cNvPr id="55" name="Oval 54">
+            <a:extLst>
+              <a:ext uri="{FF2B5EF4-FFF2-40B4-BE49-F238E27FC236}">
+                <a16:creationId xmlns:a16="http://schemas.microsoft.com/office/drawing/2014/main" id="{889658C9-CDD3-CD45-BCE1-872E58AC68A3}"/>
+              </a:ext>
+            </a:extLst>
+          </p:cNvPr>
+          <p:cNvSpPr/>
+          <p:nvPr/>
+        </p:nvSpPr>
+        <p:spPr>
+          <a:xfrm>
+            <a:off x="2593943" y="2001549"/>
+            <a:ext cx="1114916" cy="558438"/>
+          </a:xfrm>
+          <a:prstGeom prst="ellipse">
+            <a:avLst/>
+          </a:prstGeom>
+          <a:solidFill>
+            <a:schemeClr val="bg1"/>
+          </a:solidFill>
+          <a:ln w="19050">
+            <a:solidFill>
+              <a:schemeClr val="tx1"/>
+            </a:solidFill>
+          </a:ln>
+        </p:spPr>
+        <p:style>
+          <a:lnRef idx="2">
+            <a:schemeClr val="accent1">
+              <a:shade val="50000"/>
+            </a:schemeClr>
+          </a:lnRef>
+          <a:fillRef idx="1">
+            <a:schemeClr val="accent1"/>
+          </a:fillRef>
+          <a:effectRef idx="0">
+            <a:schemeClr val="accent1"/>
+          </a:effectRef>
+          <a:fontRef idx="minor">
+            <a:schemeClr val="lt1"/>
+          </a:fontRef>
+        </p:style>
+        <p:txBody>
+          <a:bodyPr rot="0" spcFirstLastPara="0" vertOverflow="overflow" horzOverflow="overflow" vert="horz" wrap="square" lIns="49770" tIns="24885" rIns="49770" bIns="24885" numCol="1" spcCol="0" rtlCol="0" fromWordArt="0" anchor="ctr" anchorCtr="0" forceAA="0" compatLnSpc="1">
+            <a:prstTxWarp prst="textNoShape">
+              <a:avLst/>
+            </a:prstTxWarp>
+            <a:noAutofit/>
+          </a:bodyPr>
+          <a:lstStyle/>
+          <a:p>
+            <a:pPr algn="ctr"/>
+            <a:r>
+              <a:rPr lang="en-US" sz="980" dirty="0">
+                <a:solidFill>
+                  <a:schemeClr val="tx1"/>
+                </a:solidFill>
+              </a:rPr>
+              <a:t>Moisture availability</a:t>
+            </a:r>
+          </a:p>
+        </p:txBody>
+      </p:sp>
+      <p:cxnSp>
+        <p:nvCxnSpPr>
+          <p:cNvPr id="56" name="Straight Arrow Connector 55">
+            <a:extLst>
+              <a:ext uri="{FF2B5EF4-FFF2-40B4-BE49-F238E27FC236}">
+                <a16:creationId xmlns:a16="http://schemas.microsoft.com/office/drawing/2014/main" id="{04880A29-B25B-D444-93CF-3D186FB1057C}"/>
+              </a:ext>
+            </a:extLst>
+          </p:cNvPr>
+          <p:cNvCxnSpPr>
+            <a:cxnSpLocks/>
+            <a:stCxn id="55" idx="3"/>
+            <a:endCxn id="58" idx="3"/>
+          </p:cNvCxnSpPr>
+          <p:nvPr/>
+        </p:nvCxnSpPr>
+        <p:spPr>
+          <a:xfrm flipH="1">
+            <a:off x="2337618" y="2478206"/>
+            <a:ext cx="419601" cy="215042"/>
+          </a:xfrm>
+          <a:prstGeom prst="straightConnector1">
+            <a:avLst/>
+          </a:prstGeom>
+          <a:solidFill>
+            <a:srgbClr val="E7786B"/>
+          </a:solidFill>
+          <a:ln w="19050">
+            <a:solidFill>
+              <a:schemeClr val="tx1"/>
+            </a:solidFill>
+            <a:headEnd type="arrow" w="med" len="med"/>
+            <a:tailEnd type="none" w="med" len="med"/>
+          </a:ln>
+        </p:spPr>
+        <p:style>
+          <a:lnRef idx="1">
+            <a:schemeClr val="accent1"/>
+          </a:lnRef>
+          <a:fillRef idx="0">
+            <a:schemeClr val="accent1"/>
+          </a:fillRef>
+          <a:effectRef idx="0">
+            <a:schemeClr val="accent1"/>
+          </a:effectRef>
+          <a:fontRef idx="minor">
+            <a:schemeClr val="tx1"/>
+          </a:fontRef>
+        </p:style>
+      </p:cxnSp>
+      <p:sp>
+        <p:nvSpPr>
+          <p:cNvPr id="28" name="Rounded Rectangle 27">
+            <a:extLst>
+              <a:ext uri="{FF2B5EF4-FFF2-40B4-BE49-F238E27FC236}">
+                <a16:creationId xmlns:a16="http://schemas.microsoft.com/office/drawing/2014/main" id="{E65EE086-93D8-4849-B391-B0695E0E2F23}"/>
+              </a:ext>
+            </a:extLst>
+          </p:cNvPr>
+          <p:cNvSpPr/>
+          <p:nvPr/>
+        </p:nvSpPr>
+        <p:spPr>
+          <a:xfrm>
+            <a:off x="1194290" y="1035761"/>
+            <a:ext cx="1151968" cy="418400"/>
+          </a:xfrm>
+          <a:prstGeom prst="roundRect">
+            <a:avLst>
+              <a:gd name="adj" fmla="val 4521"/>
+            </a:avLst>
+          </a:prstGeom>
+          <a:solidFill>
+            <a:schemeClr val="bg1"/>
+          </a:solidFill>
+          <a:ln w="19050">
+            <a:solidFill>
+              <a:schemeClr val="tx1"/>
+            </a:solidFill>
+          </a:ln>
+        </p:spPr>
+        <p:style>
+          <a:lnRef idx="2">
+            <a:schemeClr val="accent1">
+              <a:shade val="50000"/>
+            </a:schemeClr>
+          </a:lnRef>
+          <a:fillRef idx="1">
+            <a:schemeClr val="accent1"/>
+          </a:fillRef>
+          <a:effectRef idx="0">
+            <a:schemeClr val="accent1"/>
+          </a:effectRef>
+          <a:fontRef idx="minor">
+            <a:schemeClr val="lt1"/>
+          </a:fontRef>
+        </p:style>
+        <p:txBody>
+          <a:bodyPr rot="0" spcFirstLastPara="0" vertOverflow="overflow" horzOverflow="overflow" vert="horz" wrap="square" lIns="44280" tIns="22140" rIns="44280" bIns="22140" numCol="1" spcCol="0" rtlCol="0" fromWordArt="0" anchor="ctr" anchorCtr="0" forceAA="0" compatLnSpc="1">
+            <a:prstTxWarp prst="textNoShape">
+              <a:avLst/>
+            </a:prstTxWarp>
+            <a:noAutofit/>
+          </a:bodyPr>
+          <a:lstStyle/>
+          <a:p>
+            <a:pPr algn="ctr"/>
+            <a:r>
+              <a:rPr lang="en-US" sz="871" dirty="0">
+                <a:solidFill>
+                  <a:schemeClr val="tx1"/>
+                </a:solidFill>
+              </a:rPr>
+              <a:t>Mean Annual Precipitation</a:t>
+            </a:r>
+          </a:p>
+        </p:txBody>
+      </p:sp>
+      <p:sp>
+        <p:nvSpPr>
+          <p:cNvPr id="29" name="Rounded Rectangle 28">
+            <a:extLst>
+              <a:ext uri="{FF2B5EF4-FFF2-40B4-BE49-F238E27FC236}">
+                <a16:creationId xmlns:a16="http://schemas.microsoft.com/office/drawing/2014/main" id="{8744D7B3-8952-9A43-A7F6-1C544E8C5462}"/>
+              </a:ext>
+            </a:extLst>
+          </p:cNvPr>
+          <p:cNvSpPr/>
+          <p:nvPr/>
+        </p:nvSpPr>
+        <p:spPr>
+          <a:xfrm>
+            <a:off x="1201068" y="1668861"/>
+            <a:ext cx="1151968" cy="418400"/>
+          </a:xfrm>
+          <a:prstGeom prst="roundRect">
+            <a:avLst>
+              <a:gd name="adj" fmla="val 4521"/>
+            </a:avLst>
+          </a:prstGeom>
+          <a:solidFill>
+            <a:schemeClr val="bg1"/>
+          </a:solidFill>
+          <a:ln w="19050">
+            <a:solidFill>
+              <a:schemeClr val="tx1"/>
+            </a:solidFill>
+          </a:ln>
+        </p:spPr>
+        <p:style>
+          <a:lnRef idx="2">
+            <a:schemeClr val="accent1">
+              <a:shade val="50000"/>
+            </a:schemeClr>
+          </a:lnRef>
+          <a:fillRef idx="1">
+            <a:schemeClr val="accent1"/>
+          </a:fillRef>
+          <a:effectRef idx="0">
+            <a:schemeClr val="accent1"/>
+          </a:effectRef>
+          <a:fontRef idx="minor">
+            <a:schemeClr val="lt1"/>
+          </a:fontRef>
+        </p:style>
+        <p:txBody>
+          <a:bodyPr rot="0" spcFirstLastPara="0" vertOverflow="overflow" horzOverflow="overflow" vert="horz" wrap="square" lIns="44280" tIns="22140" rIns="44280" bIns="22140" numCol="1" spcCol="0" rtlCol="0" fromWordArt="0" anchor="ctr" anchorCtr="0" forceAA="0" compatLnSpc="1">
+            <a:prstTxWarp prst="textNoShape">
+              <a:avLst/>
+            </a:prstTxWarp>
+            <a:noAutofit/>
+          </a:bodyPr>
+          <a:lstStyle/>
+          <a:p>
+            <a:pPr algn="ctr"/>
+            <a:r>
+              <a:rPr lang="en-US" sz="871" dirty="0">
+                <a:solidFill>
+                  <a:schemeClr val="tx1"/>
+                </a:solidFill>
+              </a:rPr>
+              <a:t>Precipitation Seasonality</a:t>
+            </a:r>
+          </a:p>
+        </p:txBody>
+      </p:sp>
+      <p:sp>
+        <p:nvSpPr>
+          <p:cNvPr id="58" name="Rounded Rectangle 57">
+            <a:extLst>
+              <a:ext uri="{FF2B5EF4-FFF2-40B4-BE49-F238E27FC236}">
+                <a16:creationId xmlns:a16="http://schemas.microsoft.com/office/drawing/2014/main" id="{CC7806C9-FAD5-DA40-A97E-710AD64D8524}"/>
+              </a:ext>
+            </a:extLst>
+          </p:cNvPr>
+          <p:cNvSpPr/>
+          <p:nvPr/>
+        </p:nvSpPr>
+        <p:spPr>
+          <a:xfrm>
+            <a:off x="1185650" y="2484048"/>
+            <a:ext cx="1151968" cy="418400"/>
+          </a:xfrm>
+          <a:prstGeom prst="roundRect">
+            <a:avLst>
+              <a:gd name="adj" fmla="val 4521"/>
+            </a:avLst>
+          </a:prstGeom>
+          <a:solidFill>
+            <a:schemeClr val="bg1"/>
+          </a:solidFill>
+          <a:ln w="19050">
+            <a:solidFill>
+              <a:schemeClr val="tx1"/>
+            </a:solidFill>
+          </a:ln>
+        </p:spPr>
+        <p:style>
+          <a:lnRef idx="2">
+            <a:schemeClr val="accent1">
+              <a:shade val="50000"/>
+            </a:schemeClr>
+          </a:lnRef>
+          <a:fillRef idx="1">
+            <a:schemeClr val="accent1"/>
+          </a:fillRef>
+          <a:effectRef idx="0">
+            <a:schemeClr val="accent1"/>
+          </a:effectRef>
+          <a:fontRef idx="minor">
+            <a:schemeClr val="lt1"/>
+          </a:fontRef>
+        </p:style>
+        <p:txBody>
+          <a:bodyPr rot="0" spcFirstLastPara="0" vertOverflow="overflow" horzOverflow="overflow" vert="horz" wrap="square" lIns="44280" tIns="22140" rIns="44280" bIns="22140" numCol="1" spcCol="0" rtlCol="0" fromWordArt="0" anchor="ctr" anchorCtr="0" forceAA="0" compatLnSpc="1">
+            <a:prstTxWarp prst="textNoShape">
+              <a:avLst/>
+            </a:prstTxWarp>
+            <a:noAutofit/>
+          </a:bodyPr>
+          <a:lstStyle/>
+          <a:p>
+            <a:pPr algn="ctr"/>
+            <a:r>
+              <a:rPr lang="en-US" sz="871" dirty="0">
+                <a:solidFill>
+                  <a:schemeClr val="tx1"/>
+                </a:solidFill>
+              </a:rPr>
+              <a:t>Mean annual Temperature</a:t>
+            </a:r>
+          </a:p>
+        </p:txBody>
+      </p:sp>
+      <p:sp>
+        <p:nvSpPr>
+          <p:cNvPr id="59" name="Rounded Rectangle 58">
+            <a:extLst>
+              <a:ext uri="{FF2B5EF4-FFF2-40B4-BE49-F238E27FC236}">
+                <a16:creationId xmlns:a16="http://schemas.microsoft.com/office/drawing/2014/main" id="{E04ABA0E-4C83-A44A-A810-F6F57F486E53}"/>
+              </a:ext>
+            </a:extLst>
+          </p:cNvPr>
+          <p:cNvSpPr/>
+          <p:nvPr/>
+        </p:nvSpPr>
+        <p:spPr>
+          <a:xfrm>
+            <a:off x="1192428" y="3107376"/>
+            <a:ext cx="1151968" cy="418400"/>
+          </a:xfrm>
+          <a:prstGeom prst="roundRect">
+            <a:avLst>
+              <a:gd name="adj" fmla="val 4521"/>
+            </a:avLst>
+          </a:prstGeom>
+          <a:solidFill>
+            <a:schemeClr val="bg1"/>
+          </a:solidFill>
+          <a:ln w="19050">
+            <a:solidFill>
+              <a:schemeClr val="tx1"/>
+            </a:solidFill>
+          </a:ln>
+        </p:spPr>
+        <p:style>
+          <a:lnRef idx="2">
+            <a:schemeClr val="accent1">
+              <a:shade val="50000"/>
+            </a:schemeClr>
+          </a:lnRef>
+          <a:fillRef idx="1">
+            <a:schemeClr val="accent1"/>
+          </a:fillRef>
+          <a:effectRef idx="0">
+            <a:schemeClr val="accent1"/>
+          </a:effectRef>
+          <a:fontRef idx="minor">
+            <a:schemeClr val="lt1"/>
+          </a:fontRef>
+        </p:style>
+        <p:txBody>
+          <a:bodyPr rot="0" spcFirstLastPara="0" vertOverflow="overflow" horzOverflow="overflow" vert="horz" wrap="square" lIns="44280" tIns="22140" rIns="44280" bIns="22140" numCol="1" spcCol="0" rtlCol="0" fromWordArt="0" anchor="ctr" anchorCtr="0" forceAA="0" compatLnSpc="1">
+            <a:prstTxWarp prst="textNoShape">
+              <a:avLst/>
+            </a:prstTxWarp>
+            <a:noAutofit/>
+          </a:bodyPr>
+          <a:lstStyle/>
+          <a:p>
+            <a:pPr algn="ctr"/>
+            <a:r>
+              <a:rPr lang="en-US" sz="871" dirty="0">
+                <a:solidFill>
+                  <a:schemeClr val="tx1"/>
+                </a:solidFill>
+              </a:rPr>
+              <a:t>Temperature Seasonality</a:t>
+            </a:r>
+          </a:p>
+        </p:txBody>
+      </p:sp>
+      <p:cxnSp>
+        <p:nvCxnSpPr>
+          <p:cNvPr id="61" name="Straight Arrow Connector 60">
+            <a:extLst>
+              <a:ext uri="{FF2B5EF4-FFF2-40B4-BE49-F238E27FC236}">
+                <a16:creationId xmlns:a16="http://schemas.microsoft.com/office/drawing/2014/main" id="{C96B98D0-C230-FF48-9A3A-139A5313A496}"/>
+              </a:ext>
+            </a:extLst>
+          </p:cNvPr>
+          <p:cNvCxnSpPr>
+            <a:cxnSpLocks/>
+            <a:stCxn id="55" idx="4"/>
+            <a:endCxn id="59" idx="3"/>
+          </p:cNvCxnSpPr>
+          <p:nvPr/>
+        </p:nvCxnSpPr>
+        <p:spPr>
+          <a:xfrm flipH="1">
+            <a:off x="2344396" y="2559987"/>
+            <a:ext cx="807005" cy="756589"/>
+          </a:xfrm>
+          <a:prstGeom prst="straightConnector1">
+            <a:avLst/>
+          </a:prstGeom>
+          <a:solidFill>
+            <a:srgbClr val="E7786B"/>
+          </a:solidFill>
+          <a:ln w="19050">
+            <a:solidFill>
+              <a:schemeClr val="tx1"/>
+            </a:solidFill>
+            <a:headEnd type="arrow" w="med" len="med"/>
+            <a:tailEnd type="none" w="med" len="med"/>
+          </a:ln>
+        </p:spPr>
+        <p:style>
+          <a:lnRef idx="1">
+            <a:schemeClr val="accent1"/>
+          </a:lnRef>
+          <a:fillRef idx="0">
+            <a:schemeClr val="accent1"/>
+          </a:fillRef>
+          <a:effectRef idx="0">
+            <a:schemeClr val="accent1"/>
+          </a:effectRef>
+          <a:fontRef idx="minor">
+            <a:schemeClr val="tx1"/>
+          </a:fontRef>
+        </p:style>
+      </p:cxnSp>
+      <p:sp>
+        <p:nvSpPr>
+          <p:cNvPr id="77" name="Rounded Rectangle 76">
+            <a:extLst>
+              <a:ext uri="{FF2B5EF4-FFF2-40B4-BE49-F238E27FC236}">
+                <a16:creationId xmlns:a16="http://schemas.microsoft.com/office/drawing/2014/main" id="{027E1090-76EA-E24E-B33F-A44F89BCB9C5}"/>
+              </a:ext>
+            </a:extLst>
+          </p:cNvPr>
+          <p:cNvSpPr/>
+          <p:nvPr/>
+        </p:nvSpPr>
+        <p:spPr>
+          <a:xfrm>
+            <a:off x="4661686" y="3182051"/>
+            <a:ext cx="2804853" cy="973003"/>
+          </a:xfrm>
+          <a:prstGeom prst="roundRect">
+            <a:avLst/>
+          </a:prstGeom>
+          <a:solidFill>
+            <a:srgbClr val="7FC973"/>
+          </a:solidFill>
+          <a:ln w="19050">
+            <a:solidFill>
+              <a:schemeClr val="tx1"/>
+            </a:solidFill>
+            <a:prstDash val="solid"/>
+          </a:ln>
+        </p:spPr>
+        <p:style>
+          <a:lnRef idx="2">
+            <a:schemeClr val="accent1">
+              <a:shade val="50000"/>
+            </a:schemeClr>
+          </a:lnRef>
+          <a:fillRef idx="1">
+            <a:schemeClr val="accent1"/>
+          </a:fillRef>
+          <a:effectRef idx="0">
+            <a:schemeClr val="accent1"/>
+          </a:effectRef>
+          <a:fontRef idx="minor">
+            <a:schemeClr val="lt1"/>
+          </a:fontRef>
+        </p:style>
+        <p:txBody>
+          <a:bodyPr rot="0" spcFirstLastPara="0" vertOverflow="overflow" horzOverflow="overflow" vert="horz" wrap="square" lIns="49770" tIns="24885" rIns="49770" bIns="24885" numCol="1" spcCol="0" rtlCol="0" fromWordArt="0" anchor="ctr" anchorCtr="0" forceAA="0" compatLnSpc="1">
+            <a:prstTxWarp prst="textNoShape">
+              <a:avLst/>
+            </a:prstTxWarp>
+            <a:noAutofit/>
+          </a:bodyPr>
+          <a:lstStyle/>
+          <a:p>
+            <a:pPr algn="ctr"/>
+            <a:endParaRPr lang="en-US" sz="980">
+              <a:solidFill>
+                <a:schemeClr val="tx1"/>
+              </a:solidFill>
+            </a:endParaRPr>
+          </a:p>
+        </p:txBody>
+      </p:sp>
+      <p:sp>
+        <p:nvSpPr>
+          <p:cNvPr id="78" name="Oval 77">
+            <a:extLst>
+              <a:ext uri="{FF2B5EF4-FFF2-40B4-BE49-F238E27FC236}">
+                <a16:creationId xmlns:a16="http://schemas.microsoft.com/office/drawing/2014/main" id="{3D273232-2610-8742-954C-06392DB09FF9}"/>
+              </a:ext>
+            </a:extLst>
+          </p:cNvPr>
+          <p:cNvSpPr/>
+          <p:nvPr/>
+        </p:nvSpPr>
+        <p:spPr>
+          <a:xfrm>
+            <a:off x="6208305" y="3389496"/>
+            <a:ext cx="1116753" cy="558114"/>
+          </a:xfrm>
+          <a:prstGeom prst="ellipse">
+            <a:avLst/>
+          </a:prstGeom>
+          <a:solidFill>
+            <a:schemeClr val="bg1"/>
+          </a:solidFill>
+          <a:ln w="19050">
+            <a:solidFill>
+              <a:schemeClr val="tx1"/>
+            </a:solidFill>
+          </a:ln>
+        </p:spPr>
+        <p:style>
+          <a:lnRef idx="2">
+            <a:schemeClr val="accent1">
+              <a:shade val="50000"/>
+            </a:schemeClr>
+          </a:lnRef>
+          <a:fillRef idx="1">
+            <a:schemeClr val="accent1"/>
+          </a:fillRef>
+          <a:effectRef idx="0">
+            <a:schemeClr val="accent1"/>
+          </a:effectRef>
+          <a:fontRef idx="minor">
+            <a:schemeClr val="lt1"/>
+          </a:fontRef>
+        </p:style>
+        <p:txBody>
+          <a:bodyPr rot="0" spcFirstLastPara="0" vertOverflow="overflow" horzOverflow="overflow" vert="horz" wrap="square" lIns="49770" tIns="24885" rIns="49770" bIns="24885" numCol="1" spcCol="0" rtlCol="0" fromWordArt="0" anchor="ctr" anchorCtr="0" forceAA="0" compatLnSpc="1">
+            <a:prstTxWarp prst="textNoShape">
+              <a:avLst/>
+            </a:prstTxWarp>
+            <a:noAutofit/>
+          </a:bodyPr>
+          <a:lstStyle/>
+          <a:p>
+            <a:pPr algn="ctr"/>
+            <a:r>
+              <a:rPr lang="en-US" sz="980" dirty="0">
+                <a:solidFill>
+                  <a:schemeClr val="tx1"/>
+                </a:solidFill>
+              </a:rPr>
+              <a:t>Above ground biomass</a:t>
+            </a:r>
+          </a:p>
+        </p:txBody>
+      </p:sp>
+      <p:sp>
+        <p:nvSpPr>
+          <p:cNvPr id="79" name="Rounded Rectangle 78">
+            <a:extLst>
+              <a:ext uri="{FF2B5EF4-FFF2-40B4-BE49-F238E27FC236}">
+                <a16:creationId xmlns:a16="http://schemas.microsoft.com/office/drawing/2014/main" id="{D4914A2F-CC49-2544-8F7E-26BF9F4F279E}"/>
+              </a:ext>
+            </a:extLst>
+          </p:cNvPr>
+          <p:cNvSpPr/>
+          <p:nvPr/>
+        </p:nvSpPr>
+        <p:spPr>
+          <a:xfrm>
+            <a:off x="4843330" y="3459354"/>
+            <a:ext cx="1151968" cy="418400"/>
+          </a:xfrm>
+          <a:prstGeom prst="roundRect">
+            <a:avLst>
+              <a:gd name="adj" fmla="val 4521"/>
+            </a:avLst>
+          </a:prstGeom>
+          <a:solidFill>
+            <a:schemeClr val="bg1"/>
+          </a:solidFill>
+          <a:ln w="19050">
+            <a:solidFill>
+              <a:schemeClr val="tx1"/>
+            </a:solidFill>
+          </a:ln>
+        </p:spPr>
+        <p:style>
+          <a:lnRef idx="2">
+            <a:schemeClr val="accent1">
+              <a:shade val="50000"/>
+            </a:schemeClr>
+          </a:lnRef>
+          <a:fillRef idx="1">
+            <a:schemeClr val="accent1"/>
+          </a:fillRef>
+          <a:effectRef idx="0">
+            <a:schemeClr val="accent1"/>
+          </a:effectRef>
+          <a:fontRef idx="minor">
+            <a:schemeClr val="lt1"/>
+          </a:fontRef>
+        </p:style>
+        <p:txBody>
+          <a:bodyPr rot="0" spcFirstLastPara="0" vertOverflow="overflow" horzOverflow="overflow" vert="horz" wrap="square" lIns="44280" tIns="22140" rIns="44280" bIns="22140" numCol="1" spcCol="0" rtlCol="0" fromWordArt="0" anchor="ctr" anchorCtr="0" forceAA="0" compatLnSpc="1">
+            <a:prstTxWarp prst="textNoShape">
+              <a:avLst/>
+            </a:prstTxWarp>
+            <a:noAutofit/>
+          </a:bodyPr>
+          <a:lstStyle/>
+          <a:p>
+            <a:pPr algn="ctr"/>
+            <a:r>
+              <a:rPr lang="en-US" sz="871" dirty="0">
+                <a:solidFill>
+                  <a:schemeClr val="tx1"/>
+                </a:solidFill>
+              </a:rPr>
+              <a:t>Above ground </a:t>
+            </a:r>
+          </a:p>
+          <a:p>
+            <a:pPr algn="ctr"/>
+            <a:r>
+              <a:rPr lang="en-US" sz="871" dirty="0">
+                <a:solidFill>
+                  <a:schemeClr val="tx1"/>
+                </a:solidFill>
+              </a:rPr>
+              <a:t>biomass</a:t>
+            </a:r>
+          </a:p>
+        </p:txBody>
+      </p:sp>
+      <p:cxnSp>
+        <p:nvCxnSpPr>
+          <p:cNvPr id="80" name="Straight Arrow Connector 79">
+            <a:extLst>
+              <a:ext uri="{FF2B5EF4-FFF2-40B4-BE49-F238E27FC236}">
+                <a16:creationId xmlns:a16="http://schemas.microsoft.com/office/drawing/2014/main" id="{6F54BD98-DC84-8245-8817-6DF0B7FD5F05}"/>
+              </a:ext>
+            </a:extLst>
+          </p:cNvPr>
+          <p:cNvCxnSpPr>
+            <a:cxnSpLocks/>
+            <a:stCxn id="78" idx="2"/>
+            <a:endCxn id="79" idx="3"/>
+          </p:cNvCxnSpPr>
+          <p:nvPr/>
+        </p:nvCxnSpPr>
+        <p:spPr>
+          <a:xfrm flipH="1">
+            <a:off x="5995298" y="3668553"/>
+            <a:ext cx="213007" cy="1"/>
+          </a:xfrm>
+          <a:prstGeom prst="straightConnector1">
+            <a:avLst/>
+          </a:prstGeom>
+          <a:ln w="19050">
+            <a:solidFill>
+              <a:schemeClr val="tx1"/>
+            </a:solidFill>
+            <a:headEnd type="arrow" w="med" len="med"/>
+            <a:tailEnd type="none" w="med" len="med"/>
+          </a:ln>
+        </p:spPr>
+        <p:style>
+          <a:lnRef idx="1">
+            <a:schemeClr val="accent1"/>
+          </a:lnRef>
+          <a:fillRef idx="0">
+            <a:schemeClr val="accent1"/>
+          </a:fillRef>
+          <a:effectRef idx="0">
+            <a:schemeClr val="accent1"/>
+          </a:effectRef>
+          <a:fontRef idx="minor">
+            <a:schemeClr val="tx1"/>
+          </a:fontRef>
+        </p:style>
+      </p:cxnSp>
+    </p:spTree>
+    <p:extLst>
+      <p:ext uri="{BB962C8B-B14F-4D97-AF65-F5344CB8AC3E}">
+        <p14:creationId xmlns:p14="http://schemas.microsoft.com/office/powerpoint/2010/main" val="4011225920"/>
+      </p:ext>
+    </p:extLst>
+  </p:cSld>
+  <p:clrMapOvr>
+    <a:masterClrMapping/>
+  </p:clrMapOvr>
+</p:sld>
+</file>
+
+<file path=ppt/slides/slide5.xml><?xml version="1.0" encoding="utf-8"?>
+<p:sld xmlns:a="http://schemas.openxmlformats.org/drawingml/2006/main" xmlns:r="http://schemas.openxmlformats.org/officeDocument/2006/relationships" xmlns:p="http://schemas.openxmlformats.org/presentationml/2006/main">
+  <p:cSld>
+    <p:spTree>
+      <p:nvGrpSpPr>
+        <p:cNvPr id="1" name=""/>
+        <p:cNvGrpSpPr/>
+        <p:nvPr/>
+      </p:nvGrpSpPr>
+      <p:grpSpPr>
+        <a:xfrm>
+          <a:off x="0" y="0"/>
+          <a:ext cx="0" cy="0"/>
+          <a:chOff x="0" y="0"/>
+          <a:chExt cx="0" cy="0"/>
+        </a:xfrm>
+      </p:grpSpPr>
+      <p:sp>
+        <p:nvSpPr>
           <p:cNvPr id="3" name="Rounded Rectangle 2">
             <a:extLst>
               <a:ext uri="{FF2B5EF4-FFF2-40B4-BE49-F238E27FC236}">
@@ -14157,7 +17301,7 @@
 </p:sld>
 </file>
 
-<file path=ppt/slides/slide5.xml><?xml version="1.0" encoding="utf-8"?>
+<file path=ppt/slides/slide6.xml><?xml version="1.0" encoding="utf-8"?>
 <p:sld xmlns:a="http://schemas.openxmlformats.org/drawingml/2006/main" xmlns:r="http://schemas.openxmlformats.org/officeDocument/2006/relationships" xmlns:p="http://schemas.openxmlformats.org/presentationml/2006/main">
   <p:cSld>
     <p:spTree>

</xml_diff>